<commit_message>
added pptx file with placeholder for UI changes
</commit_message>
<xml_diff>
--- a/docs/user-guide/image-source/Images.pptx
+++ b/docs/user-guide/image-source/Images.pptx
@@ -13,6 +13,8 @@
     <p:sldId id="259" r:id="rId7"/>
     <p:sldId id="261" r:id="rId8"/>
     <p:sldId id="264" r:id="rId9"/>
+    <p:sldId id="265" r:id="rId10"/>
+    <p:sldId id="266" r:id="rId11"/>
   </p:sldIdLst>
   <p:sldSz cx="12192000" cy="6858000"/>
   <p:notesSz cx="6858000" cy="9144000"/>
@@ -266,7 +268,7 @@
           <a:p>
             <a:fld id="{5E193FAB-CF9D-2A41-8ED8-3EDE309B28B8}" type="datetimeFigureOut">
               <a:rPr lang="en-US" smtClean="0"/>
-              <a:t>11/30/21</a:t>
+              <a:t>12/14/21</a:t>
             </a:fld>
             <a:endParaRPr lang="en-US"/>
           </a:p>
@@ -464,7 +466,7 @@
           <a:p>
             <a:fld id="{5E193FAB-CF9D-2A41-8ED8-3EDE309B28B8}" type="datetimeFigureOut">
               <a:rPr lang="en-US" smtClean="0"/>
-              <a:t>11/30/21</a:t>
+              <a:t>12/14/21</a:t>
             </a:fld>
             <a:endParaRPr lang="en-US"/>
           </a:p>
@@ -672,7 +674,7 @@
           <a:p>
             <a:fld id="{5E193FAB-CF9D-2A41-8ED8-3EDE309B28B8}" type="datetimeFigureOut">
               <a:rPr lang="en-US" smtClean="0"/>
-              <a:t>11/30/21</a:t>
+              <a:t>12/14/21</a:t>
             </a:fld>
             <a:endParaRPr lang="en-US"/>
           </a:p>
@@ -870,7 +872,7 @@
           <a:p>
             <a:fld id="{5E193FAB-CF9D-2A41-8ED8-3EDE309B28B8}" type="datetimeFigureOut">
               <a:rPr lang="en-US" smtClean="0"/>
-              <a:t>11/30/21</a:t>
+              <a:t>12/14/21</a:t>
             </a:fld>
             <a:endParaRPr lang="en-US"/>
           </a:p>
@@ -1145,7 +1147,7 @@
           <a:p>
             <a:fld id="{5E193FAB-CF9D-2A41-8ED8-3EDE309B28B8}" type="datetimeFigureOut">
               <a:rPr lang="en-US" smtClean="0"/>
-              <a:t>11/30/21</a:t>
+              <a:t>12/14/21</a:t>
             </a:fld>
             <a:endParaRPr lang="en-US"/>
           </a:p>
@@ -1410,7 +1412,7 @@
           <a:p>
             <a:fld id="{5E193FAB-CF9D-2A41-8ED8-3EDE309B28B8}" type="datetimeFigureOut">
               <a:rPr lang="en-US" smtClean="0"/>
-              <a:t>11/30/21</a:t>
+              <a:t>12/14/21</a:t>
             </a:fld>
             <a:endParaRPr lang="en-US"/>
           </a:p>
@@ -1822,7 +1824,7 @@
           <a:p>
             <a:fld id="{5E193FAB-CF9D-2A41-8ED8-3EDE309B28B8}" type="datetimeFigureOut">
               <a:rPr lang="en-US" smtClean="0"/>
-              <a:t>11/30/21</a:t>
+              <a:t>12/14/21</a:t>
             </a:fld>
             <a:endParaRPr lang="en-US"/>
           </a:p>
@@ -1963,7 +1965,7 @@
           <a:p>
             <a:fld id="{5E193FAB-CF9D-2A41-8ED8-3EDE309B28B8}" type="datetimeFigureOut">
               <a:rPr lang="en-US" smtClean="0"/>
-              <a:t>11/30/21</a:t>
+              <a:t>12/14/21</a:t>
             </a:fld>
             <a:endParaRPr lang="en-US"/>
           </a:p>
@@ -2076,7 +2078,7 @@
           <a:p>
             <a:fld id="{5E193FAB-CF9D-2A41-8ED8-3EDE309B28B8}" type="datetimeFigureOut">
               <a:rPr lang="en-US" smtClean="0"/>
-              <a:t>11/30/21</a:t>
+              <a:t>12/14/21</a:t>
             </a:fld>
             <a:endParaRPr lang="en-US"/>
           </a:p>
@@ -2387,7 +2389,7 @@
           <a:p>
             <a:fld id="{5E193FAB-CF9D-2A41-8ED8-3EDE309B28B8}" type="datetimeFigureOut">
               <a:rPr lang="en-US" smtClean="0"/>
-              <a:t>11/30/21</a:t>
+              <a:t>12/14/21</a:t>
             </a:fld>
             <a:endParaRPr lang="en-US"/>
           </a:p>
@@ -2675,7 +2677,7 @@
           <a:p>
             <a:fld id="{5E193FAB-CF9D-2A41-8ED8-3EDE309B28B8}" type="datetimeFigureOut">
               <a:rPr lang="en-US" smtClean="0"/>
-              <a:t>11/30/21</a:t>
+              <a:t>12/14/21</a:t>
             </a:fld>
             <a:endParaRPr lang="en-US"/>
           </a:p>
@@ -2916,7 +2918,7 @@
           <a:p>
             <a:fld id="{5E193FAB-CF9D-2A41-8ED8-3EDE309B28B8}" type="datetimeFigureOut">
               <a:rPr lang="en-US" smtClean="0"/>
-              <a:t>11/30/21</a:t>
+              <a:t>12/14/21</a:t>
             </a:fld>
             <a:endParaRPr lang="en-US"/>
           </a:p>
@@ -3433,6 +3435,1239 @@
 </p:sld>
 </file>
 
+<file path=ppt/slides/slide10.xml><?xml version="1.0" encoding="utf-8"?>
+<p:sld xmlns:a="http://schemas.openxmlformats.org/drawingml/2006/main" xmlns:r="http://schemas.openxmlformats.org/officeDocument/2006/relationships" xmlns:p="http://schemas.openxmlformats.org/presentationml/2006/main">
+  <p:cSld>
+    <p:spTree>
+      <p:nvGrpSpPr>
+        <p:cNvPr id="1" name=""/>
+        <p:cNvGrpSpPr/>
+        <p:nvPr/>
+      </p:nvGrpSpPr>
+      <p:grpSpPr>
+        <a:xfrm>
+          <a:off x="0" y="0"/>
+          <a:ext cx="0" cy="0"/>
+          <a:chOff x="0" y="0"/>
+          <a:chExt cx="0" cy="0"/>
+        </a:xfrm>
+      </p:grpSpPr>
+      <p:sp>
+        <p:nvSpPr>
+          <p:cNvPr id="15" name="Rectangle 14">
+            <a:extLst>
+              <a:ext uri="{FF2B5EF4-FFF2-40B4-BE49-F238E27FC236}">
+                <a16:creationId xmlns:a16="http://schemas.microsoft.com/office/drawing/2014/main" id="{9A9ABCE7-A39B-D74F-A71F-22F9A819F55C}"/>
+              </a:ext>
+            </a:extLst>
+          </p:cNvPr>
+          <p:cNvSpPr/>
+          <p:nvPr/>
+        </p:nvSpPr>
+        <p:spPr>
+          <a:xfrm>
+            <a:off x="0" y="0"/>
+            <a:ext cx="12192000" cy="6858000"/>
+          </a:xfrm>
+          <a:prstGeom prst="rect">
+            <a:avLst/>
+          </a:prstGeom>
+          <a:solidFill>
+            <a:srgbClr val="606060"/>
+          </a:solidFill>
+        </p:spPr>
+        <p:style>
+          <a:lnRef idx="2">
+            <a:schemeClr val="accent1">
+              <a:shade val="50000"/>
+            </a:schemeClr>
+          </a:lnRef>
+          <a:fillRef idx="1">
+            <a:schemeClr val="accent1"/>
+          </a:fillRef>
+          <a:effectRef idx="0">
+            <a:schemeClr val="accent1"/>
+          </a:effectRef>
+          <a:fontRef idx="minor">
+            <a:schemeClr val="lt1"/>
+          </a:fontRef>
+        </p:style>
+        <p:txBody>
+          <a:bodyPr rtlCol="0" anchor="ctr"/>
+          <a:lstStyle/>
+          <a:p>
+            <a:pPr algn="ctr"/>
+            <a:endParaRPr lang="en-US"/>
+          </a:p>
+        </p:txBody>
+      </p:sp>
+      <p:sp>
+        <p:nvSpPr>
+          <p:cNvPr id="4" name="Oval 3">
+            <a:extLst>
+              <a:ext uri="{FF2B5EF4-FFF2-40B4-BE49-F238E27FC236}">
+                <a16:creationId xmlns:a16="http://schemas.microsoft.com/office/drawing/2014/main" id="{481B0862-5FE3-9B4B-BC61-40C8B433D6AB}"/>
+              </a:ext>
+            </a:extLst>
+          </p:cNvPr>
+          <p:cNvSpPr/>
+          <p:nvPr/>
+        </p:nvSpPr>
+        <p:spPr>
+          <a:xfrm>
+            <a:off x="3840047" y="1091282"/>
+            <a:ext cx="273269" cy="274768"/>
+          </a:xfrm>
+          <a:prstGeom prst="ellipse">
+            <a:avLst/>
+          </a:prstGeom>
+          <a:solidFill>
+            <a:srgbClr val="FF61AF"/>
+          </a:solidFill>
+          <a:ln w="12700">
+            <a:solidFill>
+              <a:schemeClr val="bg1"/>
+            </a:solidFill>
+          </a:ln>
+          <a:effectLst>
+            <a:outerShdw blurRad="76200" dist="12700" dir="2700000" algn="tl" rotWithShape="0">
+              <a:prstClr val="black"/>
+            </a:outerShdw>
+          </a:effectLst>
+        </p:spPr>
+        <p:style>
+          <a:lnRef idx="2">
+            <a:schemeClr val="accent1">
+              <a:shade val="50000"/>
+            </a:schemeClr>
+          </a:lnRef>
+          <a:fillRef idx="1">
+            <a:schemeClr val="accent1"/>
+          </a:fillRef>
+          <a:effectRef idx="0">
+            <a:schemeClr val="accent1"/>
+          </a:effectRef>
+          <a:fontRef idx="minor">
+            <a:schemeClr val="lt1"/>
+          </a:fontRef>
+        </p:style>
+        <p:txBody>
+          <a:bodyPr rtlCol="0" anchor="ctr"/>
+          <a:lstStyle/>
+          <a:p>
+            <a:pPr algn="ctr"/>
+            <a:r>
+              <a:rPr lang="en-US" sz="1200" b="1" dirty="0">
+                <a:latin typeface="Helvetica Neue" panose="02000503000000020004" pitchFamily="2" charset="0"/>
+                <a:ea typeface="Helvetica Neue" panose="02000503000000020004" pitchFamily="2" charset="0"/>
+                <a:cs typeface="Helvetica Neue" panose="02000503000000020004" pitchFamily="2" charset="0"/>
+              </a:rPr>
+              <a:t>1</a:t>
+            </a:r>
+          </a:p>
+        </p:txBody>
+      </p:sp>
+      <p:sp>
+        <p:nvSpPr>
+          <p:cNvPr id="5" name="Oval 4">
+            <a:extLst>
+              <a:ext uri="{FF2B5EF4-FFF2-40B4-BE49-F238E27FC236}">
+                <a16:creationId xmlns:a16="http://schemas.microsoft.com/office/drawing/2014/main" id="{297F11CA-4A28-374D-A09E-A0617E3C9FF8}"/>
+              </a:ext>
+            </a:extLst>
+          </p:cNvPr>
+          <p:cNvSpPr/>
+          <p:nvPr/>
+        </p:nvSpPr>
+        <p:spPr>
+          <a:xfrm>
+            <a:off x="3840039" y="1903450"/>
+            <a:ext cx="273269" cy="274768"/>
+          </a:xfrm>
+          <a:prstGeom prst="ellipse">
+            <a:avLst/>
+          </a:prstGeom>
+          <a:solidFill>
+            <a:srgbClr val="FF61AF"/>
+          </a:solidFill>
+          <a:ln w="12700">
+            <a:solidFill>
+              <a:schemeClr val="bg1"/>
+            </a:solidFill>
+          </a:ln>
+          <a:effectLst>
+            <a:outerShdw blurRad="76200" dist="12700" dir="2700000" algn="tl" rotWithShape="0">
+              <a:prstClr val="black"/>
+            </a:outerShdw>
+          </a:effectLst>
+        </p:spPr>
+        <p:style>
+          <a:lnRef idx="2">
+            <a:schemeClr val="accent1">
+              <a:shade val="50000"/>
+            </a:schemeClr>
+          </a:lnRef>
+          <a:fillRef idx="1">
+            <a:schemeClr val="accent1"/>
+          </a:fillRef>
+          <a:effectRef idx="0">
+            <a:schemeClr val="accent1"/>
+          </a:effectRef>
+          <a:fontRef idx="minor">
+            <a:schemeClr val="lt1"/>
+          </a:fontRef>
+        </p:style>
+        <p:txBody>
+          <a:bodyPr rtlCol="0" anchor="ctr"/>
+          <a:lstStyle/>
+          <a:p>
+            <a:pPr algn="ctr"/>
+            <a:r>
+              <a:rPr lang="en-US" sz="1200" b="1" dirty="0">
+                <a:latin typeface="Helvetica Neue" panose="02000503000000020004" pitchFamily="2" charset="0"/>
+                <a:ea typeface="Helvetica Neue" panose="02000503000000020004" pitchFamily="2" charset="0"/>
+                <a:cs typeface="Helvetica Neue" panose="02000503000000020004" pitchFamily="2" charset="0"/>
+              </a:rPr>
+              <a:t>2</a:t>
+            </a:r>
+          </a:p>
+        </p:txBody>
+      </p:sp>
+      <p:sp>
+        <p:nvSpPr>
+          <p:cNvPr id="6" name="Oval 5">
+            <a:extLst>
+              <a:ext uri="{FF2B5EF4-FFF2-40B4-BE49-F238E27FC236}">
+                <a16:creationId xmlns:a16="http://schemas.microsoft.com/office/drawing/2014/main" id="{4F5F5F24-60CE-3342-9DE6-24855CF519DA}"/>
+              </a:ext>
+            </a:extLst>
+          </p:cNvPr>
+          <p:cNvSpPr/>
+          <p:nvPr/>
+        </p:nvSpPr>
+        <p:spPr>
+          <a:xfrm>
+            <a:off x="3838763" y="2573470"/>
+            <a:ext cx="273269" cy="274768"/>
+          </a:xfrm>
+          <a:prstGeom prst="ellipse">
+            <a:avLst/>
+          </a:prstGeom>
+          <a:solidFill>
+            <a:srgbClr val="FF61AF"/>
+          </a:solidFill>
+          <a:ln w="12700">
+            <a:solidFill>
+              <a:schemeClr val="bg1"/>
+            </a:solidFill>
+          </a:ln>
+          <a:effectLst>
+            <a:outerShdw blurRad="76200" dist="12700" dir="2700000" algn="tl" rotWithShape="0">
+              <a:prstClr val="black"/>
+            </a:outerShdw>
+          </a:effectLst>
+        </p:spPr>
+        <p:style>
+          <a:lnRef idx="2">
+            <a:schemeClr val="accent1">
+              <a:shade val="50000"/>
+            </a:schemeClr>
+          </a:lnRef>
+          <a:fillRef idx="1">
+            <a:schemeClr val="accent1"/>
+          </a:fillRef>
+          <a:effectRef idx="0">
+            <a:schemeClr val="accent1"/>
+          </a:effectRef>
+          <a:fontRef idx="minor">
+            <a:schemeClr val="lt1"/>
+          </a:fontRef>
+        </p:style>
+        <p:txBody>
+          <a:bodyPr rtlCol="0" anchor="ctr"/>
+          <a:lstStyle/>
+          <a:p>
+            <a:pPr algn="ctr"/>
+            <a:r>
+              <a:rPr lang="en-US" sz="1200" b="1" dirty="0">
+                <a:latin typeface="Helvetica Neue" panose="02000503000000020004" pitchFamily="2" charset="0"/>
+                <a:ea typeface="Helvetica Neue" panose="02000503000000020004" pitchFamily="2" charset="0"/>
+                <a:cs typeface="Helvetica Neue" panose="02000503000000020004" pitchFamily="2" charset="0"/>
+              </a:rPr>
+              <a:t>3</a:t>
+            </a:r>
+          </a:p>
+        </p:txBody>
+      </p:sp>
+      <p:sp>
+        <p:nvSpPr>
+          <p:cNvPr id="7" name="Oval 6">
+            <a:extLst>
+              <a:ext uri="{FF2B5EF4-FFF2-40B4-BE49-F238E27FC236}">
+                <a16:creationId xmlns:a16="http://schemas.microsoft.com/office/drawing/2014/main" id="{7FAAAE00-C48F-6840-B6FD-474139F3E8EA}"/>
+              </a:ext>
+            </a:extLst>
+          </p:cNvPr>
+          <p:cNvSpPr/>
+          <p:nvPr/>
+        </p:nvSpPr>
+        <p:spPr>
+          <a:xfrm>
+            <a:off x="3832073" y="3043692"/>
+            <a:ext cx="273269" cy="274768"/>
+          </a:xfrm>
+          <a:prstGeom prst="ellipse">
+            <a:avLst/>
+          </a:prstGeom>
+          <a:solidFill>
+            <a:srgbClr val="FF61AF"/>
+          </a:solidFill>
+          <a:ln w="12700">
+            <a:solidFill>
+              <a:schemeClr val="bg1"/>
+            </a:solidFill>
+          </a:ln>
+          <a:effectLst>
+            <a:outerShdw blurRad="76200" dist="12700" dir="2700000" algn="tl" rotWithShape="0">
+              <a:prstClr val="black"/>
+            </a:outerShdw>
+          </a:effectLst>
+        </p:spPr>
+        <p:style>
+          <a:lnRef idx="2">
+            <a:schemeClr val="accent1">
+              <a:shade val="50000"/>
+            </a:schemeClr>
+          </a:lnRef>
+          <a:fillRef idx="1">
+            <a:schemeClr val="accent1"/>
+          </a:fillRef>
+          <a:effectRef idx="0">
+            <a:schemeClr val="accent1"/>
+          </a:effectRef>
+          <a:fontRef idx="minor">
+            <a:schemeClr val="lt1"/>
+          </a:fontRef>
+        </p:style>
+        <p:txBody>
+          <a:bodyPr rtlCol="0" anchor="ctr"/>
+          <a:lstStyle/>
+          <a:p>
+            <a:pPr algn="ctr"/>
+            <a:r>
+              <a:rPr lang="en-US" sz="1200" b="1" dirty="0">
+                <a:latin typeface="Helvetica Neue" panose="02000503000000020004" pitchFamily="2" charset="0"/>
+                <a:ea typeface="Helvetica Neue" panose="02000503000000020004" pitchFamily="2" charset="0"/>
+                <a:cs typeface="Helvetica Neue" panose="02000503000000020004" pitchFamily="2" charset="0"/>
+              </a:rPr>
+              <a:t>4</a:t>
+            </a:r>
+          </a:p>
+        </p:txBody>
+      </p:sp>
+      <p:sp>
+        <p:nvSpPr>
+          <p:cNvPr id="8" name="Oval 7">
+            <a:extLst>
+              <a:ext uri="{FF2B5EF4-FFF2-40B4-BE49-F238E27FC236}">
+                <a16:creationId xmlns:a16="http://schemas.microsoft.com/office/drawing/2014/main" id="{18210032-A00B-B644-B957-65FE21A42FB6}"/>
+              </a:ext>
+            </a:extLst>
+          </p:cNvPr>
+          <p:cNvSpPr/>
+          <p:nvPr/>
+        </p:nvSpPr>
+        <p:spPr>
+          <a:xfrm>
+            <a:off x="3836650" y="3487271"/>
+            <a:ext cx="273269" cy="274768"/>
+          </a:xfrm>
+          <a:prstGeom prst="ellipse">
+            <a:avLst/>
+          </a:prstGeom>
+          <a:solidFill>
+            <a:srgbClr val="FF61AF"/>
+          </a:solidFill>
+          <a:ln w="12700">
+            <a:solidFill>
+              <a:schemeClr val="bg1"/>
+            </a:solidFill>
+          </a:ln>
+          <a:effectLst>
+            <a:outerShdw blurRad="76200" dist="12700" dir="2700000" algn="tl" rotWithShape="0">
+              <a:prstClr val="black"/>
+            </a:outerShdw>
+          </a:effectLst>
+        </p:spPr>
+        <p:style>
+          <a:lnRef idx="2">
+            <a:schemeClr val="accent1">
+              <a:shade val="50000"/>
+            </a:schemeClr>
+          </a:lnRef>
+          <a:fillRef idx="1">
+            <a:schemeClr val="accent1"/>
+          </a:fillRef>
+          <a:effectRef idx="0">
+            <a:schemeClr val="accent1"/>
+          </a:effectRef>
+          <a:fontRef idx="minor">
+            <a:schemeClr val="lt1"/>
+          </a:fontRef>
+        </p:style>
+        <p:txBody>
+          <a:bodyPr rtlCol="0" anchor="ctr"/>
+          <a:lstStyle/>
+          <a:p>
+            <a:pPr algn="ctr"/>
+            <a:r>
+              <a:rPr lang="en-US" sz="1200" b="1" dirty="0">
+                <a:latin typeface="Helvetica Neue" panose="02000503000000020004" pitchFamily="2" charset="0"/>
+                <a:ea typeface="Helvetica Neue" panose="02000503000000020004" pitchFamily="2" charset="0"/>
+                <a:cs typeface="Helvetica Neue" panose="02000503000000020004" pitchFamily="2" charset="0"/>
+              </a:rPr>
+              <a:t>5</a:t>
+            </a:r>
+          </a:p>
+        </p:txBody>
+      </p:sp>
+      <p:sp>
+        <p:nvSpPr>
+          <p:cNvPr id="9" name="Oval 8">
+            <a:extLst>
+              <a:ext uri="{FF2B5EF4-FFF2-40B4-BE49-F238E27FC236}">
+                <a16:creationId xmlns:a16="http://schemas.microsoft.com/office/drawing/2014/main" id="{7F822D7C-E19C-954B-A21A-F0741CF32DF2}"/>
+              </a:ext>
+            </a:extLst>
+          </p:cNvPr>
+          <p:cNvSpPr/>
+          <p:nvPr/>
+        </p:nvSpPr>
+        <p:spPr>
+          <a:xfrm>
+            <a:off x="3838765" y="3954875"/>
+            <a:ext cx="273269" cy="274768"/>
+          </a:xfrm>
+          <a:prstGeom prst="ellipse">
+            <a:avLst/>
+          </a:prstGeom>
+          <a:solidFill>
+            <a:srgbClr val="FF61AF"/>
+          </a:solidFill>
+          <a:ln w="12700">
+            <a:solidFill>
+              <a:schemeClr val="bg1"/>
+            </a:solidFill>
+          </a:ln>
+          <a:effectLst>
+            <a:outerShdw blurRad="76200" dist="12700" dir="2700000" algn="tl" rotWithShape="0">
+              <a:prstClr val="black"/>
+            </a:outerShdw>
+          </a:effectLst>
+        </p:spPr>
+        <p:style>
+          <a:lnRef idx="2">
+            <a:schemeClr val="accent1">
+              <a:shade val="50000"/>
+            </a:schemeClr>
+          </a:lnRef>
+          <a:fillRef idx="1">
+            <a:schemeClr val="accent1"/>
+          </a:fillRef>
+          <a:effectRef idx="0">
+            <a:schemeClr val="accent1"/>
+          </a:effectRef>
+          <a:fontRef idx="minor">
+            <a:schemeClr val="lt1"/>
+          </a:fontRef>
+        </p:style>
+        <p:txBody>
+          <a:bodyPr rtlCol="0" anchor="ctr"/>
+          <a:lstStyle/>
+          <a:p>
+            <a:pPr algn="ctr"/>
+            <a:r>
+              <a:rPr lang="en-US" sz="1200" b="1" dirty="0">
+                <a:latin typeface="Helvetica Neue" panose="02000503000000020004" pitchFamily="2" charset="0"/>
+                <a:ea typeface="Helvetica Neue" panose="02000503000000020004" pitchFamily="2" charset="0"/>
+                <a:cs typeface="Helvetica Neue" panose="02000503000000020004" pitchFamily="2" charset="0"/>
+              </a:rPr>
+              <a:t>6</a:t>
+            </a:r>
+          </a:p>
+        </p:txBody>
+      </p:sp>
+      <p:sp>
+        <p:nvSpPr>
+          <p:cNvPr id="10" name="Oval 9">
+            <a:extLst>
+              <a:ext uri="{FF2B5EF4-FFF2-40B4-BE49-F238E27FC236}">
+                <a16:creationId xmlns:a16="http://schemas.microsoft.com/office/drawing/2014/main" id="{2E93B5BF-6E44-C643-8713-91FCA4A2E8C5}"/>
+              </a:ext>
+            </a:extLst>
+          </p:cNvPr>
+          <p:cNvSpPr/>
+          <p:nvPr/>
+        </p:nvSpPr>
+        <p:spPr>
+          <a:xfrm>
+            <a:off x="3838766" y="4281842"/>
+            <a:ext cx="273269" cy="274768"/>
+          </a:xfrm>
+          <a:prstGeom prst="ellipse">
+            <a:avLst/>
+          </a:prstGeom>
+          <a:solidFill>
+            <a:srgbClr val="FF61AF"/>
+          </a:solidFill>
+          <a:ln w="12700">
+            <a:solidFill>
+              <a:schemeClr val="bg1"/>
+            </a:solidFill>
+          </a:ln>
+          <a:effectLst>
+            <a:outerShdw blurRad="76200" dist="12700" dir="2700000" algn="tl" rotWithShape="0">
+              <a:prstClr val="black"/>
+            </a:outerShdw>
+          </a:effectLst>
+        </p:spPr>
+        <p:style>
+          <a:lnRef idx="2">
+            <a:schemeClr val="accent1">
+              <a:shade val="50000"/>
+            </a:schemeClr>
+          </a:lnRef>
+          <a:fillRef idx="1">
+            <a:schemeClr val="accent1"/>
+          </a:fillRef>
+          <a:effectRef idx="0">
+            <a:schemeClr val="accent1"/>
+          </a:effectRef>
+          <a:fontRef idx="minor">
+            <a:schemeClr val="lt1"/>
+          </a:fontRef>
+        </p:style>
+        <p:txBody>
+          <a:bodyPr rtlCol="0" anchor="ctr"/>
+          <a:lstStyle/>
+          <a:p>
+            <a:pPr algn="ctr"/>
+            <a:r>
+              <a:rPr lang="en-US" sz="1200" b="1" dirty="0">
+                <a:latin typeface="Helvetica Neue" panose="02000503000000020004" pitchFamily="2" charset="0"/>
+                <a:ea typeface="Helvetica Neue" panose="02000503000000020004" pitchFamily="2" charset="0"/>
+                <a:cs typeface="Helvetica Neue" panose="02000503000000020004" pitchFamily="2" charset="0"/>
+              </a:rPr>
+              <a:t>7</a:t>
+            </a:r>
+          </a:p>
+        </p:txBody>
+      </p:sp>
+      <p:sp>
+        <p:nvSpPr>
+          <p:cNvPr id="11" name="Oval 10">
+            <a:extLst>
+              <a:ext uri="{FF2B5EF4-FFF2-40B4-BE49-F238E27FC236}">
+                <a16:creationId xmlns:a16="http://schemas.microsoft.com/office/drawing/2014/main" id="{0B78891E-B6C1-6E48-85FE-433CE03B9BA7}"/>
+              </a:ext>
+            </a:extLst>
+          </p:cNvPr>
+          <p:cNvSpPr/>
+          <p:nvPr/>
+        </p:nvSpPr>
+        <p:spPr>
+          <a:xfrm>
+            <a:off x="3848888" y="4708425"/>
+            <a:ext cx="273269" cy="274768"/>
+          </a:xfrm>
+          <a:prstGeom prst="ellipse">
+            <a:avLst/>
+          </a:prstGeom>
+          <a:solidFill>
+            <a:srgbClr val="FF61AF"/>
+          </a:solidFill>
+          <a:ln w="12700">
+            <a:solidFill>
+              <a:schemeClr val="bg1"/>
+            </a:solidFill>
+          </a:ln>
+          <a:effectLst>
+            <a:outerShdw blurRad="76200" dist="12700" dir="2700000" algn="tl" rotWithShape="0">
+              <a:prstClr val="black"/>
+            </a:outerShdw>
+          </a:effectLst>
+        </p:spPr>
+        <p:style>
+          <a:lnRef idx="2">
+            <a:schemeClr val="accent1">
+              <a:shade val="50000"/>
+            </a:schemeClr>
+          </a:lnRef>
+          <a:fillRef idx="1">
+            <a:schemeClr val="accent1"/>
+          </a:fillRef>
+          <a:effectRef idx="0">
+            <a:schemeClr val="accent1"/>
+          </a:effectRef>
+          <a:fontRef idx="minor">
+            <a:schemeClr val="lt1"/>
+          </a:fontRef>
+        </p:style>
+        <p:txBody>
+          <a:bodyPr rtlCol="0" anchor="ctr"/>
+          <a:lstStyle/>
+          <a:p>
+            <a:pPr algn="ctr"/>
+            <a:r>
+              <a:rPr lang="en-US" sz="1200" b="1" dirty="0">
+                <a:latin typeface="Helvetica Neue" panose="02000503000000020004" pitchFamily="2" charset="0"/>
+                <a:ea typeface="Helvetica Neue" panose="02000503000000020004" pitchFamily="2" charset="0"/>
+                <a:cs typeface="Helvetica Neue" panose="02000503000000020004" pitchFamily="2" charset="0"/>
+              </a:rPr>
+              <a:t>8</a:t>
+            </a:r>
+          </a:p>
+        </p:txBody>
+      </p:sp>
+      <p:sp>
+        <p:nvSpPr>
+          <p:cNvPr id="12" name="Oval 11">
+            <a:extLst>
+              <a:ext uri="{FF2B5EF4-FFF2-40B4-BE49-F238E27FC236}">
+                <a16:creationId xmlns:a16="http://schemas.microsoft.com/office/drawing/2014/main" id="{1ECF5D27-7043-3C45-99A3-48ED5A83C719}"/>
+              </a:ext>
+            </a:extLst>
+          </p:cNvPr>
+          <p:cNvSpPr/>
+          <p:nvPr/>
+        </p:nvSpPr>
+        <p:spPr>
+          <a:xfrm>
+            <a:off x="3838764" y="5076132"/>
+            <a:ext cx="273269" cy="274768"/>
+          </a:xfrm>
+          <a:prstGeom prst="ellipse">
+            <a:avLst/>
+          </a:prstGeom>
+          <a:solidFill>
+            <a:srgbClr val="FF61AF"/>
+          </a:solidFill>
+          <a:ln w="12700">
+            <a:solidFill>
+              <a:schemeClr val="bg1"/>
+            </a:solidFill>
+          </a:ln>
+          <a:effectLst>
+            <a:outerShdw blurRad="76200" dist="12700" dir="2700000" algn="tl" rotWithShape="0">
+              <a:prstClr val="black"/>
+            </a:outerShdw>
+          </a:effectLst>
+        </p:spPr>
+        <p:style>
+          <a:lnRef idx="2">
+            <a:schemeClr val="accent1">
+              <a:shade val="50000"/>
+            </a:schemeClr>
+          </a:lnRef>
+          <a:fillRef idx="1">
+            <a:schemeClr val="accent1"/>
+          </a:fillRef>
+          <a:effectRef idx="0">
+            <a:schemeClr val="accent1"/>
+          </a:effectRef>
+          <a:fontRef idx="minor">
+            <a:schemeClr val="lt1"/>
+          </a:fontRef>
+        </p:style>
+        <p:txBody>
+          <a:bodyPr rtlCol="0" anchor="ctr"/>
+          <a:lstStyle/>
+          <a:p>
+            <a:pPr algn="ctr"/>
+            <a:r>
+              <a:rPr lang="en-US" sz="1200" b="1" dirty="0">
+                <a:latin typeface="Helvetica Neue" panose="02000503000000020004" pitchFamily="2" charset="0"/>
+                <a:ea typeface="Helvetica Neue" panose="02000503000000020004" pitchFamily="2" charset="0"/>
+                <a:cs typeface="Helvetica Neue" panose="02000503000000020004" pitchFamily="2" charset="0"/>
+              </a:rPr>
+              <a:t>9</a:t>
+            </a:r>
+          </a:p>
+        </p:txBody>
+      </p:sp>
+      <p:pic>
+        <p:nvPicPr>
+          <p:cNvPr id="14" name="Picture 13">
+            <a:extLst>
+              <a:ext uri="{FF2B5EF4-FFF2-40B4-BE49-F238E27FC236}">
+                <a16:creationId xmlns:a16="http://schemas.microsoft.com/office/drawing/2014/main" id="{7D7D3C3B-2FC4-9E4A-BC29-E8A1525AE243}"/>
+              </a:ext>
+            </a:extLst>
+          </p:cNvPr>
+          <p:cNvPicPr>
+            <a:picLocks noChangeAspect="1"/>
+          </p:cNvPicPr>
+          <p:nvPr/>
+        </p:nvPicPr>
+        <p:blipFill>
+          <a:blip r:embed="rId2"/>
+          <a:stretch>
+            <a:fillRect/>
+          </a:stretch>
+        </p:blipFill>
+        <p:spPr>
+          <a:xfrm>
+            <a:off x="4849904" y="674815"/>
+            <a:ext cx="5031431" cy="4862104"/>
+          </a:xfrm>
+          <a:prstGeom prst="rect">
+            <a:avLst/>
+          </a:prstGeom>
+        </p:spPr>
+      </p:pic>
+      <p:cxnSp>
+        <p:nvCxnSpPr>
+          <p:cNvPr id="3" name="Straight Connector 2">
+            <a:extLst>
+              <a:ext uri="{FF2B5EF4-FFF2-40B4-BE49-F238E27FC236}">
+                <a16:creationId xmlns:a16="http://schemas.microsoft.com/office/drawing/2014/main" id="{5AA1FDF9-201C-7D4C-B282-3D9FAB07BAA0}"/>
+              </a:ext>
+            </a:extLst>
+          </p:cNvPr>
+          <p:cNvCxnSpPr>
+            <a:stCxn id="4" idx="6"/>
+          </p:cNvCxnSpPr>
+          <p:nvPr/>
+        </p:nvCxnSpPr>
+        <p:spPr>
+          <a:xfrm flipV="1">
+            <a:off x="4113316" y="1226522"/>
+            <a:ext cx="664167" cy="2144"/>
+          </a:xfrm>
+          <a:prstGeom prst="line">
+            <a:avLst/>
+          </a:prstGeom>
+          <a:ln w="25400">
+            <a:solidFill>
+              <a:schemeClr val="bg1"/>
+            </a:solidFill>
+          </a:ln>
+        </p:spPr>
+        <p:style>
+          <a:lnRef idx="1">
+            <a:schemeClr val="dk1"/>
+          </a:lnRef>
+          <a:fillRef idx="0">
+            <a:schemeClr val="dk1"/>
+          </a:fillRef>
+          <a:effectRef idx="0">
+            <a:schemeClr val="dk1"/>
+          </a:effectRef>
+          <a:fontRef idx="minor">
+            <a:schemeClr val="tx1"/>
+          </a:fontRef>
+        </p:style>
+      </p:cxnSp>
+      <p:cxnSp>
+        <p:nvCxnSpPr>
+          <p:cNvPr id="17" name="Straight Connector 16">
+            <a:extLst>
+              <a:ext uri="{FF2B5EF4-FFF2-40B4-BE49-F238E27FC236}">
+                <a16:creationId xmlns:a16="http://schemas.microsoft.com/office/drawing/2014/main" id="{0163D3A8-97A5-0643-8B2C-C3AD8E96BF97}"/>
+              </a:ext>
+            </a:extLst>
+          </p:cNvPr>
+          <p:cNvCxnSpPr/>
+          <p:nvPr/>
+        </p:nvCxnSpPr>
+        <p:spPr>
+          <a:xfrm flipV="1">
+            <a:off x="4112026" y="2038463"/>
+            <a:ext cx="664167" cy="2144"/>
+          </a:xfrm>
+          <a:prstGeom prst="line">
+            <a:avLst/>
+          </a:prstGeom>
+          <a:ln w="25400">
+            <a:solidFill>
+              <a:schemeClr val="bg1"/>
+            </a:solidFill>
+          </a:ln>
+        </p:spPr>
+        <p:style>
+          <a:lnRef idx="1">
+            <a:schemeClr val="dk1"/>
+          </a:lnRef>
+          <a:fillRef idx="0">
+            <a:schemeClr val="dk1"/>
+          </a:fillRef>
+          <a:effectRef idx="0">
+            <a:schemeClr val="dk1"/>
+          </a:effectRef>
+          <a:fontRef idx="minor">
+            <a:schemeClr val="tx1"/>
+          </a:fontRef>
+        </p:style>
+      </p:cxnSp>
+      <p:cxnSp>
+        <p:nvCxnSpPr>
+          <p:cNvPr id="21" name="Straight Connector 20">
+            <a:extLst>
+              <a:ext uri="{FF2B5EF4-FFF2-40B4-BE49-F238E27FC236}">
+                <a16:creationId xmlns:a16="http://schemas.microsoft.com/office/drawing/2014/main" id="{C2E2A4B5-9CAB-DE41-9877-63D9252C71EE}"/>
+              </a:ext>
+            </a:extLst>
+          </p:cNvPr>
+          <p:cNvCxnSpPr/>
+          <p:nvPr/>
+        </p:nvCxnSpPr>
+        <p:spPr>
+          <a:xfrm flipV="1">
+            <a:off x="4112026" y="2708710"/>
+            <a:ext cx="664167" cy="2144"/>
+          </a:xfrm>
+          <a:prstGeom prst="line">
+            <a:avLst/>
+          </a:prstGeom>
+          <a:ln w="25400">
+            <a:solidFill>
+              <a:schemeClr val="bg1"/>
+            </a:solidFill>
+          </a:ln>
+        </p:spPr>
+        <p:style>
+          <a:lnRef idx="1">
+            <a:schemeClr val="dk1"/>
+          </a:lnRef>
+          <a:fillRef idx="0">
+            <a:schemeClr val="dk1"/>
+          </a:fillRef>
+          <a:effectRef idx="0">
+            <a:schemeClr val="dk1"/>
+          </a:effectRef>
+          <a:fontRef idx="minor">
+            <a:schemeClr val="tx1"/>
+          </a:fontRef>
+        </p:style>
+      </p:cxnSp>
+      <p:cxnSp>
+        <p:nvCxnSpPr>
+          <p:cNvPr id="22" name="Straight Connector 21">
+            <a:extLst>
+              <a:ext uri="{FF2B5EF4-FFF2-40B4-BE49-F238E27FC236}">
+                <a16:creationId xmlns:a16="http://schemas.microsoft.com/office/drawing/2014/main" id="{880B051E-6F60-9449-A7B0-D089758447D1}"/>
+              </a:ext>
+            </a:extLst>
+          </p:cNvPr>
+          <p:cNvCxnSpPr/>
+          <p:nvPr/>
+        </p:nvCxnSpPr>
+        <p:spPr>
+          <a:xfrm flipV="1">
+            <a:off x="4095216" y="3162212"/>
+            <a:ext cx="664167" cy="2144"/>
+          </a:xfrm>
+          <a:prstGeom prst="line">
+            <a:avLst/>
+          </a:prstGeom>
+          <a:ln w="25400">
+            <a:solidFill>
+              <a:schemeClr val="bg1"/>
+            </a:solidFill>
+          </a:ln>
+        </p:spPr>
+        <p:style>
+          <a:lnRef idx="1">
+            <a:schemeClr val="dk1"/>
+          </a:lnRef>
+          <a:fillRef idx="0">
+            <a:schemeClr val="dk1"/>
+          </a:fillRef>
+          <a:effectRef idx="0">
+            <a:schemeClr val="dk1"/>
+          </a:effectRef>
+          <a:fontRef idx="minor">
+            <a:schemeClr val="tx1"/>
+          </a:fontRef>
+        </p:style>
+      </p:cxnSp>
+      <p:cxnSp>
+        <p:nvCxnSpPr>
+          <p:cNvPr id="23" name="Straight Connector 22">
+            <a:extLst>
+              <a:ext uri="{FF2B5EF4-FFF2-40B4-BE49-F238E27FC236}">
+                <a16:creationId xmlns:a16="http://schemas.microsoft.com/office/drawing/2014/main" id="{95D861E1-ABEF-0A44-91DC-4E6B289DF6B2}"/>
+              </a:ext>
+            </a:extLst>
+          </p:cNvPr>
+          <p:cNvCxnSpPr/>
+          <p:nvPr/>
+        </p:nvCxnSpPr>
+        <p:spPr>
+          <a:xfrm flipV="1">
+            <a:off x="4109912" y="3621018"/>
+            <a:ext cx="664167" cy="2144"/>
+          </a:xfrm>
+          <a:prstGeom prst="line">
+            <a:avLst/>
+          </a:prstGeom>
+          <a:ln w="25400">
+            <a:solidFill>
+              <a:schemeClr val="bg1"/>
+            </a:solidFill>
+          </a:ln>
+        </p:spPr>
+        <p:style>
+          <a:lnRef idx="1">
+            <a:schemeClr val="dk1"/>
+          </a:lnRef>
+          <a:fillRef idx="0">
+            <a:schemeClr val="dk1"/>
+          </a:fillRef>
+          <a:effectRef idx="0">
+            <a:schemeClr val="dk1"/>
+          </a:effectRef>
+          <a:fontRef idx="minor">
+            <a:schemeClr val="tx1"/>
+          </a:fontRef>
+        </p:style>
+      </p:cxnSp>
+      <p:cxnSp>
+        <p:nvCxnSpPr>
+          <p:cNvPr id="24" name="Straight Connector 23">
+            <a:extLst>
+              <a:ext uri="{FF2B5EF4-FFF2-40B4-BE49-F238E27FC236}">
+                <a16:creationId xmlns:a16="http://schemas.microsoft.com/office/drawing/2014/main" id="{190B113A-F754-3749-9CC2-D998A63D206D}"/>
+              </a:ext>
+            </a:extLst>
+          </p:cNvPr>
+          <p:cNvCxnSpPr/>
+          <p:nvPr/>
+        </p:nvCxnSpPr>
+        <p:spPr>
+          <a:xfrm flipV="1">
+            <a:off x="4112029" y="4101627"/>
+            <a:ext cx="664167" cy="2144"/>
+          </a:xfrm>
+          <a:prstGeom prst="line">
+            <a:avLst/>
+          </a:prstGeom>
+          <a:ln w="25400">
+            <a:solidFill>
+              <a:schemeClr val="bg1"/>
+            </a:solidFill>
+          </a:ln>
+        </p:spPr>
+        <p:style>
+          <a:lnRef idx="1">
+            <a:schemeClr val="dk1"/>
+          </a:lnRef>
+          <a:fillRef idx="0">
+            <a:schemeClr val="dk1"/>
+          </a:fillRef>
+          <a:effectRef idx="0">
+            <a:schemeClr val="dk1"/>
+          </a:effectRef>
+          <a:fontRef idx="minor">
+            <a:schemeClr val="tx1"/>
+          </a:fontRef>
+        </p:style>
+      </p:cxnSp>
+      <p:cxnSp>
+        <p:nvCxnSpPr>
+          <p:cNvPr id="25" name="Straight Connector 24">
+            <a:extLst>
+              <a:ext uri="{FF2B5EF4-FFF2-40B4-BE49-F238E27FC236}">
+                <a16:creationId xmlns:a16="http://schemas.microsoft.com/office/drawing/2014/main" id="{47AB24D4-B205-6D45-BC18-3B88ED1DB45B}"/>
+              </a:ext>
+            </a:extLst>
+          </p:cNvPr>
+          <p:cNvCxnSpPr/>
+          <p:nvPr/>
+        </p:nvCxnSpPr>
+        <p:spPr>
+          <a:xfrm flipV="1">
+            <a:off x="4112028" y="4411774"/>
+            <a:ext cx="664167" cy="2144"/>
+          </a:xfrm>
+          <a:prstGeom prst="line">
+            <a:avLst/>
+          </a:prstGeom>
+          <a:ln w="25400">
+            <a:solidFill>
+              <a:schemeClr val="bg1"/>
+            </a:solidFill>
+          </a:ln>
+        </p:spPr>
+        <p:style>
+          <a:lnRef idx="1">
+            <a:schemeClr val="dk1"/>
+          </a:lnRef>
+          <a:fillRef idx="0">
+            <a:schemeClr val="dk1"/>
+          </a:fillRef>
+          <a:effectRef idx="0">
+            <a:schemeClr val="dk1"/>
+          </a:effectRef>
+          <a:fontRef idx="minor">
+            <a:schemeClr val="tx1"/>
+          </a:fontRef>
+        </p:style>
+      </p:cxnSp>
+      <p:cxnSp>
+        <p:nvCxnSpPr>
+          <p:cNvPr id="26" name="Straight Connector 25">
+            <a:extLst>
+              <a:ext uri="{FF2B5EF4-FFF2-40B4-BE49-F238E27FC236}">
+                <a16:creationId xmlns:a16="http://schemas.microsoft.com/office/drawing/2014/main" id="{F744B69F-26EA-8C40-949F-80255D5764E9}"/>
+              </a:ext>
+            </a:extLst>
+          </p:cNvPr>
+          <p:cNvCxnSpPr/>
+          <p:nvPr/>
+        </p:nvCxnSpPr>
+        <p:spPr>
+          <a:xfrm flipV="1">
+            <a:off x="4112027" y="4866124"/>
+            <a:ext cx="664167" cy="2144"/>
+          </a:xfrm>
+          <a:prstGeom prst="line">
+            <a:avLst/>
+          </a:prstGeom>
+          <a:ln w="25400">
+            <a:solidFill>
+              <a:schemeClr val="bg1"/>
+            </a:solidFill>
+          </a:ln>
+        </p:spPr>
+        <p:style>
+          <a:lnRef idx="1">
+            <a:schemeClr val="dk1"/>
+          </a:lnRef>
+          <a:fillRef idx="0">
+            <a:schemeClr val="dk1"/>
+          </a:fillRef>
+          <a:effectRef idx="0">
+            <a:schemeClr val="dk1"/>
+          </a:effectRef>
+          <a:fontRef idx="minor">
+            <a:schemeClr val="tx1"/>
+          </a:fontRef>
+        </p:style>
+      </p:cxnSp>
+      <p:cxnSp>
+        <p:nvCxnSpPr>
+          <p:cNvPr id="27" name="Straight Connector 26">
+            <a:extLst>
+              <a:ext uri="{FF2B5EF4-FFF2-40B4-BE49-F238E27FC236}">
+                <a16:creationId xmlns:a16="http://schemas.microsoft.com/office/drawing/2014/main" id="{93ECA7C7-C525-0942-B666-346F083C10BA}"/>
+              </a:ext>
+            </a:extLst>
+          </p:cNvPr>
+          <p:cNvCxnSpPr/>
+          <p:nvPr/>
+        </p:nvCxnSpPr>
+        <p:spPr>
+          <a:xfrm flipV="1">
+            <a:off x="4112026" y="5207562"/>
+            <a:ext cx="664167" cy="2144"/>
+          </a:xfrm>
+          <a:prstGeom prst="line">
+            <a:avLst/>
+          </a:prstGeom>
+          <a:ln w="25400">
+            <a:solidFill>
+              <a:schemeClr val="bg1"/>
+            </a:solidFill>
+          </a:ln>
+        </p:spPr>
+        <p:style>
+          <a:lnRef idx="1">
+            <a:schemeClr val="dk1"/>
+          </a:lnRef>
+          <a:fillRef idx="0">
+            <a:schemeClr val="dk1"/>
+          </a:fillRef>
+          <a:effectRef idx="0">
+            <a:schemeClr val="dk1"/>
+          </a:effectRef>
+          <a:fontRef idx="minor">
+            <a:schemeClr val="tx1"/>
+          </a:fontRef>
+        </p:style>
+      </p:cxnSp>
+      <p:pic>
+        <p:nvPicPr>
+          <p:cNvPr id="32" name="Picture 31">
+            <a:extLst>
+              <a:ext uri="{FF2B5EF4-FFF2-40B4-BE49-F238E27FC236}">
+                <a16:creationId xmlns:a16="http://schemas.microsoft.com/office/drawing/2014/main" id="{24746DF3-ECA5-984B-8324-22A4D144DB71}"/>
+              </a:ext>
+            </a:extLst>
+          </p:cNvPr>
+          <p:cNvPicPr>
+            <a:picLocks noChangeAspect="1"/>
+          </p:cNvPicPr>
+          <p:nvPr/>
+        </p:nvPicPr>
+        <p:blipFill>
+          <a:blip r:embed="rId3"/>
+          <a:stretch>
+            <a:fillRect/>
+          </a:stretch>
+        </p:blipFill>
+        <p:spPr>
+          <a:xfrm>
+            <a:off x="4862929" y="674815"/>
+            <a:ext cx="5350887" cy="4862104"/>
+          </a:xfrm>
+          <a:prstGeom prst="rect">
+            <a:avLst/>
+          </a:prstGeom>
+        </p:spPr>
+      </p:pic>
+      <p:cxnSp>
+        <p:nvCxnSpPr>
+          <p:cNvPr id="36" name="Straight Connector 35">
+            <a:extLst>
+              <a:ext uri="{FF2B5EF4-FFF2-40B4-BE49-F238E27FC236}">
+                <a16:creationId xmlns:a16="http://schemas.microsoft.com/office/drawing/2014/main" id="{FC76962E-93B9-F548-9EED-030852E099B4}"/>
+              </a:ext>
+            </a:extLst>
+          </p:cNvPr>
+          <p:cNvCxnSpPr>
+            <a:cxnSpLocks/>
+          </p:cNvCxnSpPr>
+          <p:nvPr/>
+        </p:nvCxnSpPr>
+        <p:spPr>
+          <a:xfrm>
+            <a:off x="4774079" y="3373787"/>
+            <a:ext cx="0" cy="494461"/>
+          </a:xfrm>
+          <a:prstGeom prst="line">
+            <a:avLst/>
+          </a:prstGeom>
+          <a:ln w="25400">
+            <a:solidFill>
+              <a:schemeClr val="bg1"/>
+            </a:solidFill>
+          </a:ln>
+        </p:spPr>
+        <p:style>
+          <a:lnRef idx="1">
+            <a:schemeClr val="dk1"/>
+          </a:lnRef>
+          <a:fillRef idx="0">
+            <a:schemeClr val="dk1"/>
+          </a:fillRef>
+          <a:effectRef idx="0">
+            <a:schemeClr val="dk1"/>
+          </a:effectRef>
+          <a:fontRef idx="minor">
+            <a:schemeClr val="tx1"/>
+          </a:fontRef>
+        </p:style>
+      </p:cxnSp>
+      <p:cxnSp>
+        <p:nvCxnSpPr>
+          <p:cNvPr id="37" name="Straight Connector 36">
+            <a:extLst>
+              <a:ext uri="{FF2B5EF4-FFF2-40B4-BE49-F238E27FC236}">
+                <a16:creationId xmlns:a16="http://schemas.microsoft.com/office/drawing/2014/main" id="{F8EE14D8-47A9-694E-95AB-71BA2B949FD7}"/>
+              </a:ext>
+            </a:extLst>
+          </p:cNvPr>
+          <p:cNvCxnSpPr>
+            <a:cxnSpLocks/>
+          </p:cNvCxnSpPr>
+          <p:nvPr/>
+        </p:nvCxnSpPr>
+        <p:spPr>
+          <a:xfrm>
+            <a:off x="4768962" y="2461479"/>
+            <a:ext cx="0" cy="494461"/>
+          </a:xfrm>
+          <a:prstGeom prst="line">
+            <a:avLst/>
+          </a:prstGeom>
+          <a:ln w="25400">
+            <a:solidFill>
+              <a:schemeClr val="bg1"/>
+            </a:solidFill>
+          </a:ln>
+        </p:spPr>
+        <p:style>
+          <a:lnRef idx="1">
+            <a:schemeClr val="dk1"/>
+          </a:lnRef>
+          <a:fillRef idx="0">
+            <a:schemeClr val="dk1"/>
+          </a:fillRef>
+          <a:effectRef idx="0">
+            <a:schemeClr val="dk1"/>
+          </a:effectRef>
+          <a:fontRef idx="minor">
+            <a:schemeClr val="tx1"/>
+          </a:fontRef>
+        </p:style>
+      </p:cxnSp>
+      <p:cxnSp>
+        <p:nvCxnSpPr>
+          <p:cNvPr id="38" name="Straight Connector 37">
+            <a:extLst>
+              <a:ext uri="{FF2B5EF4-FFF2-40B4-BE49-F238E27FC236}">
+                <a16:creationId xmlns:a16="http://schemas.microsoft.com/office/drawing/2014/main" id="{79580D74-7CD8-B24D-8B70-3CB5FA16ACA3}"/>
+              </a:ext>
+            </a:extLst>
+          </p:cNvPr>
+          <p:cNvCxnSpPr>
+            <a:cxnSpLocks/>
+          </p:cNvCxnSpPr>
+          <p:nvPr/>
+        </p:nvCxnSpPr>
+        <p:spPr>
+          <a:xfrm>
+            <a:off x="4768962" y="1806400"/>
+            <a:ext cx="0" cy="494461"/>
+          </a:xfrm>
+          <a:prstGeom prst="line">
+            <a:avLst/>
+          </a:prstGeom>
+          <a:ln w="25400">
+            <a:solidFill>
+              <a:schemeClr val="bg1"/>
+            </a:solidFill>
+          </a:ln>
+        </p:spPr>
+        <p:style>
+          <a:lnRef idx="1">
+            <a:schemeClr val="dk1"/>
+          </a:lnRef>
+          <a:fillRef idx="0">
+            <a:schemeClr val="dk1"/>
+          </a:fillRef>
+          <a:effectRef idx="0">
+            <a:schemeClr val="dk1"/>
+          </a:effectRef>
+          <a:fontRef idx="minor">
+            <a:schemeClr val="tx1"/>
+          </a:fontRef>
+        </p:style>
+      </p:cxnSp>
+    </p:spTree>
+    <p:extLst>
+      <p:ext uri="{BB962C8B-B14F-4D97-AF65-F5344CB8AC3E}">
+        <p14:creationId xmlns:p14="http://schemas.microsoft.com/office/powerpoint/2010/main" val="1525176841"/>
+      </p:ext>
+    </p:extLst>
+  </p:cSld>
+  <p:clrMapOvr>
+    <a:masterClrMapping/>
+  </p:clrMapOvr>
+</p:sld>
+</file>
+
 <file path=ppt/slides/slide2.xml><?xml version="1.0" encoding="utf-8"?>
 <p:sld xmlns:a="http://schemas.openxmlformats.org/drawingml/2006/main" xmlns:r="http://schemas.openxmlformats.org/officeDocument/2006/relationships" xmlns:p="http://schemas.openxmlformats.org/presentationml/2006/main">
   <p:cSld>
@@ -4693,6 +5928,229 @@
     <p:extLst>
       <p:ext uri="{BB962C8B-B14F-4D97-AF65-F5344CB8AC3E}">
         <p14:creationId xmlns:p14="http://schemas.microsoft.com/office/powerpoint/2010/main" val="1013854638"/>
+      </p:ext>
+    </p:extLst>
+  </p:cSld>
+  <p:clrMapOvr>
+    <a:masterClrMapping/>
+  </p:clrMapOvr>
+</p:sld>
+</file>
+
+<file path=ppt/slides/slide9.xml><?xml version="1.0" encoding="utf-8"?>
+<p:sld xmlns:a="http://schemas.openxmlformats.org/drawingml/2006/main" xmlns:r="http://schemas.openxmlformats.org/officeDocument/2006/relationships" xmlns:p="http://schemas.openxmlformats.org/presentationml/2006/main">
+  <p:cSld>
+    <p:spTree>
+      <p:nvGrpSpPr>
+        <p:cNvPr id="1" name=""/>
+        <p:cNvGrpSpPr/>
+        <p:nvPr/>
+      </p:nvGrpSpPr>
+      <p:grpSpPr>
+        <a:xfrm>
+          <a:off x="0" y="0"/>
+          <a:ext cx="0" cy="0"/>
+          <a:chOff x="0" y="0"/>
+          <a:chExt cx="0" cy="0"/>
+        </a:xfrm>
+      </p:grpSpPr>
+      <p:sp>
+        <p:nvSpPr>
+          <p:cNvPr id="6" name="Rectangle 5">
+            <a:extLst>
+              <a:ext uri="{FF2B5EF4-FFF2-40B4-BE49-F238E27FC236}">
+                <a16:creationId xmlns:a16="http://schemas.microsoft.com/office/drawing/2014/main" id="{B25438E1-6F41-404B-80AA-9F83AE72AA20}"/>
+              </a:ext>
+            </a:extLst>
+          </p:cNvPr>
+          <p:cNvSpPr/>
+          <p:nvPr/>
+        </p:nvSpPr>
+        <p:spPr>
+          <a:xfrm>
+            <a:off x="0" y="0"/>
+            <a:ext cx="12192000" cy="6858000"/>
+          </a:xfrm>
+          <a:prstGeom prst="rect">
+            <a:avLst/>
+          </a:prstGeom>
+          <a:solidFill>
+            <a:srgbClr val="606060"/>
+          </a:solidFill>
+        </p:spPr>
+        <p:style>
+          <a:lnRef idx="2">
+            <a:schemeClr val="accent1">
+              <a:shade val="50000"/>
+            </a:schemeClr>
+          </a:lnRef>
+          <a:fillRef idx="1">
+            <a:schemeClr val="accent1"/>
+          </a:fillRef>
+          <a:effectRef idx="0">
+            <a:schemeClr val="accent1"/>
+          </a:effectRef>
+          <a:fontRef idx="minor">
+            <a:schemeClr val="lt1"/>
+          </a:fontRef>
+        </p:style>
+        <p:txBody>
+          <a:bodyPr rtlCol="0" anchor="ctr"/>
+          <a:lstStyle/>
+          <a:p>
+            <a:pPr algn="ctr"/>
+            <a:endParaRPr lang="en-US"/>
+          </a:p>
+        </p:txBody>
+      </p:sp>
+      <p:pic>
+        <p:nvPicPr>
+          <p:cNvPr id="3" name="Picture 2">
+            <a:extLst>
+              <a:ext uri="{FF2B5EF4-FFF2-40B4-BE49-F238E27FC236}">
+                <a16:creationId xmlns:a16="http://schemas.microsoft.com/office/drawing/2014/main" id="{6ADEEEBE-5451-3047-B324-0E124C0D5FDB}"/>
+              </a:ext>
+            </a:extLst>
+          </p:cNvPr>
+          <p:cNvPicPr>
+            <a:picLocks noChangeAspect="1"/>
+          </p:cNvPicPr>
+          <p:nvPr/>
+        </p:nvPicPr>
+        <p:blipFill>
+          <a:blip r:embed="rId2"/>
+          <a:stretch>
+            <a:fillRect/>
+          </a:stretch>
+        </p:blipFill>
+        <p:spPr>
+          <a:xfrm>
+            <a:off x="4076700" y="1028701"/>
+            <a:ext cx="2557348" cy="3039866"/>
+          </a:xfrm>
+          <a:prstGeom prst="rect">
+            <a:avLst/>
+          </a:prstGeom>
+        </p:spPr>
+      </p:pic>
+      <p:sp>
+        <p:nvSpPr>
+          <p:cNvPr id="4" name="Rounded Rectangle 3">
+            <a:extLst>
+              <a:ext uri="{FF2B5EF4-FFF2-40B4-BE49-F238E27FC236}">
+                <a16:creationId xmlns:a16="http://schemas.microsoft.com/office/drawing/2014/main" id="{97EBFC6A-84BC-3948-B243-17C4A11C1134}"/>
+              </a:ext>
+            </a:extLst>
+          </p:cNvPr>
+          <p:cNvSpPr/>
+          <p:nvPr/>
+        </p:nvSpPr>
+        <p:spPr>
+          <a:xfrm>
+            <a:off x="4076700" y="3384550"/>
+            <a:ext cx="859340" cy="266700"/>
+          </a:xfrm>
+          <a:prstGeom prst="roundRect">
+            <a:avLst/>
+          </a:prstGeom>
+          <a:noFill/>
+          <a:ln w="25400">
+            <a:solidFill>
+              <a:srgbClr val="FF61AF"/>
+            </a:solidFill>
+          </a:ln>
+          <a:effectLst>
+            <a:outerShdw blurRad="101600" dist="25400" dir="2700000" algn="tl" rotWithShape="0">
+              <a:prstClr val="black"/>
+            </a:outerShdw>
+          </a:effectLst>
+        </p:spPr>
+        <p:style>
+          <a:lnRef idx="2">
+            <a:schemeClr val="accent1">
+              <a:shade val="50000"/>
+            </a:schemeClr>
+          </a:lnRef>
+          <a:fillRef idx="1">
+            <a:schemeClr val="accent1"/>
+          </a:fillRef>
+          <a:effectRef idx="0">
+            <a:schemeClr val="accent1"/>
+          </a:effectRef>
+          <a:fontRef idx="minor">
+            <a:schemeClr val="lt1"/>
+          </a:fontRef>
+        </p:style>
+        <p:txBody>
+          <a:bodyPr rtlCol="0" anchor="ctr"/>
+          <a:lstStyle/>
+          <a:p>
+            <a:pPr algn="ctr"/>
+            <a:endParaRPr lang="en-US"/>
+          </a:p>
+        </p:txBody>
+      </p:sp>
+      <p:sp>
+        <p:nvSpPr>
+          <p:cNvPr id="5" name="Rounded Rectangle 4">
+            <a:extLst>
+              <a:ext uri="{FF2B5EF4-FFF2-40B4-BE49-F238E27FC236}">
+                <a16:creationId xmlns:a16="http://schemas.microsoft.com/office/drawing/2014/main" id="{3664810F-7DE8-394B-AE74-11446C590AA0}"/>
+              </a:ext>
+            </a:extLst>
+          </p:cNvPr>
+          <p:cNvSpPr/>
+          <p:nvPr/>
+        </p:nvSpPr>
+        <p:spPr>
+          <a:xfrm>
+            <a:off x="4076700" y="1028701"/>
+            <a:ext cx="943721" cy="220384"/>
+          </a:xfrm>
+          <a:prstGeom prst="roundRect">
+            <a:avLst/>
+          </a:prstGeom>
+          <a:noFill/>
+          <a:ln w="25400">
+            <a:solidFill>
+              <a:srgbClr val="FF61AF"/>
+            </a:solidFill>
+          </a:ln>
+          <a:effectLst>
+            <a:outerShdw blurRad="101600" dist="25400" dir="2700000" algn="tl" rotWithShape="0">
+              <a:prstClr val="black"/>
+            </a:outerShdw>
+          </a:effectLst>
+        </p:spPr>
+        <p:style>
+          <a:lnRef idx="2">
+            <a:schemeClr val="accent1">
+              <a:shade val="50000"/>
+            </a:schemeClr>
+          </a:lnRef>
+          <a:fillRef idx="1">
+            <a:schemeClr val="accent1"/>
+          </a:fillRef>
+          <a:effectRef idx="0">
+            <a:schemeClr val="accent1"/>
+          </a:effectRef>
+          <a:fontRef idx="minor">
+            <a:schemeClr val="lt1"/>
+          </a:fontRef>
+        </p:style>
+        <p:txBody>
+          <a:bodyPr rtlCol="0" anchor="ctr"/>
+          <a:lstStyle/>
+          <a:p>
+            <a:pPr algn="ctr"/>
+            <a:endParaRPr lang="en-US"/>
+          </a:p>
+        </p:txBody>
+      </p:sp>
+    </p:spTree>
+    <p:extLst>
+      <p:ext uri="{BB962C8B-B14F-4D97-AF65-F5344CB8AC3E}">
+        <p14:creationId xmlns:p14="http://schemas.microsoft.com/office/powerpoint/2010/main" val="3974927229"/>
       </p:ext>
     </p:extLst>
   </p:cSld>

</xml_diff>

<commit_message>
Updated more images following CR feedback
</commit_message>
<xml_diff>
--- a/docs/user-guide/image-source/Images.pptx
+++ b/docs/user-guide/image-source/Images.pptx
@@ -15,6 +15,8 @@
     <p:sldId id="264" r:id="rId9"/>
     <p:sldId id="265" r:id="rId10"/>
     <p:sldId id="266" r:id="rId11"/>
+    <p:sldId id="267" r:id="rId12"/>
+    <p:sldId id="268" r:id="rId13"/>
   </p:sldIdLst>
   <p:sldSz cx="12192000" cy="6858000"/>
   <p:notesSz cx="6858000" cy="9144000"/>
@@ -3452,6 +3454,66 @@
           <a:chExt cx="0" cy="0"/>
         </a:xfrm>
       </p:grpSpPr>
+      <p:pic>
+        <p:nvPicPr>
+          <p:cNvPr id="14" name="Picture 13">
+            <a:extLst>
+              <a:ext uri="{FF2B5EF4-FFF2-40B4-BE49-F238E27FC236}">
+                <a16:creationId xmlns:a16="http://schemas.microsoft.com/office/drawing/2014/main" id="{7D7D3C3B-2FC4-9E4A-BC29-E8A1525AE243}"/>
+              </a:ext>
+            </a:extLst>
+          </p:cNvPr>
+          <p:cNvPicPr>
+            <a:picLocks noChangeAspect="1"/>
+          </p:cNvPicPr>
+          <p:nvPr/>
+        </p:nvPicPr>
+        <p:blipFill>
+          <a:blip r:embed="rId2"/>
+          <a:stretch>
+            <a:fillRect/>
+          </a:stretch>
+        </p:blipFill>
+        <p:spPr>
+          <a:xfrm>
+            <a:off x="4849904" y="674815"/>
+            <a:ext cx="5031431" cy="4862104"/>
+          </a:xfrm>
+          <a:prstGeom prst="rect">
+            <a:avLst/>
+          </a:prstGeom>
+        </p:spPr>
+      </p:pic>
+      <p:pic>
+        <p:nvPicPr>
+          <p:cNvPr id="32" name="Picture 31">
+            <a:extLst>
+              <a:ext uri="{FF2B5EF4-FFF2-40B4-BE49-F238E27FC236}">
+                <a16:creationId xmlns:a16="http://schemas.microsoft.com/office/drawing/2014/main" id="{24746DF3-ECA5-984B-8324-22A4D144DB71}"/>
+              </a:ext>
+            </a:extLst>
+          </p:cNvPr>
+          <p:cNvPicPr>
+            <a:picLocks noChangeAspect="1"/>
+          </p:cNvPicPr>
+          <p:nvPr/>
+        </p:nvPicPr>
+        <p:blipFill>
+          <a:blip r:embed="rId3"/>
+          <a:stretch>
+            <a:fillRect/>
+          </a:stretch>
+        </p:blipFill>
+        <p:spPr>
+          <a:xfrm>
+            <a:off x="4862929" y="674815"/>
+            <a:ext cx="5350887" cy="4862104"/>
+          </a:xfrm>
+          <a:prstGeom prst="rect">
+            <a:avLst/>
+          </a:prstGeom>
+        </p:spPr>
+      </p:pic>
       <p:sp>
         <p:nvSpPr>
           <p:cNvPr id="15" name="Rectangle 14">
@@ -3581,7 +3643,7 @@
         </p:nvSpPr>
         <p:spPr>
           <a:xfrm>
-            <a:off x="3840039" y="1903450"/>
+            <a:off x="3850170" y="1881914"/>
             <a:ext cx="273269" cy="274768"/>
           </a:xfrm>
           <a:prstGeom prst="ellipse">
@@ -3767,10 +3829,10 @@
       </p:sp>
       <p:sp>
         <p:nvSpPr>
-          <p:cNvPr id="8" name="Oval 7">
-            <a:extLst>
-              <a:ext uri="{FF2B5EF4-FFF2-40B4-BE49-F238E27FC236}">
-                <a16:creationId xmlns:a16="http://schemas.microsoft.com/office/drawing/2014/main" id="{18210032-A00B-B644-B957-65FE21A42FB6}"/>
+          <p:cNvPr id="9" name="Oval 8">
+            <a:extLst>
+              <a:ext uri="{FF2B5EF4-FFF2-40B4-BE49-F238E27FC236}">
+                <a16:creationId xmlns:a16="http://schemas.microsoft.com/office/drawing/2014/main" id="{7F822D7C-E19C-954B-A21A-F0741CF32DF2}"/>
               </a:ext>
             </a:extLst>
           </p:cNvPr>
@@ -3779,7 +3841,7 @@
         </p:nvSpPr>
         <p:spPr>
           <a:xfrm>
-            <a:off x="3836650" y="3487271"/>
+            <a:off x="3827496" y="3634748"/>
             <a:ext cx="273269" cy="274768"/>
           </a:xfrm>
           <a:prstGeom prst="ellipse">
@@ -3833,10 +3895,10 @@
       </p:sp>
       <p:sp>
         <p:nvSpPr>
-          <p:cNvPr id="9" name="Oval 8">
-            <a:extLst>
-              <a:ext uri="{FF2B5EF4-FFF2-40B4-BE49-F238E27FC236}">
-                <a16:creationId xmlns:a16="http://schemas.microsoft.com/office/drawing/2014/main" id="{7F822D7C-E19C-954B-A21A-F0741CF32DF2}"/>
+          <p:cNvPr id="10" name="Oval 9">
+            <a:extLst>
+              <a:ext uri="{FF2B5EF4-FFF2-40B4-BE49-F238E27FC236}">
+                <a16:creationId xmlns:a16="http://schemas.microsoft.com/office/drawing/2014/main" id="{2E93B5BF-6E44-C643-8713-91FCA4A2E8C5}"/>
               </a:ext>
             </a:extLst>
           </p:cNvPr>
@@ -3845,7 +3907,7 @@
         </p:nvSpPr>
         <p:spPr>
           <a:xfrm>
-            <a:off x="3838765" y="3954875"/>
+            <a:off x="3830114" y="4230437"/>
             <a:ext cx="273269" cy="274768"/>
           </a:xfrm>
           <a:prstGeom prst="ellipse">
@@ -3899,10 +3961,10 @@
       </p:sp>
       <p:sp>
         <p:nvSpPr>
-          <p:cNvPr id="10" name="Oval 9">
-            <a:extLst>
-              <a:ext uri="{FF2B5EF4-FFF2-40B4-BE49-F238E27FC236}">
-                <a16:creationId xmlns:a16="http://schemas.microsoft.com/office/drawing/2014/main" id="{2E93B5BF-6E44-C643-8713-91FCA4A2E8C5}"/>
+          <p:cNvPr id="11" name="Oval 10">
+            <a:extLst>
+              <a:ext uri="{FF2B5EF4-FFF2-40B4-BE49-F238E27FC236}">
+                <a16:creationId xmlns:a16="http://schemas.microsoft.com/office/drawing/2014/main" id="{0B78891E-B6C1-6E48-85FE-433CE03B9BA7}"/>
               </a:ext>
             </a:extLst>
           </p:cNvPr>
@@ -3911,7 +3973,7 @@
         </p:nvSpPr>
         <p:spPr>
           <a:xfrm>
-            <a:off x="3838766" y="4281842"/>
+            <a:off x="3828824" y="4564370"/>
             <a:ext cx="273269" cy="274768"/>
           </a:xfrm>
           <a:prstGeom prst="ellipse">
@@ -3965,10 +4027,10 @@
       </p:sp>
       <p:sp>
         <p:nvSpPr>
-          <p:cNvPr id="11" name="Oval 10">
-            <a:extLst>
-              <a:ext uri="{FF2B5EF4-FFF2-40B4-BE49-F238E27FC236}">
-                <a16:creationId xmlns:a16="http://schemas.microsoft.com/office/drawing/2014/main" id="{0B78891E-B6C1-6E48-85FE-433CE03B9BA7}"/>
+          <p:cNvPr id="12" name="Oval 11">
+            <a:extLst>
+              <a:ext uri="{FF2B5EF4-FFF2-40B4-BE49-F238E27FC236}">
+                <a16:creationId xmlns:a16="http://schemas.microsoft.com/office/drawing/2014/main" id="{1ECF5D27-7043-3C45-99A3-48ED5A83C719}"/>
               </a:ext>
             </a:extLst>
           </p:cNvPr>
@@ -3977,7 +4039,7 @@
         </p:nvSpPr>
         <p:spPr>
           <a:xfrm>
-            <a:off x="3848888" y="4708425"/>
+            <a:off x="3838764" y="5032984"/>
             <a:ext cx="273269" cy="274768"/>
           </a:xfrm>
           <a:prstGeom prst="ellipse">
@@ -4029,102 +4091,6 @@
           </a:p>
         </p:txBody>
       </p:sp>
-      <p:sp>
-        <p:nvSpPr>
-          <p:cNvPr id="12" name="Oval 11">
-            <a:extLst>
-              <a:ext uri="{FF2B5EF4-FFF2-40B4-BE49-F238E27FC236}">
-                <a16:creationId xmlns:a16="http://schemas.microsoft.com/office/drawing/2014/main" id="{1ECF5D27-7043-3C45-99A3-48ED5A83C719}"/>
-              </a:ext>
-            </a:extLst>
-          </p:cNvPr>
-          <p:cNvSpPr/>
-          <p:nvPr/>
-        </p:nvSpPr>
-        <p:spPr>
-          <a:xfrm>
-            <a:off x="3838764" y="5076132"/>
-            <a:ext cx="273269" cy="274768"/>
-          </a:xfrm>
-          <a:prstGeom prst="ellipse">
-            <a:avLst/>
-          </a:prstGeom>
-          <a:solidFill>
-            <a:srgbClr val="FF61AF"/>
-          </a:solidFill>
-          <a:ln w="12700">
-            <a:solidFill>
-              <a:schemeClr val="bg1"/>
-            </a:solidFill>
-          </a:ln>
-          <a:effectLst>
-            <a:outerShdw blurRad="76200" dist="12700" dir="2700000" algn="tl" rotWithShape="0">
-              <a:prstClr val="black"/>
-            </a:outerShdw>
-          </a:effectLst>
-        </p:spPr>
-        <p:style>
-          <a:lnRef idx="2">
-            <a:schemeClr val="accent1">
-              <a:shade val="50000"/>
-            </a:schemeClr>
-          </a:lnRef>
-          <a:fillRef idx="1">
-            <a:schemeClr val="accent1"/>
-          </a:fillRef>
-          <a:effectRef idx="0">
-            <a:schemeClr val="accent1"/>
-          </a:effectRef>
-          <a:fontRef idx="minor">
-            <a:schemeClr val="lt1"/>
-          </a:fontRef>
-        </p:style>
-        <p:txBody>
-          <a:bodyPr rtlCol="0" anchor="ctr"/>
-          <a:lstStyle/>
-          <a:p>
-            <a:pPr algn="ctr"/>
-            <a:r>
-              <a:rPr lang="en-US" sz="1200" b="1" dirty="0">
-                <a:latin typeface="Helvetica Neue" panose="02000503000000020004" pitchFamily="2" charset="0"/>
-                <a:ea typeface="Helvetica Neue" panose="02000503000000020004" pitchFamily="2" charset="0"/>
-                <a:cs typeface="Helvetica Neue" panose="02000503000000020004" pitchFamily="2" charset="0"/>
-              </a:rPr>
-              <a:t>9</a:t>
-            </a:r>
-          </a:p>
-        </p:txBody>
-      </p:sp>
-      <p:pic>
-        <p:nvPicPr>
-          <p:cNvPr id="14" name="Picture 13">
-            <a:extLst>
-              <a:ext uri="{FF2B5EF4-FFF2-40B4-BE49-F238E27FC236}">
-                <a16:creationId xmlns:a16="http://schemas.microsoft.com/office/drawing/2014/main" id="{7D7D3C3B-2FC4-9E4A-BC29-E8A1525AE243}"/>
-              </a:ext>
-            </a:extLst>
-          </p:cNvPr>
-          <p:cNvPicPr>
-            <a:picLocks noChangeAspect="1"/>
-          </p:cNvPicPr>
-          <p:nvPr/>
-        </p:nvPicPr>
-        <p:blipFill>
-          <a:blip r:embed="rId2"/>
-          <a:stretch>
-            <a:fillRect/>
-          </a:stretch>
-        </p:blipFill>
-        <p:spPr>
-          <a:xfrm>
-            <a:off x="4849904" y="674815"/>
-            <a:ext cx="5031431" cy="4862104"/>
-          </a:xfrm>
-          <a:prstGeom prst="rect">
-            <a:avLst/>
-          </a:prstGeom>
-        </p:spPr>
-      </p:pic>
       <p:cxnSp>
         <p:nvCxnSpPr>
           <p:cNvPr id="3" name="Straight Connector 2">
@@ -4182,7 +4148,7 @@
         </p:nvCxnSpPr>
         <p:spPr>
           <a:xfrm flipV="1">
-            <a:off x="4112026" y="2038463"/>
+            <a:off x="4122157" y="2016927"/>
             <a:ext cx="664167" cy="2144"/>
           </a:xfrm>
           <a:prstGeom prst="line">
@@ -4293,10 +4259,10 @@
       </p:cxnSp>
       <p:cxnSp>
         <p:nvCxnSpPr>
-          <p:cNvPr id="23" name="Straight Connector 22">
-            <a:extLst>
-              <a:ext uri="{FF2B5EF4-FFF2-40B4-BE49-F238E27FC236}">
-                <a16:creationId xmlns:a16="http://schemas.microsoft.com/office/drawing/2014/main" id="{95D861E1-ABEF-0A44-91DC-4E6B289DF6B2}"/>
+          <p:cNvPr id="24" name="Straight Connector 23">
+            <a:extLst>
+              <a:ext uri="{FF2B5EF4-FFF2-40B4-BE49-F238E27FC236}">
+                <a16:creationId xmlns:a16="http://schemas.microsoft.com/office/drawing/2014/main" id="{190B113A-F754-3749-9CC2-D998A63D206D}"/>
               </a:ext>
             </a:extLst>
           </p:cNvPr>
@@ -4305,48 +4271,7 @@
         </p:nvCxnSpPr>
         <p:spPr>
           <a:xfrm flipV="1">
-            <a:off x="4109912" y="3621018"/>
-            <a:ext cx="664167" cy="2144"/>
-          </a:xfrm>
-          <a:prstGeom prst="line">
-            <a:avLst/>
-          </a:prstGeom>
-          <a:ln w="25400">
-            <a:solidFill>
-              <a:schemeClr val="bg1"/>
-            </a:solidFill>
-          </a:ln>
-        </p:spPr>
-        <p:style>
-          <a:lnRef idx="1">
-            <a:schemeClr val="dk1"/>
-          </a:lnRef>
-          <a:fillRef idx="0">
-            <a:schemeClr val="dk1"/>
-          </a:fillRef>
-          <a:effectRef idx="0">
-            <a:schemeClr val="dk1"/>
-          </a:effectRef>
-          <a:fontRef idx="minor">
-            <a:schemeClr val="tx1"/>
-          </a:fontRef>
-        </p:style>
-      </p:cxnSp>
-      <p:cxnSp>
-        <p:nvCxnSpPr>
-          <p:cNvPr id="24" name="Straight Connector 23">
-            <a:extLst>
-              <a:ext uri="{FF2B5EF4-FFF2-40B4-BE49-F238E27FC236}">
-                <a16:creationId xmlns:a16="http://schemas.microsoft.com/office/drawing/2014/main" id="{190B113A-F754-3749-9CC2-D998A63D206D}"/>
-              </a:ext>
-            </a:extLst>
-          </p:cNvPr>
-          <p:cNvCxnSpPr/>
-          <p:nvPr/>
-        </p:nvCxnSpPr>
-        <p:spPr>
-          <a:xfrm flipV="1">
-            <a:off x="4112029" y="4101627"/>
+            <a:off x="4100760" y="3781500"/>
             <a:ext cx="664167" cy="2144"/>
           </a:xfrm>
           <a:prstGeom prst="line">
@@ -4387,7 +4312,7 @@
         </p:nvCxnSpPr>
         <p:spPr>
           <a:xfrm flipV="1">
-            <a:off x="4112028" y="4411774"/>
+            <a:off x="4103376" y="4360369"/>
             <a:ext cx="664167" cy="2144"/>
           </a:xfrm>
           <a:prstGeom prst="line">
@@ -4428,7 +4353,7 @@
         </p:nvCxnSpPr>
         <p:spPr>
           <a:xfrm flipV="1">
-            <a:off x="4112027" y="4866124"/>
+            <a:off x="4091963" y="4722069"/>
             <a:ext cx="664167" cy="2144"/>
           </a:xfrm>
           <a:prstGeom prst="line">
@@ -4469,7 +4394,7 @@
         </p:nvCxnSpPr>
         <p:spPr>
           <a:xfrm flipV="1">
-            <a:off x="4112026" y="5207562"/>
+            <a:off x="4112026" y="5164414"/>
             <a:ext cx="664167" cy="2144"/>
           </a:xfrm>
           <a:prstGeom prst="line">
@@ -4496,36 +4421,6 @@
           </a:fontRef>
         </p:style>
       </p:cxnSp>
-      <p:pic>
-        <p:nvPicPr>
-          <p:cNvPr id="32" name="Picture 31">
-            <a:extLst>
-              <a:ext uri="{FF2B5EF4-FFF2-40B4-BE49-F238E27FC236}">
-                <a16:creationId xmlns:a16="http://schemas.microsoft.com/office/drawing/2014/main" id="{24746DF3-ECA5-984B-8324-22A4D144DB71}"/>
-              </a:ext>
-            </a:extLst>
-          </p:cNvPr>
-          <p:cNvPicPr>
-            <a:picLocks noChangeAspect="1"/>
-          </p:cNvPicPr>
-          <p:nvPr/>
-        </p:nvPicPr>
-        <p:blipFill>
-          <a:blip r:embed="rId3"/>
-          <a:stretch>
-            <a:fillRect/>
-          </a:stretch>
-        </p:blipFill>
-        <p:spPr>
-          <a:xfrm>
-            <a:off x="4862929" y="674815"/>
-            <a:ext cx="5350887" cy="4862104"/>
-          </a:xfrm>
-          <a:prstGeom prst="rect">
-            <a:avLst/>
-          </a:prstGeom>
-        </p:spPr>
-      </p:pic>
       <p:cxnSp>
         <p:nvCxnSpPr>
           <p:cNvPr id="36" name="Straight Connector 35">
@@ -4542,8 +4437,8 @@
         </p:nvCxnSpPr>
         <p:spPr>
           <a:xfrm>
-            <a:off x="4774079" y="3373787"/>
-            <a:ext cx="0" cy="494461"/>
+            <a:off x="4756130" y="3396141"/>
+            <a:ext cx="5391" cy="746292"/>
           </a:xfrm>
           <a:prstGeom prst="line">
             <a:avLst/>
@@ -4612,6 +4507,36 @@
           </a:fontRef>
         </p:style>
       </p:cxnSp>
+      <p:pic>
+        <p:nvPicPr>
+          <p:cNvPr id="13" name="Picture 12">
+            <a:extLst>
+              <a:ext uri="{FF2B5EF4-FFF2-40B4-BE49-F238E27FC236}">
+                <a16:creationId xmlns:a16="http://schemas.microsoft.com/office/drawing/2014/main" id="{F57F9EE8-6200-4D4D-BF7B-2FA44E651D27}"/>
+              </a:ext>
+            </a:extLst>
+          </p:cNvPr>
+          <p:cNvPicPr>
+            <a:picLocks noChangeAspect="1"/>
+          </p:cNvPicPr>
+          <p:nvPr/>
+        </p:nvPicPr>
+        <p:blipFill>
+          <a:blip r:embed="rId4"/>
+          <a:stretch>
+            <a:fillRect/>
+          </a:stretch>
+        </p:blipFill>
+        <p:spPr>
+          <a:xfrm>
+            <a:off x="4860026" y="731014"/>
+            <a:ext cx="4343400" cy="5092700"/>
+          </a:xfrm>
+          <a:prstGeom prst="rect">
+            <a:avLst/>
+          </a:prstGeom>
+        </p:spPr>
+      </p:pic>
       <p:cxnSp>
         <p:nvCxnSpPr>
           <p:cNvPr id="38" name="Straight Connector 37">
@@ -4628,8 +4553,115 @@
         </p:nvCxnSpPr>
         <p:spPr>
           <a:xfrm>
-            <a:off x="4768962" y="1806400"/>
+            <a:off x="4779093" y="1784864"/>
             <a:ext cx="0" cy="494461"/>
+          </a:xfrm>
+          <a:prstGeom prst="line">
+            <a:avLst/>
+          </a:prstGeom>
+          <a:ln w="25400">
+            <a:solidFill>
+              <a:schemeClr val="bg1"/>
+            </a:solidFill>
+          </a:ln>
+        </p:spPr>
+        <p:style>
+          <a:lnRef idx="1">
+            <a:schemeClr val="dk1"/>
+          </a:lnRef>
+          <a:fillRef idx="0">
+            <a:schemeClr val="dk1"/>
+          </a:fillRef>
+          <a:effectRef idx="0">
+            <a:schemeClr val="dk1"/>
+          </a:effectRef>
+          <a:fontRef idx="minor">
+            <a:schemeClr val="tx1"/>
+          </a:fontRef>
+        </p:style>
+      </p:cxnSp>
+      <p:sp>
+        <p:nvSpPr>
+          <p:cNvPr id="30" name="Oval 29">
+            <a:extLst>
+              <a:ext uri="{FF2B5EF4-FFF2-40B4-BE49-F238E27FC236}">
+                <a16:creationId xmlns:a16="http://schemas.microsoft.com/office/drawing/2014/main" id="{B1A816EA-7CAE-244E-8D6A-7F8B9AED69E9}"/>
+              </a:ext>
+            </a:extLst>
+          </p:cNvPr>
+          <p:cNvSpPr/>
+          <p:nvPr/>
+        </p:nvSpPr>
+        <p:spPr>
+          <a:xfrm>
+            <a:off x="3838764" y="5378988"/>
+            <a:ext cx="273269" cy="274768"/>
+          </a:xfrm>
+          <a:prstGeom prst="ellipse">
+            <a:avLst/>
+          </a:prstGeom>
+          <a:solidFill>
+            <a:srgbClr val="FF61AF"/>
+          </a:solidFill>
+          <a:ln w="12700">
+            <a:solidFill>
+              <a:schemeClr val="bg1"/>
+            </a:solidFill>
+          </a:ln>
+          <a:effectLst>
+            <a:outerShdw blurRad="76200" dist="12700" dir="2700000" algn="tl" rotWithShape="0">
+              <a:prstClr val="black"/>
+            </a:outerShdw>
+          </a:effectLst>
+        </p:spPr>
+        <p:style>
+          <a:lnRef idx="2">
+            <a:schemeClr val="accent1">
+              <a:shade val="50000"/>
+            </a:schemeClr>
+          </a:lnRef>
+          <a:fillRef idx="1">
+            <a:schemeClr val="accent1"/>
+          </a:fillRef>
+          <a:effectRef idx="0">
+            <a:schemeClr val="accent1"/>
+          </a:effectRef>
+          <a:fontRef idx="minor">
+            <a:schemeClr val="lt1"/>
+          </a:fontRef>
+        </p:style>
+        <p:txBody>
+          <a:bodyPr rtlCol="0" anchor="ctr"/>
+          <a:lstStyle/>
+          <a:p>
+            <a:pPr algn="ctr"/>
+            <a:r>
+              <a:rPr lang="en-US" sz="1200" b="1" dirty="0">
+                <a:latin typeface="Helvetica Neue" panose="02000503000000020004" pitchFamily="2" charset="0"/>
+                <a:ea typeface="Helvetica Neue" panose="02000503000000020004" pitchFamily="2" charset="0"/>
+                <a:cs typeface="Helvetica Neue" panose="02000503000000020004" pitchFamily="2" charset="0"/>
+              </a:rPr>
+              <a:t>9</a:t>
+            </a:r>
+          </a:p>
+        </p:txBody>
+      </p:sp>
+      <p:cxnSp>
+        <p:nvCxnSpPr>
+          <p:cNvPr id="31" name="Straight Connector 30">
+            <a:extLst>
+              <a:ext uri="{FF2B5EF4-FFF2-40B4-BE49-F238E27FC236}">
+                <a16:creationId xmlns:a16="http://schemas.microsoft.com/office/drawing/2014/main" id="{00DCB02D-CBF7-6649-AC48-94CF7C721356}"/>
+              </a:ext>
+            </a:extLst>
+          </p:cNvPr>
+          <p:cNvCxnSpPr/>
+          <p:nvPr/>
+        </p:nvCxnSpPr>
+        <p:spPr>
+          <a:xfrm flipV="1">
+            <a:off x="4112026" y="5510418"/>
+            <a:ext cx="664167" cy="2144"/>
           </a:xfrm>
           <a:prstGeom prst="line">
             <a:avLst/>
@@ -4659,6 +4691,1659 @@
     <p:extLst>
       <p:ext uri="{BB962C8B-B14F-4D97-AF65-F5344CB8AC3E}">
         <p14:creationId xmlns:p14="http://schemas.microsoft.com/office/powerpoint/2010/main" val="1525176841"/>
+      </p:ext>
+    </p:extLst>
+  </p:cSld>
+  <p:clrMapOvr>
+    <a:masterClrMapping/>
+  </p:clrMapOvr>
+</p:sld>
+</file>
+
+<file path=ppt/slides/slide11.xml><?xml version="1.0" encoding="utf-8"?>
+<p:sld xmlns:a="http://schemas.openxmlformats.org/drawingml/2006/main" xmlns:r="http://schemas.openxmlformats.org/officeDocument/2006/relationships" xmlns:p="http://schemas.openxmlformats.org/presentationml/2006/main">
+  <p:cSld>
+    <p:spTree>
+      <p:nvGrpSpPr>
+        <p:cNvPr id="1" name=""/>
+        <p:cNvGrpSpPr/>
+        <p:nvPr/>
+      </p:nvGrpSpPr>
+      <p:grpSpPr>
+        <a:xfrm>
+          <a:off x="0" y="0"/>
+          <a:ext cx="0" cy="0"/>
+          <a:chOff x="0" y="0"/>
+          <a:chExt cx="0" cy="0"/>
+        </a:xfrm>
+      </p:grpSpPr>
+      <p:pic>
+        <p:nvPicPr>
+          <p:cNvPr id="14" name="Picture 13">
+            <a:extLst>
+              <a:ext uri="{FF2B5EF4-FFF2-40B4-BE49-F238E27FC236}">
+                <a16:creationId xmlns:a16="http://schemas.microsoft.com/office/drawing/2014/main" id="{7D7D3C3B-2FC4-9E4A-BC29-E8A1525AE243}"/>
+              </a:ext>
+            </a:extLst>
+          </p:cNvPr>
+          <p:cNvPicPr>
+            <a:picLocks noChangeAspect="1"/>
+          </p:cNvPicPr>
+          <p:nvPr/>
+        </p:nvPicPr>
+        <p:blipFill>
+          <a:blip r:embed="rId2"/>
+          <a:stretch>
+            <a:fillRect/>
+          </a:stretch>
+        </p:blipFill>
+        <p:spPr>
+          <a:xfrm>
+            <a:off x="4849904" y="674815"/>
+            <a:ext cx="5031431" cy="4862104"/>
+          </a:xfrm>
+          <a:prstGeom prst="rect">
+            <a:avLst/>
+          </a:prstGeom>
+        </p:spPr>
+      </p:pic>
+      <p:pic>
+        <p:nvPicPr>
+          <p:cNvPr id="32" name="Picture 31">
+            <a:extLst>
+              <a:ext uri="{FF2B5EF4-FFF2-40B4-BE49-F238E27FC236}">
+                <a16:creationId xmlns:a16="http://schemas.microsoft.com/office/drawing/2014/main" id="{24746DF3-ECA5-984B-8324-22A4D144DB71}"/>
+              </a:ext>
+            </a:extLst>
+          </p:cNvPr>
+          <p:cNvPicPr>
+            <a:picLocks noChangeAspect="1"/>
+          </p:cNvPicPr>
+          <p:nvPr/>
+        </p:nvPicPr>
+        <p:blipFill>
+          <a:blip r:embed="rId3"/>
+          <a:stretch>
+            <a:fillRect/>
+          </a:stretch>
+        </p:blipFill>
+        <p:spPr>
+          <a:xfrm>
+            <a:off x="4862929" y="674815"/>
+            <a:ext cx="5350887" cy="4862104"/>
+          </a:xfrm>
+          <a:prstGeom prst="rect">
+            <a:avLst/>
+          </a:prstGeom>
+        </p:spPr>
+      </p:pic>
+      <p:sp>
+        <p:nvSpPr>
+          <p:cNvPr id="15" name="Rectangle 14">
+            <a:extLst>
+              <a:ext uri="{FF2B5EF4-FFF2-40B4-BE49-F238E27FC236}">
+                <a16:creationId xmlns:a16="http://schemas.microsoft.com/office/drawing/2014/main" id="{9A9ABCE7-A39B-D74F-A71F-22F9A819F55C}"/>
+              </a:ext>
+            </a:extLst>
+          </p:cNvPr>
+          <p:cNvSpPr/>
+          <p:nvPr/>
+        </p:nvSpPr>
+        <p:spPr>
+          <a:xfrm>
+            <a:off x="0" y="0"/>
+            <a:ext cx="12192000" cy="6858000"/>
+          </a:xfrm>
+          <a:prstGeom prst="rect">
+            <a:avLst/>
+          </a:prstGeom>
+          <a:solidFill>
+            <a:srgbClr val="606060"/>
+          </a:solidFill>
+        </p:spPr>
+        <p:style>
+          <a:lnRef idx="2">
+            <a:schemeClr val="accent1">
+              <a:shade val="50000"/>
+            </a:schemeClr>
+          </a:lnRef>
+          <a:fillRef idx="1">
+            <a:schemeClr val="accent1"/>
+          </a:fillRef>
+          <a:effectRef idx="0">
+            <a:schemeClr val="accent1"/>
+          </a:effectRef>
+          <a:fontRef idx="minor">
+            <a:schemeClr val="lt1"/>
+          </a:fontRef>
+        </p:style>
+        <p:txBody>
+          <a:bodyPr rtlCol="0" anchor="ctr"/>
+          <a:lstStyle/>
+          <a:p>
+            <a:pPr algn="ctr"/>
+            <a:endParaRPr lang="en-US"/>
+          </a:p>
+        </p:txBody>
+      </p:sp>
+      <p:sp>
+        <p:nvSpPr>
+          <p:cNvPr id="6" name="Oval 5">
+            <a:extLst>
+              <a:ext uri="{FF2B5EF4-FFF2-40B4-BE49-F238E27FC236}">
+                <a16:creationId xmlns:a16="http://schemas.microsoft.com/office/drawing/2014/main" id="{4F5F5F24-60CE-3342-9DE6-24855CF519DA}"/>
+              </a:ext>
+            </a:extLst>
+          </p:cNvPr>
+          <p:cNvSpPr/>
+          <p:nvPr/>
+        </p:nvSpPr>
+        <p:spPr>
+          <a:xfrm>
+            <a:off x="3572403" y="1058393"/>
+            <a:ext cx="273269" cy="274768"/>
+          </a:xfrm>
+          <a:prstGeom prst="ellipse">
+            <a:avLst/>
+          </a:prstGeom>
+          <a:solidFill>
+            <a:srgbClr val="FF61AF"/>
+          </a:solidFill>
+          <a:ln w="12700">
+            <a:solidFill>
+              <a:schemeClr val="bg1"/>
+            </a:solidFill>
+          </a:ln>
+          <a:effectLst>
+            <a:outerShdw blurRad="76200" dist="12700" dir="2700000" algn="tl" rotWithShape="0">
+              <a:prstClr val="black"/>
+            </a:outerShdw>
+          </a:effectLst>
+        </p:spPr>
+        <p:style>
+          <a:lnRef idx="2">
+            <a:schemeClr val="accent1">
+              <a:shade val="50000"/>
+            </a:schemeClr>
+          </a:lnRef>
+          <a:fillRef idx="1">
+            <a:schemeClr val="accent1"/>
+          </a:fillRef>
+          <a:effectRef idx="0">
+            <a:schemeClr val="accent1"/>
+          </a:effectRef>
+          <a:fontRef idx="minor">
+            <a:schemeClr val="lt1"/>
+          </a:fontRef>
+        </p:style>
+        <p:txBody>
+          <a:bodyPr rtlCol="0" anchor="ctr"/>
+          <a:lstStyle/>
+          <a:p>
+            <a:pPr algn="ctr"/>
+            <a:r>
+              <a:rPr lang="en-US" sz="1200" b="1" dirty="0">
+                <a:latin typeface="Helvetica Neue" panose="02000503000000020004" pitchFamily="2" charset="0"/>
+                <a:ea typeface="Helvetica Neue" panose="02000503000000020004" pitchFamily="2" charset="0"/>
+                <a:cs typeface="Helvetica Neue" panose="02000503000000020004" pitchFamily="2" charset="0"/>
+              </a:rPr>
+              <a:t>3</a:t>
+            </a:r>
+          </a:p>
+        </p:txBody>
+      </p:sp>
+      <p:sp>
+        <p:nvSpPr>
+          <p:cNvPr id="9" name="Oval 8">
+            <a:extLst>
+              <a:ext uri="{FF2B5EF4-FFF2-40B4-BE49-F238E27FC236}">
+                <a16:creationId xmlns:a16="http://schemas.microsoft.com/office/drawing/2014/main" id="{7F822D7C-E19C-954B-A21A-F0741CF32DF2}"/>
+              </a:ext>
+            </a:extLst>
+          </p:cNvPr>
+          <p:cNvSpPr/>
+          <p:nvPr/>
+        </p:nvSpPr>
+        <p:spPr>
+          <a:xfrm>
+            <a:off x="4016908" y="1638580"/>
+            <a:ext cx="273269" cy="274768"/>
+          </a:xfrm>
+          <a:prstGeom prst="ellipse">
+            <a:avLst/>
+          </a:prstGeom>
+          <a:solidFill>
+            <a:srgbClr val="FF61AF"/>
+          </a:solidFill>
+          <a:ln w="12700">
+            <a:solidFill>
+              <a:schemeClr val="bg1"/>
+            </a:solidFill>
+          </a:ln>
+          <a:effectLst>
+            <a:outerShdw blurRad="76200" dist="12700" dir="2700000" algn="tl" rotWithShape="0">
+              <a:prstClr val="black"/>
+            </a:outerShdw>
+          </a:effectLst>
+        </p:spPr>
+        <p:style>
+          <a:lnRef idx="2">
+            <a:schemeClr val="accent1">
+              <a:shade val="50000"/>
+            </a:schemeClr>
+          </a:lnRef>
+          <a:fillRef idx="1">
+            <a:schemeClr val="accent1"/>
+          </a:fillRef>
+          <a:effectRef idx="0">
+            <a:schemeClr val="accent1"/>
+          </a:effectRef>
+          <a:fontRef idx="minor">
+            <a:schemeClr val="lt1"/>
+          </a:fontRef>
+        </p:style>
+        <p:txBody>
+          <a:bodyPr rtlCol="0" anchor="ctr"/>
+          <a:lstStyle/>
+          <a:p>
+            <a:pPr algn="ctr"/>
+            <a:r>
+              <a:rPr lang="en-US" sz="1200" b="1" dirty="0">
+                <a:latin typeface="Helvetica Neue" panose="02000503000000020004" pitchFamily="2" charset="0"/>
+                <a:ea typeface="Helvetica Neue" panose="02000503000000020004" pitchFamily="2" charset="0"/>
+                <a:cs typeface="Helvetica Neue" panose="02000503000000020004" pitchFamily="2" charset="0"/>
+              </a:rPr>
+              <a:t>4</a:t>
+            </a:r>
+          </a:p>
+        </p:txBody>
+      </p:sp>
+      <p:sp>
+        <p:nvSpPr>
+          <p:cNvPr id="12" name="Oval 11">
+            <a:extLst>
+              <a:ext uri="{FF2B5EF4-FFF2-40B4-BE49-F238E27FC236}">
+                <a16:creationId xmlns:a16="http://schemas.microsoft.com/office/drawing/2014/main" id="{1ECF5D27-7043-3C45-99A3-48ED5A83C719}"/>
+              </a:ext>
+            </a:extLst>
+          </p:cNvPr>
+          <p:cNvSpPr/>
+          <p:nvPr/>
+        </p:nvSpPr>
+        <p:spPr>
+          <a:xfrm>
+            <a:off x="4016915" y="4215557"/>
+            <a:ext cx="273269" cy="274768"/>
+          </a:xfrm>
+          <a:prstGeom prst="ellipse">
+            <a:avLst/>
+          </a:prstGeom>
+          <a:solidFill>
+            <a:srgbClr val="FF61AF"/>
+          </a:solidFill>
+          <a:ln w="12700">
+            <a:solidFill>
+              <a:schemeClr val="bg1"/>
+            </a:solidFill>
+          </a:ln>
+          <a:effectLst>
+            <a:outerShdw blurRad="76200" dist="12700" dir="2700000" algn="tl" rotWithShape="0">
+              <a:prstClr val="black"/>
+            </a:outerShdw>
+          </a:effectLst>
+        </p:spPr>
+        <p:style>
+          <a:lnRef idx="2">
+            <a:schemeClr val="accent1">
+              <a:shade val="50000"/>
+            </a:schemeClr>
+          </a:lnRef>
+          <a:fillRef idx="1">
+            <a:schemeClr val="accent1"/>
+          </a:fillRef>
+          <a:effectRef idx="0">
+            <a:schemeClr val="accent1"/>
+          </a:effectRef>
+          <a:fontRef idx="minor">
+            <a:schemeClr val="lt1"/>
+          </a:fontRef>
+        </p:style>
+        <p:txBody>
+          <a:bodyPr rtlCol="0" anchor="ctr"/>
+          <a:lstStyle/>
+          <a:p>
+            <a:pPr algn="ctr"/>
+            <a:r>
+              <a:rPr lang="en-US" sz="1200" b="1" dirty="0">
+                <a:latin typeface="Helvetica Neue" panose="02000503000000020004" pitchFamily="2" charset="0"/>
+                <a:ea typeface="Helvetica Neue" panose="02000503000000020004" pitchFamily="2" charset="0"/>
+                <a:cs typeface="Helvetica Neue" panose="02000503000000020004" pitchFamily="2" charset="0"/>
+              </a:rPr>
+              <a:t>8</a:t>
+            </a:r>
+          </a:p>
+        </p:txBody>
+      </p:sp>
+      <p:cxnSp>
+        <p:nvCxnSpPr>
+          <p:cNvPr id="21" name="Straight Connector 20">
+            <a:extLst>
+              <a:ext uri="{FF2B5EF4-FFF2-40B4-BE49-F238E27FC236}">
+                <a16:creationId xmlns:a16="http://schemas.microsoft.com/office/drawing/2014/main" id="{C2E2A4B5-9CAB-DE41-9877-63D9252C71EE}"/>
+              </a:ext>
+            </a:extLst>
+          </p:cNvPr>
+          <p:cNvCxnSpPr>
+            <a:cxnSpLocks/>
+          </p:cNvCxnSpPr>
+          <p:nvPr/>
+        </p:nvCxnSpPr>
+        <p:spPr>
+          <a:xfrm>
+            <a:off x="3845666" y="1195777"/>
+            <a:ext cx="1429067" cy="0"/>
+          </a:xfrm>
+          <a:prstGeom prst="line">
+            <a:avLst/>
+          </a:prstGeom>
+          <a:ln w="25400">
+            <a:solidFill>
+              <a:schemeClr val="bg1"/>
+            </a:solidFill>
+          </a:ln>
+        </p:spPr>
+        <p:style>
+          <a:lnRef idx="1">
+            <a:schemeClr val="dk1"/>
+          </a:lnRef>
+          <a:fillRef idx="0">
+            <a:schemeClr val="dk1"/>
+          </a:fillRef>
+          <a:effectRef idx="0">
+            <a:schemeClr val="dk1"/>
+          </a:effectRef>
+          <a:fontRef idx="minor">
+            <a:schemeClr val="tx1"/>
+          </a:fontRef>
+        </p:style>
+      </p:cxnSp>
+      <p:cxnSp>
+        <p:nvCxnSpPr>
+          <p:cNvPr id="24" name="Straight Connector 23">
+            <a:extLst>
+              <a:ext uri="{FF2B5EF4-FFF2-40B4-BE49-F238E27FC236}">
+                <a16:creationId xmlns:a16="http://schemas.microsoft.com/office/drawing/2014/main" id="{190B113A-F754-3749-9CC2-D998A63D206D}"/>
+              </a:ext>
+            </a:extLst>
+          </p:cNvPr>
+          <p:cNvCxnSpPr>
+            <a:cxnSpLocks/>
+          </p:cNvCxnSpPr>
+          <p:nvPr/>
+        </p:nvCxnSpPr>
+        <p:spPr>
+          <a:xfrm>
+            <a:off x="4290177" y="1770319"/>
+            <a:ext cx="955587" cy="0"/>
+          </a:xfrm>
+          <a:prstGeom prst="line">
+            <a:avLst/>
+          </a:prstGeom>
+          <a:ln w="25400">
+            <a:solidFill>
+              <a:schemeClr val="bg1"/>
+            </a:solidFill>
+          </a:ln>
+        </p:spPr>
+        <p:style>
+          <a:lnRef idx="1">
+            <a:schemeClr val="dk1"/>
+          </a:lnRef>
+          <a:fillRef idx="0">
+            <a:schemeClr val="dk1"/>
+          </a:fillRef>
+          <a:effectRef idx="0">
+            <a:schemeClr val="dk1"/>
+          </a:effectRef>
+          <a:fontRef idx="minor">
+            <a:schemeClr val="tx1"/>
+          </a:fontRef>
+        </p:style>
+      </p:cxnSp>
+      <p:cxnSp>
+        <p:nvCxnSpPr>
+          <p:cNvPr id="27" name="Straight Connector 26">
+            <a:extLst>
+              <a:ext uri="{FF2B5EF4-FFF2-40B4-BE49-F238E27FC236}">
+                <a16:creationId xmlns:a16="http://schemas.microsoft.com/office/drawing/2014/main" id="{93ECA7C7-C525-0942-B666-346F083C10BA}"/>
+              </a:ext>
+            </a:extLst>
+          </p:cNvPr>
+          <p:cNvCxnSpPr>
+            <a:cxnSpLocks/>
+          </p:cNvCxnSpPr>
+          <p:nvPr/>
+        </p:nvCxnSpPr>
+        <p:spPr>
+          <a:xfrm>
+            <a:off x="4290177" y="4349131"/>
+            <a:ext cx="984556" cy="0"/>
+          </a:xfrm>
+          <a:prstGeom prst="line">
+            <a:avLst/>
+          </a:prstGeom>
+          <a:ln w="25400">
+            <a:solidFill>
+              <a:schemeClr val="bg1"/>
+            </a:solidFill>
+          </a:ln>
+        </p:spPr>
+        <p:style>
+          <a:lnRef idx="1">
+            <a:schemeClr val="dk1"/>
+          </a:lnRef>
+          <a:fillRef idx="0">
+            <a:schemeClr val="dk1"/>
+          </a:fillRef>
+          <a:effectRef idx="0">
+            <a:schemeClr val="dk1"/>
+          </a:effectRef>
+          <a:fontRef idx="minor">
+            <a:schemeClr val="tx1"/>
+          </a:fontRef>
+        </p:style>
+      </p:cxnSp>
+      <p:cxnSp>
+        <p:nvCxnSpPr>
+          <p:cNvPr id="36" name="Straight Connector 35">
+            <a:extLst>
+              <a:ext uri="{FF2B5EF4-FFF2-40B4-BE49-F238E27FC236}">
+                <a16:creationId xmlns:a16="http://schemas.microsoft.com/office/drawing/2014/main" id="{FC76962E-93B9-F548-9EED-030852E099B4}"/>
+              </a:ext>
+            </a:extLst>
+          </p:cNvPr>
+          <p:cNvCxnSpPr>
+            <a:cxnSpLocks/>
+          </p:cNvCxnSpPr>
+          <p:nvPr/>
+        </p:nvCxnSpPr>
+        <p:spPr>
+          <a:xfrm>
+            <a:off x="5245764" y="1382816"/>
+            <a:ext cx="5391" cy="746292"/>
+          </a:xfrm>
+          <a:prstGeom prst="line">
+            <a:avLst/>
+          </a:prstGeom>
+          <a:ln w="25400">
+            <a:solidFill>
+              <a:schemeClr val="bg1"/>
+            </a:solidFill>
+          </a:ln>
+        </p:spPr>
+        <p:style>
+          <a:lnRef idx="1">
+            <a:schemeClr val="dk1"/>
+          </a:lnRef>
+          <a:fillRef idx="0">
+            <a:schemeClr val="dk1"/>
+          </a:fillRef>
+          <a:effectRef idx="0">
+            <a:schemeClr val="dk1"/>
+          </a:effectRef>
+          <a:fontRef idx="minor">
+            <a:schemeClr val="tx1"/>
+          </a:fontRef>
+        </p:style>
+      </p:cxnSp>
+      <p:sp>
+        <p:nvSpPr>
+          <p:cNvPr id="30" name="Oval 29">
+            <a:extLst>
+              <a:ext uri="{FF2B5EF4-FFF2-40B4-BE49-F238E27FC236}">
+                <a16:creationId xmlns:a16="http://schemas.microsoft.com/office/drawing/2014/main" id="{B1A816EA-7CAE-244E-8D6A-7F8B9AED69E9}"/>
+              </a:ext>
+            </a:extLst>
+          </p:cNvPr>
+          <p:cNvSpPr/>
+          <p:nvPr/>
+        </p:nvSpPr>
+        <p:spPr>
+          <a:xfrm>
+            <a:off x="3838764" y="5378988"/>
+            <a:ext cx="273269" cy="274768"/>
+          </a:xfrm>
+          <a:prstGeom prst="ellipse">
+            <a:avLst/>
+          </a:prstGeom>
+          <a:solidFill>
+            <a:srgbClr val="FF61AF"/>
+          </a:solidFill>
+          <a:ln w="12700">
+            <a:solidFill>
+              <a:schemeClr val="bg1"/>
+            </a:solidFill>
+          </a:ln>
+          <a:effectLst>
+            <a:outerShdw blurRad="76200" dist="12700" dir="2700000" algn="tl" rotWithShape="0">
+              <a:prstClr val="black"/>
+            </a:outerShdw>
+          </a:effectLst>
+        </p:spPr>
+        <p:style>
+          <a:lnRef idx="2">
+            <a:schemeClr val="accent1">
+              <a:shade val="50000"/>
+            </a:schemeClr>
+          </a:lnRef>
+          <a:fillRef idx="1">
+            <a:schemeClr val="accent1"/>
+          </a:fillRef>
+          <a:effectRef idx="0">
+            <a:schemeClr val="accent1"/>
+          </a:effectRef>
+          <a:fontRef idx="minor">
+            <a:schemeClr val="lt1"/>
+          </a:fontRef>
+        </p:style>
+        <p:txBody>
+          <a:bodyPr rtlCol="0" anchor="ctr"/>
+          <a:lstStyle/>
+          <a:p>
+            <a:pPr algn="ctr"/>
+            <a:r>
+              <a:rPr lang="en-US" sz="1200" b="1" dirty="0">
+                <a:latin typeface="Helvetica Neue" panose="02000503000000020004" pitchFamily="2" charset="0"/>
+                <a:ea typeface="Helvetica Neue" panose="02000503000000020004" pitchFamily="2" charset="0"/>
+                <a:cs typeface="Helvetica Neue" panose="02000503000000020004" pitchFamily="2" charset="0"/>
+              </a:rPr>
+              <a:t>9</a:t>
+            </a:r>
+          </a:p>
+        </p:txBody>
+      </p:sp>
+      <p:cxnSp>
+        <p:nvCxnSpPr>
+          <p:cNvPr id="31" name="Straight Connector 30">
+            <a:extLst>
+              <a:ext uri="{FF2B5EF4-FFF2-40B4-BE49-F238E27FC236}">
+                <a16:creationId xmlns:a16="http://schemas.microsoft.com/office/drawing/2014/main" id="{00DCB02D-CBF7-6649-AC48-94CF7C721356}"/>
+              </a:ext>
+            </a:extLst>
+          </p:cNvPr>
+          <p:cNvCxnSpPr/>
+          <p:nvPr/>
+        </p:nvCxnSpPr>
+        <p:spPr>
+          <a:xfrm flipV="1">
+            <a:off x="4112026" y="5510418"/>
+            <a:ext cx="664167" cy="2144"/>
+          </a:xfrm>
+          <a:prstGeom prst="line">
+            <a:avLst/>
+          </a:prstGeom>
+          <a:ln w="25400">
+            <a:solidFill>
+              <a:schemeClr val="bg1"/>
+            </a:solidFill>
+          </a:ln>
+        </p:spPr>
+        <p:style>
+          <a:lnRef idx="1">
+            <a:schemeClr val="dk1"/>
+          </a:lnRef>
+          <a:fillRef idx="0">
+            <a:schemeClr val="dk1"/>
+          </a:fillRef>
+          <a:effectRef idx="0">
+            <a:schemeClr val="dk1"/>
+          </a:effectRef>
+          <a:fontRef idx="minor">
+            <a:schemeClr val="tx1"/>
+          </a:fontRef>
+        </p:style>
+      </p:cxnSp>
+      <p:sp>
+        <p:nvSpPr>
+          <p:cNvPr id="39" name="Oval 38">
+            <a:extLst>
+              <a:ext uri="{FF2B5EF4-FFF2-40B4-BE49-F238E27FC236}">
+                <a16:creationId xmlns:a16="http://schemas.microsoft.com/office/drawing/2014/main" id="{6660D379-4EFF-EE48-AAB9-D82900997E6A}"/>
+              </a:ext>
+            </a:extLst>
+          </p:cNvPr>
+          <p:cNvSpPr/>
+          <p:nvPr/>
+        </p:nvSpPr>
+        <p:spPr>
+          <a:xfrm>
+            <a:off x="4016908" y="2340654"/>
+            <a:ext cx="273269" cy="274768"/>
+          </a:xfrm>
+          <a:prstGeom prst="ellipse">
+            <a:avLst/>
+          </a:prstGeom>
+          <a:solidFill>
+            <a:srgbClr val="FF61AF"/>
+          </a:solidFill>
+          <a:ln w="12700">
+            <a:solidFill>
+              <a:schemeClr val="bg1"/>
+            </a:solidFill>
+          </a:ln>
+          <a:effectLst>
+            <a:outerShdw blurRad="76200" dist="12700" dir="2700000" algn="tl" rotWithShape="0">
+              <a:prstClr val="black"/>
+            </a:outerShdw>
+          </a:effectLst>
+        </p:spPr>
+        <p:style>
+          <a:lnRef idx="2">
+            <a:schemeClr val="accent1">
+              <a:shade val="50000"/>
+            </a:schemeClr>
+          </a:lnRef>
+          <a:fillRef idx="1">
+            <a:schemeClr val="accent1"/>
+          </a:fillRef>
+          <a:effectRef idx="0">
+            <a:schemeClr val="accent1"/>
+          </a:effectRef>
+          <a:fontRef idx="minor">
+            <a:schemeClr val="lt1"/>
+          </a:fontRef>
+        </p:style>
+        <p:txBody>
+          <a:bodyPr rtlCol="0" anchor="ctr"/>
+          <a:lstStyle/>
+          <a:p>
+            <a:pPr algn="ctr"/>
+            <a:r>
+              <a:rPr lang="en-US" sz="1200" b="1" dirty="0">
+                <a:latin typeface="Helvetica Neue" panose="02000503000000020004" pitchFamily="2" charset="0"/>
+                <a:ea typeface="Helvetica Neue" panose="02000503000000020004" pitchFamily="2" charset="0"/>
+                <a:cs typeface="Helvetica Neue" panose="02000503000000020004" pitchFamily="2" charset="0"/>
+              </a:rPr>
+              <a:t>5</a:t>
+            </a:r>
+          </a:p>
+        </p:txBody>
+      </p:sp>
+      <p:cxnSp>
+        <p:nvCxnSpPr>
+          <p:cNvPr id="40" name="Straight Connector 39">
+            <a:extLst>
+              <a:ext uri="{FF2B5EF4-FFF2-40B4-BE49-F238E27FC236}">
+                <a16:creationId xmlns:a16="http://schemas.microsoft.com/office/drawing/2014/main" id="{8D1DC4E6-5C96-2F4B-AC52-FBF0F1FAAA8B}"/>
+              </a:ext>
+            </a:extLst>
+          </p:cNvPr>
+          <p:cNvCxnSpPr>
+            <a:cxnSpLocks/>
+          </p:cNvCxnSpPr>
+          <p:nvPr/>
+        </p:nvCxnSpPr>
+        <p:spPr>
+          <a:xfrm>
+            <a:off x="4290177" y="2472393"/>
+            <a:ext cx="955587" cy="0"/>
+          </a:xfrm>
+          <a:prstGeom prst="line">
+            <a:avLst/>
+          </a:prstGeom>
+          <a:ln w="25400">
+            <a:solidFill>
+              <a:schemeClr val="bg1"/>
+            </a:solidFill>
+          </a:ln>
+        </p:spPr>
+        <p:style>
+          <a:lnRef idx="1">
+            <a:schemeClr val="dk1"/>
+          </a:lnRef>
+          <a:fillRef idx="0">
+            <a:schemeClr val="dk1"/>
+          </a:fillRef>
+          <a:effectRef idx="0">
+            <a:schemeClr val="dk1"/>
+          </a:effectRef>
+          <a:fontRef idx="minor">
+            <a:schemeClr val="tx1"/>
+          </a:fontRef>
+        </p:style>
+      </p:cxnSp>
+      <p:cxnSp>
+        <p:nvCxnSpPr>
+          <p:cNvPr id="41" name="Straight Connector 40">
+            <a:extLst>
+              <a:ext uri="{FF2B5EF4-FFF2-40B4-BE49-F238E27FC236}">
+                <a16:creationId xmlns:a16="http://schemas.microsoft.com/office/drawing/2014/main" id="{1BF63579-6C8B-4646-AD78-1C2F96E08CE4}"/>
+              </a:ext>
+            </a:extLst>
+          </p:cNvPr>
+          <p:cNvCxnSpPr>
+            <a:cxnSpLocks/>
+          </p:cNvCxnSpPr>
+          <p:nvPr/>
+        </p:nvCxnSpPr>
+        <p:spPr>
+          <a:xfrm>
+            <a:off x="5245764" y="2223136"/>
+            <a:ext cx="0" cy="492231"/>
+          </a:xfrm>
+          <a:prstGeom prst="line">
+            <a:avLst/>
+          </a:prstGeom>
+          <a:ln w="25400">
+            <a:solidFill>
+              <a:schemeClr val="bg1"/>
+            </a:solidFill>
+          </a:ln>
+        </p:spPr>
+        <p:style>
+          <a:lnRef idx="1">
+            <a:schemeClr val="dk1"/>
+          </a:lnRef>
+          <a:fillRef idx="0">
+            <a:schemeClr val="dk1"/>
+          </a:fillRef>
+          <a:effectRef idx="0">
+            <a:schemeClr val="dk1"/>
+          </a:effectRef>
+          <a:fontRef idx="minor">
+            <a:schemeClr val="tx1"/>
+          </a:fontRef>
+        </p:style>
+      </p:cxnSp>
+      <p:sp>
+        <p:nvSpPr>
+          <p:cNvPr id="11" name="Oval 10">
+            <a:extLst>
+              <a:ext uri="{FF2B5EF4-FFF2-40B4-BE49-F238E27FC236}">
+                <a16:creationId xmlns:a16="http://schemas.microsoft.com/office/drawing/2014/main" id="{0B78891E-B6C1-6E48-85FE-433CE03B9BA7}"/>
+              </a:ext>
+            </a:extLst>
+          </p:cNvPr>
+          <p:cNvSpPr/>
+          <p:nvPr/>
+        </p:nvSpPr>
+        <p:spPr>
+          <a:xfrm>
+            <a:off x="4018571" y="3609625"/>
+            <a:ext cx="273269" cy="274768"/>
+          </a:xfrm>
+          <a:prstGeom prst="ellipse">
+            <a:avLst/>
+          </a:prstGeom>
+          <a:solidFill>
+            <a:srgbClr val="FF61AF"/>
+          </a:solidFill>
+          <a:ln w="12700">
+            <a:solidFill>
+              <a:schemeClr val="bg1"/>
+            </a:solidFill>
+          </a:ln>
+          <a:effectLst>
+            <a:outerShdw blurRad="76200" dist="12700" dir="2700000" algn="tl" rotWithShape="0">
+              <a:prstClr val="black"/>
+            </a:outerShdw>
+          </a:effectLst>
+        </p:spPr>
+        <p:style>
+          <a:lnRef idx="2">
+            <a:schemeClr val="accent1">
+              <a:shade val="50000"/>
+            </a:schemeClr>
+          </a:lnRef>
+          <a:fillRef idx="1">
+            <a:schemeClr val="accent1"/>
+          </a:fillRef>
+          <a:effectRef idx="0">
+            <a:schemeClr val="accent1"/>
+          </a:effectRef>
+          <a:fontRef idx="minor">
+            <a:schemeClr val="lt1"/>
+          </a:fontRef>
+        </p:style>
+        <p:txBody>
+          <a:bodyPr rtlCol="0" anchor="ctr"/>
+          <a:lstStyle/>
+          <a:p>
+            <a:pPr algn="ctr"/>
+            <a:r>
+              <a:rPr lang="en-US" sz="1200" b="1" dirty="0">
+                <a:latin typeface="Helvetica Neue" panose="02000503000000020004" pitchFamily="2" charset="0"/>
+                <a:ea typeface="Helvetica Neue" panose="02000503000000020004" pitchFamily="2" charset="0"/>
+                <a:cs typeface="Helvetica Neue" panose="02000503000000020004" pitchFamily="2" charset="0"/>
+              </a:rPr>
+              <a:t>6</a:t>
+            </a:r>
+          </a:p>
+        </p:txBody>
+      </p:sp>
+      <p:cxnSp>
+        <p:nvCxnSpPr>
+          <p:cNvPr id="26" name="Straight Connector 25">
+            <a:extLst>
+              <a:ext uri="{FF2B5EF4-FFF2-40B4-BE49-F238E27FC236}">
+                <a16:creationId xmlns:a16="http://schemas.microsoft.com/office/drawing/2014/main" id="{F744B69F-26EA-8C40-949F-80255D5764E9}"/>
+              </a:ext>
+            </a:extLst>
+          </p:cNvPr>
+          <p:cNvCxnSpPr>
+            <a:cxnSpLocks/>
+          </p:cNvCxnSpPr>
+          <p:nvPr/>
+        </p:nvCxnSpPr>
+        <p:spPr>
+          <a:xfrm>
+            <a:off x="4290177" y="3752534"/>
+            <a:ext cx="984556" cy="0"/>
+          </a:xfrm>
+          <a:prstGeom prst="line">
+            <a:avLst/>
+          </a:prstGeom>
+          <a:ln w="25400">
+            <a:solidFill>
+              <a:schemeClr val="bg1"/>
+            </a:solidFill>
+          </a:ln>
+        </p:spPr>
+        <p:style>
+          <a:lnRef idx="1">
+            <a:schemeClr val="dk1"/>
+          </a:lnRef>
+          <a:fillRef idx="0">
+            <a:schemeClr val="dk1"/>
+          </a:fillRef>
+          <a:effectRef idx="0">
+            <a:schemeClr val="dk1"/>
+          </a:effectRef>
+          <a:fontRef idx="minor">
+            <a:schemeClr val="tx1"/>
+          </a:fontRef>
+        </p:style>
+      </p:cxnSp>
+      <p:pic>
+        <p:nvPicPr>
+          <p:cNvPr id="44" name="Picture 43">
+            <a:extLst>
+              <a:ext uri="{FF2B5EF4-FFF2-40B4-BE49-F238E27FC236}">
+                <a16:creationId xmlns:a16="http://schemas.microsoft.com/office/drawing/2014/main" id="{201C9567-F81D-8C47-81D9-FFD2F5686AB5}"/>
+              </a:ext>
+            </a:extLst>
+          </p:cNvPr>
+          <p:cNvPicPr>
+            <a:picLocks noChangeAspect="1"/>
+          </p:cNvPicPr>
+          <p:nvPr/>
+        </p:nvPicPr>
+        <p:blipFill>
+          <a:blip r:embed="rId4"/>
+          <a:stretch>
+            <a:fillRect/>
+          </a:stretch>
+        </p:blipFill>
+        <p:spPr>
+          <a:xfrm>
+            <a:off x="5339436" y="516215"/>
+            <a:ext cx="5227771" cy="4104356"/>
+          </a:xfrm>
+          <a:prstGeom prst="rect">
+            <a:avLst/>
+          </a:prstGeom>
+        </p:spPr>
+      </p:pic>
+      <p:sp>
+        <p:nvSpPr>
+          <p:cNvPr id="4" name="Oval 3">
+            <a:extLst>
+              <a:ext uri="{FF2B5EF4-FFF2-40B4-BE49-F238E27FC236}">
+                <a16:creationId xmlns:a16="http://schemas.microsoft.com/office/drawing/2014/main" id="{481B0862-5FE3-9B4B-BC61-40C8B433D6AB}"/>
+              </a:ext>
+            </a:extLst>
+          </p:cNvPr>
+          <p:cNvSpPr/>
+          <p:nvPr/>
+        </p:nvSpPr>
+        <p:spPr>
+          <a:xfrm>
+            <a:off x="4016908" y="806746"/>
+            <a:ext cx="273269" cy="274768"/>
+          </a:xfrm>
+          <a:prstGeom prst="ellipse">
+            <a:avLst/>
+          </a:prstGeom>
+          <a:solidFill>
+            <a:srgbClr val="FF61AF"/>
+          </a:solidFill>
+          <a:ln w="12700">
+            <a:solidFill>
+              <a:schemeClr val="bg1"/>
+            </a:solidFill>
+          </a:ln>
+          <a:effectLst>
+            <a:outerShdw blurRad="76200" dist="12700" dir="2700000" algn="tl" rotWithShape="0">
+              <a:prstClr val="black"/>
+            </a:outerShdw>
+          </a:effectLst>
+        </p:spPr>
+        <p:style>
+          <a:lnRef idx="2">
+            <a:schemeClr val="accent1">
+              <a:shade val="50000"/>
+            </a:schemeClr>
+          </a:lnRef>
+          <a:fillRef idx="1">
+            <a:schemeClr val="accent1"/>
+          </a:fillRef>
+          <a:effectRef idx="0">
+            <a:schemeClr val="accent1"/>
+          </a:effectRef>
+          <a:fontRef idx="minor">
+            <a:schemeClr val="lt1"/>
+          </a:fontRef>
+        </p:style>
+        <p:txBody>
+          <a:bodyPr rtlCol="0" anchor="ctr"/>
+          <a:lstStyle/>
+          <a:p>
+            <a:pPr algn="ctr"/>
+            <a:r>
+              <a:rPr lang="en-US" sz="1200" b="1" dirty="0">
+                <a:latin typeface="Helvetica Neue" panose="02000503000000020004" pitchFamily="2" charset="0"/>
+                <a:ea typeface="Helvetica Neue" panose="02000503000000020004" pitchFamily="2" charset="0"/>
+                <a:cs typeface="Helvetica Neue" panose="02000503000000020004" pitchFamily="2" charset="0"/>
+              </a:rPr>
+              <a:t>1</a:t>
+            </a:r>
+          </a:p>
+        </p:txBody>
+      </p:sp>
+      <p:cxnSp>
+        <p:nvCxnSpPr>
+          <p:cNvPr id="3" name="Straight Connector 2">
+            <a:extLst>
+              <a:ext uri="{FF2B5EF4-FFF2-40B4-BE49-F238E27FC236}">
+                <a16:creationId xmlns:a16="http://schemas.microsoft.com/office/drawing/2014/main" id="{5AA1FDF9-201C-7D4C-B282-3D9FAB07BAA0}"/>
+              </a:ext>
+            </a:extLst>
+          </p:cNvPr>
+          <p:cNvCxnSpPr>
+            <a:cxnSpLocks/>
+            <a:stCxn id="4" idx="6"/>
+          </p:cNvCxnSpPr>
+          <p:nvPr/>
+        </p:nvCxnSpPr>
+        <p:spPr>
+          <a:xfrm>
+            <a:off x="4290177" y="944130"/>
+            <a:ext cx="1134578" cy="0"/>
+          </a:xfrm>
+          <a:prstGeom prst="line">
+            <a:avLst/>
+          </a:prstGeom>
+          <a:ln w="25400">
+            <a:solidFill>
+              <a:schemeClr val="bg1"/>
+            </a:solidFill>
+          </a:ln>
+        </p:spPr>
+        <p:style>
+          <a:lnRef idx="1">
+            <a:schemeClr val="dk1"/>
+          </a:lnRef>
+          <a:fillRef idx="0">
+            <a:schemeClr val="dk1"/>
+          </a:fillRef>
+          <a:effectRef idx="0">
+            <a:schemeClr val="dk1"/>
+          </a:effectRef>
+          <a:fontRef idx="minor">
+            <a:schemeClr val="tx1"/>
+          </a:fontRef>
+        </p:style>
+      </p:cxnSp>
+      <p:sp>
+        <p:nvSpPr>
+          <p:cNvPr id="5" name="Oval 4">
+            <a:extLst>
+              <a:ext uri="{FF2B5EF4-FFF2-40B4-BE49-F238E27FC236}">
+                <a16:creationId xmlns:a16="http://schemas.microsoft.com/office/drawing/2014/main" id="{297F11CA-4A28-374D-A09E-A0617E3C9FF8}"/>
+              </a:ext>
+            </a:extLst>
+          </p:cNvPr>
+          <p:cNvSpPr/>
+          <p:nvPr/>
+        </p:nvSpPr>
+        <p:spPr>
+          <a:xfrm>
+            <a:off x="10880536" y="806746"/>
+            <a:ext cx="273269" cy="274768"/>
+          </a:xfrm>
+          <a:prstGeom prst="ellipse">
+            <a:avLst/>
+          </a:prstGeom>
+          <a:solidFill>
+            <a:srgbClr val="FF61AF"/>
+          </a:solidFill>
+          <a:ln w="12700">
+            <a:solidFill>
+              <a:schemeClr val="bg1"/>
+            </a:solidFill>
+          </a:ln>
+          <a:effectLst>
+            <a:outerShdw blurRad="76200" dist="12700" dir="2700000" algn="tl" rotWithShape="0">
+              <a:prstClr val="black"/>
+            </a:outerShdw>
+          </a:effectLst>
+        </p:spPr>
+        <p:style>
+          <a:lnRef idx="2">
+            <a:schemeClr val="accent1">
+              <a:shade val="50000"/>
+            </a:schemeClr>
+          </a:lnRef>
+          <a:fillRef idx="1">
+            <a:schemeClr val="accent1"/>
+          </a:fillRef>
+          <a:effectRef idx="0">
+            <a:schemeClr val="accent1"/>
+          </a:effectRef>
+          <a:fontRef idx="minor">
+            <a:schemeClr val="lt1"/>
+          </a:fontRef>
+        </p:style>
+        <p:txBody>
+          <a:bodyPr rtlCol="0" anchor="ctr"/>
+          <a:lstStyle/>
+          <a:p>
+            <a:pPr algn="ctr"/>
+            <a:r>
+              <a:rPr lang="en-US" sz="1200" b="1" dirty="0">
+                <a:latin typeface="Helvetica Neue" panose="02000503000000020004" pitchFamily="2" charset="0"/>
+                <a:ea typeface="Helvetica Neue" panose="02000503000000020004" pitchFamily="2" charset="0"/>
+                <a:cs typeface="Helvetica Neue" panose="02000503000000020004" pitchFamily="2" charset="0"/>
+              </a:rPr>
+              <a:t>2</a:t>
+            </a:r>
+          </a:p>
+        </p:txBody>
+      </p:sp>
+      <p:cxnSp>
+        <p:nvCxnSpPr>
+          <p:cNvPr id="17" name="Straight Connector 16">
+            <a:extLst>
+              <a:ext uri="{FF2B5EF4-FFF2-40B4-BE49-F238E27FC236}">
+                <a16:creationId xmlns:a16="http://schemas.microsoft.com/office/drawing/2014/main" id="{0163D3A8-97A5-0643-8B2C-C3AD8E96BF97}"/>
+              </a:ext>
+            </a:extLst>
+          </p:cNvPr>
+          <p:cNvCxnSpPr>
+            <a:cxnSpLocks/>
+          </p:cNvCxnSpPr>
+          <p:nvPr/>
+        </p:nvCxnSpPr>
+        <p:spPr>
+          <a:xfrm>
+            <a:off x="8009467" y="944130"/>
+            <a:ext cx="2871069" cy="0"/>
+          </a:xfrm>
+          <a:prstGeom prst="line">
+            <a:avLst/>
+          </a:prstGeom>
+          <a:ln w="25400">
+            <a:solidFill>
+              <a:schemeClr val="bg1"/>
+            </a:solidFill>
+          </a:ln>
+        </p:spPr>
+        <p:style>
+          <a:lnRef idx="1">
+            <a:schemeClr val="dk1"/>
+          </a:lnRef>
+          <a:fillRef idx="0">
+            <a:schemeClr val="dk1"/>
+          </a:fillRef>
+          <a:effectRef idx="0">
+            <a:schemeClr val="dk1"/>
+          </a:effectRef>
+          <a:fontRef idx="minor">
+            <a:schemeClr val="tx1"/>
+          </a:fontRef>
+        </p:style>
+      </p:cxnSp>
+      <p:sp>
+        <p:nvSpPr>
+          <p:cNvPr id="51" name="Oval 50">
+            <a:extLst>
+              <a:ext uri="{FF2B5EF4-FFF2-40B4-BE49-F238E27FC236}">
+                <a16:creationId xmlns:a16="http://schemas.microsoft.com/office/drawing/2014/main" id="{8DA28F2E-5CD3-9B40-A28C-BF94F2945670}"/>
+              </a:ext>
+            </a:extLst>
+          </p:cNvPr>
+          <p:cNvSpPr/>
+          <p:nvPr/>
+        </p:nvSpPr>
+        <p:spPr>
+          <a:xfrm>
+            <a:off x="10880536" y="2507583"/>
+            <a:ext cx="273269" cy="274768"/>
+          </a:xfrm>
+          <a:prstGeom prst="ellipse">
+            <a:avLst/>
+          </a:prstGeom>
+          <a:solidFill>
+            <a:srgbClr val="FF61AF"/>
+          </a:solidFill>
+          <a:ln w="12700">
+            <a:solidFill>
+              <a:schemeClr val="bg1"/>
+            </a:solidFill>
+          </a:ln>
+          <a:effectLst>
+            <a:outerShdw blurRad="76200" dist="12700" dir="2700000" algn="tl" rotWithShape="0">
+              <a:prstClr val="black"/>
+            </a:outerShdw>
+          </a:effectLst>
+        </p:spPr>
+        <p:style>
+          <a:lnRef idx="2">
+            <a:schemeClr val="accent1">
+              <a:shade val="50000"/>
+            </a:schemeClr>
+          </a:lnRef>
+          <a:fillRef idx="1">
+            <a:schemeClr val="accent1"/>
+          </a:fillRef>
+          <a:effectRef idx="0">
+            <a:schemeClr val="accent1"/>
+          </a:effectRef>
+          <a:fontRef idx="minor">
+            <a:schemeClr val="lt1"/>
+          </a:fontRef>
+        </p:style>
+        <p:txBody>
+          <a:bodyPr rtlCol="0" anchor="ctr"/>
+          <a:lstStyle/>
+          <a:p>
+            <a:pPr algn="ctr"/>
+            <a:r>
+              <a:rPr lang="en-US" sz="1200" b="1" dirty="0">
+                <a:latin typeface="Helvetica Neue" panose="02000503000000020004" pitchFamily="2" charset="0"/>
+                <a:ea typeface="Helvetica Neue" panose="02000503000000020004" pitchFamily="2" charset="0"/>
+                <a:cs typeface="Helvetica Neue" panose="02000503000000020004" pitchFamily="2" charset="0"/>
+              </a:rPr>
+              <a:t>7</a:t>
+            </a:r>
+          </a:p>
+        </p:txBody>
+      </p:sp>
+      <p:cxnSp>
+        <p:nvCxnSpPr>
+          <p:cNvPr id="52" name="Straight Connector 51">
+            <a:extLst>
+              <a:ext uri="{FF2B5EF4-FFF2-40B4-BE49-F238E27FC236}">
+                <a16:creationId xmlns:a16="http://schemas.microsoft.com/office/drawing/2014/main" id="{8CE82FFC-9D93-4247-B4D7-25D677C884C8}"/>
+              </a:ext>
+            </a:extLst>
+          </p:cNvPr>
+          <p:cNvCxnSpPr>
+            <a:cxnSpLocks/>
+          </p:cNvCxnSpPr>
+          <p:nvPr/>
+        </p:nvCxnSpPr>
+        <p:spPr>
+          <a:xfrm>
+            <a:off x="8627533" y="2644967"/>
+            <a:ext cx="2253003" cy="0"/>
+          </a:xfrm>
+          <a:prstGeom prst="line">
+            <a:avLst/>
+          </a:prstGeom>
+          <a:ln w="25400">
+            <a:solidFill>
+              <a:schemeClr val="bg1"/>
+            </a:solidFill>
+          </a:ln>
+        </p:spPr>
+        <p:style>
+          <a:lnRef idx="1">
+            <a:schemeClr val="dk1"/>
+          </a:lnRef>
+          <a:fillRef idx="0">
+            <a:schemeClr val="dk1"/>
+          </a:fillRef>
+          <a:effectRef idx="0">
+            <a:schemeClr val="dk1"/>
+          </a:effectRef>
+          <a:fontRef idx="minor">
+            <a:schemeClr val="tx1"/>
+          </a:fontRef>
+        </p:style>
+      </p:cxnSp>
+      <p:cxnSp>
+        <p:nvCxnSpPr>
+          <p:cNvPr id="54" name="Straight Connector 53">
+            <a:extLst>
+              <a:ext uri="{FF2B5EF4-FFF2-40B4-BE49-F238E27FC236}">
+                <a16:creationId xmlns:a16="http://schemas.microsoft.com/office/drawing/2014/main" id="{EC477232-A297-064C-9389-E193CD002324}"/>
+              </a:ext>
+            </a:extLst>
+          </p:cNvPr>
+          <p:cNvCxnSpPr>
+            <a:cxnSpLocks/>
+          </p:cNvCxnSpPr>
+          <p:nvPr/>
+        </p:nvCxnSpPr>
+        <p:spPr>
+          <a:xfrm>
+            <a:off x="8627533" y="2632267"/>
+            <a:ext cx="0" cy="150084"/>
+          </a:xfrm>
+          <a:prstGeom prst="line">
+            <a:avLst/>
+          </a:prstGeom>
+          <a:ln w="25400">
+            <a:solidFill>
+              <a:schemeClr val="bg1"/>
+            </a:solidFill>
+          </a:ln>
+        </p:spPr>
+        <p:style>
+          <a:lnRef idx="1">
+            <a:schemeClr val="dk1"/>
+          </a:lnRef>
+          <a:fillRef idx="0">
+            <a:schemeClr val="dk1"/>
+          </a:fillRef>
+          <a:effectRef idx="0">
+            <a:schemeClr val="dk1"/>
+          </a:effectRef>
+          <a:fontRef idx="minor">
+            <a:schemeClr val="tx1"/>
+          </a:fontRef>
+        </p:style>
+      </p:cxnSp>
+    </p:spTree>
+    <p:extLst>
+      <p:ext uri="{BB962C8B-B14F-4D97-AF65-F5344CB8AC3E}">
+        <p14:creationId xmlns:p14="http://schemas.microsoft.com/office/powerpoint/2010/main" val="2599968867"/>
+      </p:ext>
+    </p:extLst>
+  </p:cSld>
+  <p:clrMapOvr>
+    <a:masterClrMapping/>
+  </p:clrMapOvr>
+</p:sld>
+</file>
+
+<file path=ppt/slides/slide12.xml><?xml version="1.0" encoding="utf-8"?>
+<p:sld xmlns:a="http://schemas.openxmlformats.org/drawingml/2006/main" xmlns:r="http://schemas.openxmlformats.org/officeDocument/2006/relationships" xmlns:p="http://schemas.openxmlformats.org/presentationml/2006/main">
+  <p:cSld>
+    <p:spTree>
+      <p:nvGrpSpPr>
+        <p:cNvPr id="1" name=""/>
+        <p:cNvGrpSpPr/>
+        <p:nvPr/>
+      </p:nvGrpSpPr>
+      <p:grpSpPr>
+        <a:xfrm>
+          <a:off x="0" y="0"/>
+          <a:ext cx="0" cy="0"/>
+          <a:chOff x="0" y="0"/>
+          <a:chExt cx="0" cy="0"/>
+        </a:xfrm>
+      </p:grpSpPr>
+      <p:sp>
+        <p:nvSpPr>
+          <p:cNvPr id="2" name="Rectangle 1">
+            <a:extLst>
+              <a:ext uri="{FF2B5EF4-FFF2-40B4-BE49-F238E27FC236}">
+                <a16:creationId xmlns:a16="http://schemas.microsoft.com/office/drawing/2014/main" id="{82E1466D-D13D-CC40-B9B3-857BD65CA24F}"/>
+              </a:ext>
+            </a:extLst>
+          </p:cNvPr>
+          <p:cNvSpPr/>
+          <p:nvPr/>
+        </p:nvSpPr>
+        <p:spPr>
+          <a:xfrm>
+            <a:off x="0" y="0"/>
+            <a:ext cx="12192000" cy="6858000"/>
+          </a:xfrm>
+          <a:prstGeom prst="rect">
+            <a:avLst/>
+          </a:prstGeom>
+          <a:solidFill>
+            <a:srgbClr val="606060"/>
+          </a:solidFill>
+        </p:spPr>
+        <p:style>
+          <a:lnRef idx="2">
+            <a:schemeClr val="accent1">
+              <a:shade val="50000"/>
+            </a:schemeClr>
+          </a:lnRef>
+          <a:fillRef idx="1">
+            <a:schemeClr val="accent1"/>
+          </a:fillRef>
+          <a:effectRef idx="0">
+            <a:schemeClr val="accent1"/>
+          </a:effectRef>
+          <a:fontRef idx="minor">
+            <a:schemeClr val="lt1"/>
+          </a:fontRef>
+        </p:style>
+        <p:txBody>
+          <a:bodyPr rtlCol="0" anchor="ctr"/>
+          <a:lstStyle/>
+          <a:p>
+            <a:pPr algn="ctr"/>
+            <a:endParaRPr lang="en-US"/>
+          </a:p>
+        </p:txBody>
+      </p:sp>
+      <p:pic>
+        <p:nvPicPr>
+          <p:cNvPr id="4" name="Picture 3">
+            <a:extLst>
+              <a:ext uri="{FF2B5EF4-FFF2-40B4-BE49-F238E27FC236}">
+                <a16:creationId xmlns:a16="http://schemas.microsoft.com/office/drawing/2014/main" id="{DE289443-01E1-8E41-BB2E-2AA8C46485C7}"/>
+              </a:ext>
+            </a:extLst>
+          </p:cNvPr>
+          <p:cNvPicPr>
+            <a:picLocks noChangeAspect="1"/>
+          </p:cNvPicPr>
+          <p:nvPr/>
+        </p:nvPicPr>
+        <p:blipFill>
+          <a:blip r:embed="rId2"/>
+          <a:stretch>
+            <a:fillRect/>
+          </a:stretch>
+        </p:blipFill>
+        <p:spPr>
+          <a:xfrm>
+            <a:off x="215337" y="170744"/>
+            <a:ext cx="5753100" cy="4394200"/>
+          </a:xfrm>
+          <a:prstGeom prst="rect">
+            <a:avLst/>
+          </a:prstGeom>
+        </p:spPr>
+      </p:pic>
+      <p:sp>
+        <p:nvSpPr>
+          <p:cNvPr id="5" name="Rounded Rectangle 4">
+            <a:extLst>
+              <a:ext uri="{FF2B5EF4-FFF2-40B4-BE49-F238E27FC236}">
+                <a16:creationId xmlns:a16="http://schemas.microsoft.com/office/drawing/2014/main" id="{23D9E49B-876B-E440-AAD8-B74F3E991816}"/>
+              </a:ext>
+            </a:extLst>
+          </p:cNvPr>
+          <p:cNvSpPr/>
+          <p:nvPr/>
+        </p:nvSpPr>
+        <p:spPr>
+          <a:xfrm>
+            <a:off x="5407378" y="477304"/>
+            <a:ext cx="444834" cy="331438"/>
+          </a:xfrm>
+          <a:prstGeom prst="roundRect">
+            <a:avLst>
+              <a:gd name="adj" fmla="val 17089"/>
+            </a:avLst>
+          </a:prstGeom>
+          <a:noFill/>
+          <a:ln w="38100">
+            <a:solidFill>
+              <a:srgbClr val="FF61AF"/>
+            </a:solidFill>
+          </a:ln>
+          <a:effectLst>
+            <a:outerShdw blurRad="101600" dist="25400" dir="2700000" algn="tl" rotWithShape="0">
+              <a:prstClr val="black"/>
+            </a:outerShdw>
+          </a:effectLst>
+        </p:spPr>
+        <p:style>
+          <a:lnRef idx="2">
+            <a:schemeClr val="accent1">
+              <a:shade val="50000"/>
+            </a:schemeClr>
+          </a:lnRef>
+          <a:fillRef idx="1">
+            <a:schemeClr val="accent1"/>
+          </a:fillRef>
+          <a:effectRef idx="0">
+            <a:schemeClr val="accent1"/>
+          </a:effectRef>
+          <a:fontRef idx="minor">
+            <a:schemeClr val="lt1"/>
+          </a:fontRef>
+        </p:style>
+        <p:txBody>
+          <a:bodyPr rtlCol="0" anchor="ctr"/>
+          <a:lstStyle/>
+          <a:p>
+            <a:pPr algn="ctr"/>
+            <a:endParaRPr lang="en-US"/>
+          </a:p>
+        </p:txBody>
+      </p:sp>
+      <p:sp>
+        <p:nvSpPr>
+          <p:cNvPr id="6" name="Rounded Rectangle 5">
+            <a:extLst>
+              <a:ext uri="{FF2B5EF4-FFF2-40B4-BE49-F238E27FC236}">
+                <a16:creationId xmlns:a16="http://schemas.microsoft.com/office/drawing/2014/main" id="{01611822-8D56-3F4D-8C1B-E190B1B01F15}"/>
+              </a:ext>
+            </a:extLst>
+          </p:cNvPr>
+          <p:cNvSpPr/>
+          <p:nvPr/>
+        </p:nvSpPr>
+        <p:spPr>
+          <a:xfrm>
+            <a:off x="2207436" y="4185306"/>
+            <a:ext cx="1435831" cy="331438"/>
+          </a:xfrm>
+          <a:prstGeom prst="roundRect">
+            <a:avLst>
+              <a:gd name="adj" fmla="val 17089"/>
+            </a:avLst>
+          </a:prstGeom>
+          <a:noFill/>
+          <a:ln w="38100">
+            <a:solidFill>
+              <a:srgbClr val="FF61AF"/>
+            </a:solidFill>
+          </a:ln>
+          <a:effectLst>
+            <a:outerShdw blurRad="101600" dist="25400" dir="2700000" algn="tl" rotWithShape="0">
+              <a:prstClr val="black"/>
+            </a:outerShdw>
+          </a:effectLst>
+        </p:spPr>
+        <p:style>
+          <a:lnRef idx="2">
+            <a:schemeClr val="accent1">
+              <a:shade val="50000"/>
+            </a:schemeClr>
+          </a:lnRef>
+          <a:fillRef idx="1">
+            <a:schemeClr val="accent1"/>
+          </a:fillRef>
+          <a:effectRef idx="0">
+            <a:schemeClr val="accent1"/>
+          </a:effectRef>
+          <a:fontRef idx="minor">
+            <a:schemeClr val="lt1"/>
+          </a:fontRef>
+        </p:style>
+        <p:txBody>
+          <a:bodyPr rtlCol="0" anchor="ctr"/>
+          <a:lstStyle/>
+          <a:p>
+            <a:pPr algn="ctr"/>
+            <a:endParaRPr lang="en-US"/>
+          </a:p>
+        </p:txBody>
+      </p:sp>
+      <p:pic>
+        <p:nvPicPr>
+          <p:cNvPr id="8" name="Picture 7">
+            <a:extLst>
+              <a:ext uri="{FF2B5EF4-FFF2-40B4-BE49-F238E27FC236}">
+                <a16:creationId xmlns:a16="http://schemas.microsoft.com/office/drawing/2014/main" id="{39763D68-D1CE-7749-85CE-BAF36D63B846}"/>
+              </a:ext>
+            </a:extLst>
+          </p:cNvPr>
+          <p:cNvPicPr>
+            <a:picLocks noChangeAspect="1"/>
+          </p:cNvPicPr>
+          <p:nvPr/>
+        </p:nvPicPr>
+        <p:blipFill>
+          <a:blip r:embed="rId3"/>
+          <a:stretch>
+            <a:fillRect/>
+          </a:stretch>
+        </p:blipFill>
+        <p:spPr>
+          <a:xfrm>
+            <a:off x="6223565" y="1335616"/>
+            <a:ext cx="5791200" cy="5270500"/>
+          </a:xfrm>
+          <a:prstGeom prst="rect">
+            <a:avLst/>
+          </a:prstGeom>
+        </p:spPr>
+      </p:pic>
+      <p:sp>
+        <p:nvSpPr>
+          <p:cNvPr id="9" name="Rounded Rectangle 8">
+            <a:extLst>
+              <a:ext uri="{FF2B5EF4-FFF2-40B4-BE49-F238E27FC236}">
+                <a16:creationId xmlns:a16="http://schemas.microsoft.com/office/drawing/2014/main" id="{73DC1FE7-59FE-AE47-BCB6-B6B2A320783A}"/>
+              </a:ext>
+            </a:extLst>
+          </p:cNvPr>
+          <p:cNvSpPr/>
+          <p:nvPr/>
+        </p:nvSpPr>
+        <p:spPr>
+          <a:xfrm>
+            <a:off x="8240889" y="6212242"/>
+            <a:ext cx="1919111" cy="393874"/>
+          </a:xfrm>
+          <a:prstGeom prst="roundRect">
+            <a:avLst>
+              <a:gd name="adj" fmla="val 17089"/>
+            </a:avLst>
+          </a:prstGeom>
+          <a:noFill/>
+          <a:ln w="38100">
+            <a:solidFill>
+              <a:srgbClr val="FF61AF"/>
+            </a:solidFill>
+          </a:ln>
+          <a:effectLst>
+            <a:outerShdw blurRad="101600" dist="25400" dir="2700000" algn="tl" rotWithShape="0">
+              <a:prstClr val="black"/>
+            </a:outerShdw>
+          </a:effectLst>
+        </p:spPr>
+        <p:style>
+          <a:lnRef idx="2">
+            <a:schemeClr val="accent1">
+              <a:shade val="50000"/>
+            </a:schemeClr>
+          </a:lnRef>
+          <a:fillRef idx="1">
+            <a:schemeClr val="accent1"/>
+          </a:fillRef>
+          <a:effectRef idx="0">
+            <a:schemeClr val="accent1"/>
+          </a:effectRef>
+          <a:fontRef idx="minor">
+            <a:schemeClr val="lt1"/>
+          </a:fontRef>
+        </p:style>
+        <p:txBody>
+          <a:bodyPr rtlCol="0" anchor="ctr"/>
+          <a:lstStyle/>
+          <a:p>
+            <a:pPr algn="ctr"/>
+            <a:endParaRPr lang="en-US"/>
+          </a:p>
+        </p:txBody>
+      </p:sp>
+      <p:sp>
+        <p:nvSpPr>
+          <p:cNvPr id="10" name="Rounded Rectangle 9">
+            <a:extLst>
+              <a:ext uri="{FF2B5EF4-FFF2-40B4-BE49-F238E27FC236}">
+                <a16:creationId xmlns:a16="http://schemas.microsoft.com/office/drawing/2014/main" id="{48DC67D2-5470-8244-808D-7611F687F015}"/>
+              </a:ext>
+            </a:extLst>
+          </p:cNvPr>
+          <p:cNvSpPr/>
+          <p:nvPr/>
+        </p:nvSpPr>
+        <p:spPr>
+          <a:xfrm>
+            <a:off x="11436132" y="1690859"/>
+            <a:ext cx="444834" cy="331438"/>
+          </a:xfrm>
+          <a:prstGeom prst="roundRect">
+            <a:avLst>
+              <a:gd name="adj" fmla="val 17089"/>
+            </a:avLst>
+          </a:prstGeom>
+          <a:noFill/>
+          <a:ln w="38100">
+            <a:solidFill>
+              <a:srgbClr val="FF61AF"/>
+            </a:solidFill>
+          </a:ln>
+          <a:effectLst>
+            <a:outerShdw blurRad="101600" dist="25400" dir="2700000" algn="tl" rotWithShape="0">
+              <a:prstClr val="black"/>
+            </a:outerShdw>
+          </a:effectLst>
+        </p:spPr>
+        <p:style>
+          <a:lnRef idx="2">
+            <a:schemeClr val="accent1">
+              <a:shade val="50000"/>
+            </a:schemeClr>
+          </a:lnRef>
+          <a:fillRef idx="1">
+            <a:schemeClr val="accent1"/>
+          </a:fillRef>
+          <a:effectRef idx="0">
+            <a:schemeClr val="accent1"/>
+          </a:effectRef>
+          <a:fontRef idx="minor">
+            <a:schemeClr val="lt1"/>
+          </a:fontRef>
+        </p:style>
+        <p:txBody>
+          <a:bodyPr rtlCol="0" anchor="ctr"/>
+          <a:lstStyle/>
+          <a:p>
+            <a:pPr algn="ctr"/>
+            <a:endParaRPr lang="en-US"/>
+          </a:p>
+        </p:txBody>
+      </p:sp>
+    </p:spTree>
+    <p:extLst>
+      <p:ext uri="{BB962C8B-B14F-4D97-AF65-F5344CB8AC3E}">
+        <p14:creationId xmlns:p14="http://schemas.microsoft.com/office/powerpoint/2010/main" val="135307084"/>
       </p:ext>
     </p:extLst>
   </p:cSld>
@@ -6025,7 +7710,7 @@
         </p:blipFill>
         <p:spPr>
           <a:xfrm>
-            <a:off x="4076700" y="1028701"/>
+            <a:off x="873077" y="3331467"/>
             <a:ext cx="2557348" cy="3039866"/>
           </a:xfrm>
           <a:prstGeom prst="rect">
@@ -6047,7 +7732,7 @@
         </p:nvSpPr>
         <p:spPr>
           <a:xfrm>
-            <a:off x="4076700" y="3384550"/>
+            <a:off x="873077" y="5687316"/>
             <a:ext cx="859340" cy="266700"/>
           </a:xfrm>
           <a:prstGeom prst="roundRect">
@@ -6104,8 +7789,648 @@
         </p:nvSpPr>
         <p:spPr>
           <a:xfrm>
-            <a:off x="4076700" y="1028701"/>
+            <a:off x="873077" y="3331467"/>
             <a:ext cx="943721" cy="220384"/>
+          </a:xfrm>
+          <a:prstGeom prst="roundRect">
+            <a:avLst/>
+          </a:prstGeom>
+          <a:noFill/>
+          <a:ln w="25400">
+            <a:solidFill>
+              <a:srgbClr val="FF61AF"/>
+            </a:solidFill>
+          </a:ln>
+          <a:effectLst>
+            <a:outerShdw blurRad="101600" dist="25400" dir="2700000" algn="tl" rotWithShape="0">
+              <a:prstClr val="black"/>
+            </a:outerShdw>
+          </a:effectLst>
+        </p:spPr>
+        <p:style>
+          <a:lnRef idx="2">
+            <a:schemeClr val="accent1">
+              <a:shade val="50000"/>
+            </a:schemeClr>
+          </a:lnRef>
+          <a:fillRef idx="1">
+            <a:schemeClr val="accent1"/>
+          </a:fillRef>
+          <a:effectRef idx="0">
+            <a:schemeClr val="accent1"/>
+          </a:effectRef>
+          <a:fontRef idx="minor">
+            <a:schemeClr val="lt1"/>
+          </a:fontRef>
+        </p:style>
+        <p:txBody>
+          <a:bodyPr rtlCol="0" anchor="ctr"/>
+          <a:lstStyle/>
+          <a:p>
+            <a:pPr algn="ctr"/>
+            <a:endParaRPr lang="en-US"/>
+          </a:p>
+        </p:txBody>
+      </p:sp>
+      <p:pic>
+        <p:nvPicPr>
+          <p:cNvPr id="7" name="Picture 6">
+            <a:extLst>
+              <a:ext uri="{FF2B5EF4-FFF2-40B4-BE49-F238E27FC236}">
+                <a16:creationId xmlns:a16="http://schemas.microsoft.com/office/drawing/2014/main" id="{B616824C-B29D-8648-AE5D-CEF5B2D226E8}"/>
+              </a:ext>
+            </a:extLst>
+          </p:cNvPr>
+          <p:cNvPicPr>
+            <a:picLocks noChangeAspect="1"/>
+          </p:cNvPicPr>
+          <p:nvPr/>
+        </p:nvPicPr>
+        <p:blipFill>
+          <a:blip r:embed="rId3"/>
+          <a:stretch>
+            <a:fillRect/>
+          </a:stretch>
+        </p:blipFill>
+        <p:spPr>
+          <a:xfrm>
+            <a:off x="6496050" y="4555233"/>
+            <a:ext cx="5168900" cy="1816100"/>
+          </a:xfrm>
+          <a:prstGeom prst="rect">
+            <a:avLst/>
+          </a:prstGeom>
+        </p:spPr>
+      </p:pic>
+      <p:sp>
+        <p:nvSpPr>
+          <p:cNvPr id="8" name="Oval 7">
+            <a:extLst>
+              <a:ext uri="{FF2B5EF4-FFF2-40B4-BE49-F238E27FC236}">
+                <a16:creationId xmlns:a16="http://schemas.microsoft.com/office/drawing/2014/main" id="{AE8DDC25-D2F4-D940-B38B-0DDEDE6A82C3}"/>
+              </a:ext>
+            </a:extLst>
+          </p:cNvPr>
+          <p:cNvSpPr/>
+          <p:nvPr/>
+        </p:nvSpPr>
+        <p:spPr>
+          <a:xfrm>
+            <a:off x="5490647" y="4959884"/>
+            <a:ext cx="273269" cy="274768"/>
+          </a:xfrm>
+          <a:prstGeom prst="ellipse">
+            <a:avLst/>
+          </a:prstGeom>
+          <a:solidFill>
+            <a:srgbClr val="FF61AF"/>
+          </a:solidFill>
+          <a:ln w="12700">
+            <a:solidFill>
+              <a:schemeClr val="bg1"/>
+            </a:solidFill>
+          </a:ln>
+          <a:effectLst>
+            <a:outerShdw blurRad="76200" dist="12700" dir="2700000" algn="tl" rotWithShape="0">
+              <a:prstClr val="black"/>
+            </a:outerShdw>
+          </a:effectLst>
+        </p:spPr>
+        <p:style>
+          <a:lnRef idx="2">
+            <a:schemeClr val="accent1">
+              <a:shade val="50000"/>
+            </a:schemeClr>
+          </a:lnRef>
+          <a:fillRef idx="1">
+            <a:schemeClr val="accent1"/>
+          </a:fillRef>
+          <a:effectRef idx="0">
+            <a:schemeClr val="accent1"/>
+          </a:effectRef>
+          <a:fontRef idx="minor">
+            <a:schemeClr val="lt1"/>
+          </a:fontRef>
+        </p:style>
+        <p:txBody>
+          <a:bodyPr rtlCol="0" anchor="ctr"/>
+          <a:lstStyle/>
+          <a:p>
+            <a:pPr algn="ctr"/>
+            <a:r>
+              <a:rPr lang="en-US" sz="1200" b="1" dirty="0">
+                <a:latin typeface="Helvetica Neue" panose="02000503000000020004" pitchFamily="2" charset="0"/>
+                <a:ea typeface="Helvetica Neue" panose="02000503000000020004" pitchFamily="2" charset="0"/>
+                <a:cs typeface="Helvetica Neue" panose="02000503000000020004" pitchFamily="2" charset="0"/>
+              </a:rPr>
+              <a:t>1</a:t>
+            </a:r>
+          </a:p>
+        </p:txBody>
+      </p:sp>
+      <p:sp>
+        <p:nvSpPr>
+          <p:cNvPr id="9" name="Oval 8">
+            <a:extLst>
+              <a:ext uri="{FF2B5EF4-FFF2-40B4-BE49-F238E27FC236}">
+                <a16:creationId xmlns:a16="http://schemas.microsoft.com/office/drawing/2014/main" id="{E2827B58-31EF-FF4C-A76E-38673603E2CE}"/>
+              </a:ext>
+            </a:extLst>
+          </p:cNvPr>
+          <p:cNvSpPr/>
+          <p:nvPr/>
+        </p:nvSpPr>
+        <p:spPr>
+          <a:xfrm>
+            <a:off x="5091880" y="5255691"/>
+            <a:ext cx="273269" cy="274768"/>
+          </a:xfrm>
+          <a:prstGeom prst="ellipse">
+            <a:avLst/>
+          </a:prstGeom>
+          <a:solidFill>
+            <a:srgbClr val="FF61AF"/>
+          </a:solidFill>
+          <a:ln w="12700">
+            <a:solidFill>
+              <a:schemeClr val="bg1"/>
+            </a:solidFill>
+          </a:ln>
+          <a:effectLst>
+            <a:outerShdw blurRad="76200" dist="12700" dir="2700000" algn="tl" rotWithShape="0">
+              <a:prstClr val="black"/>
+            </a:outerShdw>
+          </a:effectLst>
+        </p:spPr>
+        <p:style>
+          <a:lnRef idx="2">
+            <a:schemeClr val="accent1">
+              <a:shade val="50000"/>
+            </a:schemeClr>
+          </a:lnRef>
+          <a:fillRef idx="1">
+            <a:schemeClr val="accent1"/>
+          </a:fillRef>
+          <a:effectRef idx="0">
+            <a:schemeClr val="accent1"/>
+          </a:effectRef>
+          <a:fontRef idx="minor">
+            <a:schemeClr val="lt1"/>
+          </a:fontRef>
+        </p:style>
+        <p:txBody>
+          <a:bodyPr rtlCol="0" anchor="ctr"/>
+          <a:lstStyle/>
+          <a:p>
+            <a:pPr algn="ctr"/>
+            <a:r>
+              <a:rPr lang="en-US" sz="1200" b="1" dirty="0">
+                <a:latin typeface="Helvetica Neue" panose="02000503000000020004" pitchFamily="2" charset="0"/>
+                <a:ea typeface="Helvetica Neue" panose="02000503000000020004" pitchFamily="2" charset="0"/>
+                <a:cs typeface="Helvetica Neue" panose="02000503000000020004" pitchFamily="2" charset="0"/>
+              </a:rPr>
+              <a:t>2</a:t>
+            </a:r>
+          </a:p>
+        </p:txBody>
+      </p:sp>
+      <p:sp>
+        <p:nvSpPr>
+          <p:cNvPr id="10" name="Oval 9">
+            <a:extLst>
+              <a:ext uri="{FF2B5EF4-FFF2-40B4-BE49-F238E27FC236}">
+                <a16:creationId xmlns:a16="http://schemas.microsoft.com/office/drawing/2014/main" id="{5C744A59-44D9-A14E-9F11-95E58C90A1A2}"/>
+              </a:ext>
+            </a:extLst>
+          </p:cNvPr>
+          <p:cNvSpPr/>
+          <p:nvPr/>
+        </p:nvSpPr>
+        <p:spPr>
+          <a:xfrm>
+            <a:off x="5490653" y="5559396"/>
+            <a:ext cx="273269" cy="274768"/>
+          </a:xfrm>
+          <a:prstGeom prst="ellipse">
+            <a:avLst/>
+          </a:prstGeom>
+          <a:solidFill>
+            <a:srgbClr val="FF61AF"/>
+          </a:solidFill>
+          <a:ln w="12700">
+            <a:solidFill>
+              <a:schemeClr val="bg1"/>
+            </a:solidFill>
+          </a:ln>
+          <a:effectLst>
+            <a:outerShdw blurRad="76200" dist="12700" dir="2700000" algn="tl" rotWithShape="0">
+              <a:prstClr val="black"/>
+            </a:outerShdw>
+          </a:effectLst>
+        </p:spPr>
+        <p:style>
+          <a:lnRef idx="2">
+            <a:schemeClr val="accent1">
+              <a:shade val="50000"/>
+            </a:schemeClr>
+          </a:lnRef>
+          <a:fillRef idx="1">
+            <a:schemeClr val="accent1"/>
+          </a:fillRef>
+          <a:effectRef idx="0">
+            <a:schemeClr val="accent1"/>
+          </a:effectRef>
+          <a:fontRef idx="minor">
+            <a:schemeClr val="lt1"/>
+          </a:fontRef>
+        </p:style>
+        <p:txBody>
+          <a:bodyPr rtlCol="0" anchor="ctr"/>
+          <a:lstStyle/>
+          <a:p>
+            <a:pPr algn="ctr"/>
+            <a:r>
+              <a:rPr lang="en-US" sz="1200" b="1" dirty="0">
+                <a:latin typeface="Helvetica Neue" panose="02000503000000020004" pitchFamily="2" charset="0"/>
+                <a:ea typeface="Helvetica Neue" panose="02000503000000020004" pitchFamily="2" charset="0"/>
+                <a:cs typeface="Helvetica Neue" panose="02000503000000020004" pitchFamily="2" charset="0"/>
+              </a:rPr>
+              <a:t>3</a:t>
+            </a:r>
+          </a:p>
+        </p:txBody>
+      </p:sp>
+      <p:sp>
+        <p:nvSpPr>
+          <p:cNvPr id="11" name="Oval 10">
+            <a:extLst>
+              <a:ext uri="{FF2B5EF4-FFF2-40B4-BE49-F238E27FC236}">
+                <a16:creationId xmlns:a16="http://schemas.microsoft.com/office/drawing/2014/main" id="{C5A41492-0B1A-C949-9FD7-F8BDC8D94053}"/>
+              </a:ext>
+            </a:extLst>
+          </p:cNvPr>
+          <p:cNvSpPr/>
+          <p:nvPr/>
+        </p:nvSpPr>
+        <p:spPr>
+          <a:xfrm>
+            <a:off x="5100724" y="5903838"/>
+            <a:ext cx="273269" cy="274768"/>
+          </a:xfrm>
+          <a:prstGeom prst="ellipse">
+            <a:avLst/>
+          </a:prstGeom>
+          <a:solidFill>
+            <a:srgbClr val="FF61AF"/>
+          </a:solidFill>
+          <a:ln w="12700">
+            <a:solidFill>
+              <a:schemeClr val="bg1"/>
+            </a:solidFill>
+          </a:ln>
+          <a:effectLst>
+            <a:outerShdw blurRad="76200" dist="12700" dir="2700000" algn="tl" rotWithShape="0">
+              <a:prstClr val="black"/>
+            </a:outerShdw>
+          </a:effectLst>
+        </p:spPr>
+        <p:style>
+          <a:lnRef idx="2">
+            <a:schemeClr val="accent1">
+              <a:shade val="50000"/>
+            </a:schemeClr>
+          </a:lnRef>
+          <a:fillRef idx="1">
+            <a:schemeClr val="accent1"/>
+          </a:fillRef>
+          <a:effectRef idx="0">
+            <a:schemeClr val="accent1"/>
+          </a:effectRef>
+          <a:fontRef idx="minor">
+            <a:schemeClr val="lt1"/>
+          </a:fontRef>
+        </p:style>
+        <p:txBody>
+          <a:bodyPr rtlCol="0" anchor="ctr"/>
+          <a:lstStyle/>
+          <a:p>
+            <a:pPr algn="ctr"/>
+            <a:r>
+              <a:rPr lang="en-US" sz="1200" b="1" dirty="0">
+                <a:latin typeface="Helvetica Neue" panose="02000503000000020004" pitchFamily="2" charset="0"/>
+                <a:ea typeface="Helvetica Neue" panose="02000503000000020004" pitchFamily="2" charset="0"/>
+                <a:cs typeface="Helvetica Neue" panose="02000503000000020004" pitchFamily="2" charset="0"/>
+              </a:rPr>
+              <a:t>4</a:t>
+            </a:r>
+          </a:p>
+        </p:txBody>
+      </p:sp>
+      <p:cxnSp>
+        <p:nvCxnSpPr>
+          <p:cNvPr id="12" name="Straight Connector 11">
+            <a:extLst>
+              <a:ext uri="{FF2B5EF4-FFF2-40B4-BE49-F238E27FC236}">
+                <a16:creationId xmlns:a16="http://schemas.microsoft.com/office/drawing/2014/main" id="{02053E82-628D-914B-B9E8-F5C8F033E29A}"/>
+              </a:ext>
+            </a:extLst>
+          </p:cNvPr>
+          <p:cNvCxnSpPr>
+            <a:stCxn id="8" idx="6"/>
+          </p:cNvCxnSpPr>
+          <p:nvPr/>
+        </p:nvCxnSpPr>
+        <p:spPr>
+          <a:xfrm flipV="1">
+            <a:off x="5763916" y="5095124"/>
+            <a:ext cx="664167" cy="2144"/>
+          </a:xfrm>
+          <a:prstGeom prst="line">
+            <a:avLst/>
+          </a:prstGeom>
+          <a:ln w="25400">
+            <a:solidFill>
+              <a:schemeClr val="bg1"/>
+            </a:solidFill>
+          </a:ln>
+        </p:spPr>
+        <p:style>
+          <a:lnRef idx="1">
+            <a:schemeClr val="dk1"/>
+          </a:lnRef>
+          <a:fillRef idx="0">
+            <a:schemeClr val="dk1"/>
+          </a:fillRef>
+          <a:effectRef idx="0">
+            <a:schemeClr val="dk1"/>
+          </a:effectRef>
+          <a:fontRef idx="minor">
+            <a:schemeClr val="tx1"/>
+          </a:fontRef>
+        </p:style>
+      </p:cxnSp>
+      <p:cxnSp>
+        <p:nvCxnSpPr>
+          <p:cNvPr id="13" name="Straight Connector 12">
+            <a:extLst>
+              <a:ext uri="{FF2B5EF4-FFF2-40B4-BE49-F238E27FC236}">
+                <a16:creationId xmlns:a16="http://schemas.microsoft.com/office/drawing/2014/main" id="{620EC8A9-11D8-2640-B972-34E623070E02}"/>
+              </a:ext>
+            </a:extLst>
+          </p:cNvPr>
+          <p:cNvCxnSpPr>
+            <a:cxnSpLocks/>
+          </p:cNvCxnSpPr>
+          <p:nvPr/>
+        </p:nvCxnSpPr>
+        <p:spPr>
+          <a:xfrm>
+            <a:off x="5363867" y="5392848"/>
+            <a:ext cx="1064216" cy="0"/>
+          </a:xfrm>
+          <a:prstGeom prst="line">
+            <a:avLst/>
+          </a:prstGeom>
+          <a:ln w="25400">
+            <a:solidFill>
+              <a:schemeClr val="bg1"/>
+            </a:solidFill>
+          </a:ln>
+        </p:spPr>
+        <p:style>
+          <a:lnRef idx="1">
+            <a:schemeClr val="dk1"/>
+          </a:lnRef>
+          <a:fillRef idx="0">
+            <a:schemeClr val="dk1"/>
+          </a:fillRef>
+          <a:effectRef idx="0">
+            <a:schemeClr val="dk1"/>
+          </a:effectRef>
+          <a:fontRef idx="minor">
+            <a:schemeClr val="tx1"/>
+          </a:fontRef>
+        </p:style>
+      </p:cxnSp>
+      <p:cxnSp>
+        <p:nvCxnSpPr>
+          <p:cNvPr id="14" name="Straight Connector 13">
+            <a:extLst>
+              <a:ext uri="{FF2B5EF4-FFF2-40B4-BE49-F238E27FC236}">
+                <a16:creationId xmlns:a16="http://schemas.microsoft.com/office/drawing/2014/main" id="{EAE659CA-1395-1246-BD18-B21AC4F4B563}"/>
+              </a:ext>
+            </a:extLst>
+          </p:cNvPr>
+          <p:cNvCxnSpPr/>
+          <p:nvPr/>
+        </p:nvCxnSpPr>
+        <p:spPr>
+          <a:xfrm flipV="1">
+            <a:off x="5763916" y="5694636"/>
+            <a:ext cx="664167" cy="2144"/>
+          </a:xfrm>
+          <a:prstGeom prst="line">
+            <a:avLst/>
+          </a:prstGeom>
+          <a:ln w="25400">
+            <a:solidFill>
+              <a:schemeClr val="bg1"/>
+            </a:solidFill>
+          </a:ln>
+        </p:spPr>
+        <p:style>
+          <a:lnRef idx="1">
+            <a:schemeClr val="dk1"/>
+          </a:lnRef>
+          <a:fillRef idx="0">
+            <a:schemeClr val="dk1"/>
+          </a:fillRef>
+          <a:effectRef idx="0">
+            <a:schemeClr val="dk1"/>
+          </a:effectRef>
+          <a:fontRef idx="minor">
+            <a:schemeClr val="tx1"/>
+          </a:fontRef>
+        </p:style>
+      </p:cxnSp>
+      <p:cxnSp>
+        <p:nvCxnSpPr>
+          <p:cNvPr id="15" name="Straight Connector 14">
+            <a:extLst>
+              <a:ext uri="{FF2B5EF4-FFF2-40B4-BE49-F238E27FC236}">
+                <a16:creationId xmlns:a16="http://schemas.microsoft.com/office/drawing/2014/main" id="{DB251BD0-A2AD-D14F-A159-980EC096884D}"/>
+              </a:ext>
+            </a:extLst>
+          </p:cNvPr>
+          <p:cNvCxnSpPr>
+            <a:cxnSpLocks/>
+          </p:cNvCxnSpPr>
+          <p:nvPr/>
+        </p:nvCxnSpPr>
+        <p:spPr>
+          <a:xfrm>
+            <a:off x="5363867" y="6024502"/>
+            <a:ext cx="1064216" cy="0"/>
+          </a:xfrm>
+          <a:prstGeom prst="line">
+            <a:avLst/>
+          </a:prstGeom>
+          <a:ln w="25400">
+            <a:solidFill>
+              <a:schemeClr val="bg1"/>
+            </a:solidFill>
+          </a:ln>
+        </p:spPr>
+        <p:style>
+          <a:lnRef idx="1">
+            <a:schemeClr val="dk1"/>
+          </a:lnRef>
+          <a:fillRef idx="0">
+            <a:schemeClr val="dk1"/>
+          </a:fillRef>
+          <a:effectRef idx="0">
+            <a:schemeClr val="dk1"/>
+          </a:effectRef>
+          <a:fontRef idx="minor">
+            <a:schemeClr val="tx1"/>
+          </a:fontRef>
+        </p:style>
+      </p:cxnSp>
+      <p:pic>
+        <p:nvPicPr>
+          <p:cNvPr id="19" name="Picture 18">
+            <a:extLst>
+              <a:ext uri="{FF2B5EF4-FFF2-40B4-BE49-F238E27FC236}">
+                <a16:creationId xmlns:a16="http://schemas.microsoft.com/office/drawing/2014/main" id="{F12B1DBE-40F5-264A-9AB9-675A95A6BD91}"/>
+              </a:ext>
+            </a:extLst>
+          </p:cNvPr>
+          <p:cNvPicPr>
+            <a:picLocks noChangeAspect="1"/>
+          </p:cNvPicPr>
+          <p:nvPr/>
+        </p:nvPicPr>
+        <p:blipFill>
+          <a:blip r:embed="rId4"/>
+          <a:stretch>
+            <a:fillRect/>
+          </a:stretch>
+        </p:blipFill>
+        <p:spPr>
+          <a:xfrm>
+            <a:off x="5632787" y="398313"/>
+            <a:ext cx="5208533" cy="3829198"/>
+          </a:xfrm>
+          <a:prstGeom prst="rect">
+            <a:avLst/>
+          </a:prstGeom>
+        </p:spPr>
+      </p:pic>
+      <p:sp>
+        <p:nvSpPr>
+          <p:cNvPr id="20" name="Rounded Rectangle 19">
+            <a:extLst>
+              <a:ext uri="{FF2B5EF4-FFF2-40B4-BE49-F238E27FC236}">
+                <a16:creationId xmlns:a16="http://schemas.microsoft.com/office/drawing/2014/main" id="{0E51F889-A439-C345-855E-0C0603EA7AE1}"/>
+              </a:ext>
+            </a:extLst>
+          </p:cNvPr>
+          <p:cNvSpPr/>
+          <p:nvPr/>
+        </p:nvSpPr>
+        <p:spPr>
+          <a:xfrm>
+            <a:off x="5632787" y="1045299"/>
+            <a:ext cx="5084831" cy="2335619"/>
+          </a:xfrm>
+          <a:prstGeom prst="roundRect">
+            <a:avLst>
+              <a:gd name="adj" fmla="val 3465"/>
+            </a:avLst>
+          </a:prstGeom>
+          <a:noFill/>
+          <a:ln w="38100">
+            <a:solidFill>
+              <a:srgbClr val="FF61AF"/>
+            </a:solidFill>
+          </a:ln>
+          <a:effectLst>
+            <a:outerShdw blurRad="101600" dist="25400" dir="2700000" algn="tl" rotWithShape="0">
+              <a:prstClr val="black"/>
+            </a:outerShdw>
+          </a:effectLst>
+        </p:spPr>
+        <p:style>
+          <a:lnRef idx="2">
+            <a:schemeClr val="accent1">
+              <a:shade val="50000"/>
+            </a:schemeClr>
+          </a:lnRef>
+          <a:fillRef idx="1">
+            <a:schemeClr val="accent1"/>
+          </a:fillRef>
+          <a:effectRef idx="0">
+            <a:schemeClr val="accent1"/>
+          </a:effectRef>
+          <a:fontRef idx="minor">
+            <a:schemeClr val="lt1"/>
+          </a:fontRef>
+        </p:style>
+        <p:txBody>
+          <a:bodyPr rtlCol="0" anchor="ctr"/>
+          <a:lstStyle/>
+          <a:p>
+            <a:pPr algn="ctr"/>
+            <a:endParaRPr lang="en-US"/>
+          </a:p>
+        </p:txBody>
+      </p:sp>
+      <p:pic>
+        <p:nvPicPr>
+          <p:cNvPr id="22" name="Picture 21">
+            <a:extLst>
+              <a:ext uri="{FF2B5EF4-FFF2-40B4-BE49-F238E27FC236}">
+                <a16:creationId xmlns:a16="http://schemas.microsoft.com/office/drawing/2014/main" id="{1548ABB4-80B0-EA4A-A1A9-826E3BBF46BD}"/>
+              </a:ext>
+            </a:extLst>
+          </p:cNvPr>
+          <p:cNvPicPr>
+            <a:picLocks noChangeAspect="1"/>
+          </p:cNvPicPr>
+          <p:nvPr/>
+        </p:nvPicPr>
+        <p:blipFill>
+          <a:blip r:embed="rId5"/>
+          <a:stretch>
+            <a:fillRect/>
+          </a:stretch>
+        </p:blipFill>
+        <p:spPr>
+          <a:xfrm>
+            <a:off x="282114" y="472601"/>
+            <a:ext cx="5208533" cy="2274747"/>
+          </a:xfrm>
+          <a:prstGeom prst="rect">
+            <a:avLst/>
+          </a:prstGeom>
+        </p:spPr>
+      </p:pic>
+      <p:sp>
+        <p:nvSpPr>
+          <p:cNvPr id="23" name="Rounded Rectangle 22">
+            <a:extLst>
+              <a:ext uri="{FF2B5EF4-FFF2-40B4-BE49-F238E27FC236}">
+                <a16:creationId xmlns:a16="http://schemas.microsoft.com/office/drawing/2014/main" id="{A0CC1968-A726-9947-96BA-BFEF21436316}"/>
+              </a:ext>
+            </a:extLst>
+          </p:cNvPr>
+          <p:cNvSpPr/>
+          <p:nvPr/>
+        </p:nvSpPr>
+        <p:spPr>
+          <a:xfrm>
+            <a:off x="303380" y="1810841"/>
+            <a:ext cx="2217570" cy="220384"/>
           </a:xfrm>
           <a:prstGeom prst="roundRect">
             <a:avLst/>

</xml_diff>

<commit_message>
Update screenshots in user guide with latest UI (#12)
User guide had images of the older UI for spawners. This has now been updated
and includes updated annotations and outlines to ensure consistency across the 
user guide.
</commit_message>
<xml_diff>
--- a/docs/user-guide/image-source/Images.pptx
+++ b/docs/user-guide/image-source/Images.pptx
@@ -13,6 +13,10 @@
     <p:sldId id="259" r:id="rId7"/>
     <p:sldId id="261" r:id="rId8"/>
     <p:sldId id="264" r:id="rId9"/>
+    <p:sldId id="265" r:id="rId10"/>
+    <p:sldId id="266" r:id="rId11"/>
+    <p:sldId id="267" r:id="rId12"/>
+    <p:sldId id="268" r:id="rId13"/>
   </p:sldIdLst>
   <p:sldSz cx="12192000" cy="6858000"/>
   <p:notesSz cx="6858000" cy="9144000"/>
@@ -266,7 +270,7 @@
           <a:p>
             <a:fld id="{5E193FAB-CF9D-2A41-8ED8-3EDE309B28B8}" type="datetimeFigureOut">
               <a:rPr lang="en-US" smtClean="0"/>
-              <a:t>11/30/21</a:t>
+              <a:t>12/14/21</a:t>
             </a:fld>
             <a:endParaRPr lang="en-US"/>
           </a:p>
@@ -464,7 +468,7 @@
           <a:p>
             <a:fld id="{5E193FAB-CF9D-2A41-8ED8-3EDE309B28B8}" type="datetimeFigureOut">
               <a:rPr lang="en-US" smtClean="0"/>
-              <a:t>11/30/21</a:t>
+              <a:t>12/14/21</a:t>
             </a:fld>
             <a:endParaRPr lang="en-US"/>
           </a:p>
@@ -672,7 +676,7 @@
           <a:p>
             <a:fld id="{5E193FAB-CF9D-2A41-8ED8-3EDE309B28B8}" type="datetimeFigureOut">
               <a:rPr lang="en-US" smtClean="0"/>
-              <a:t>11/30/21</a:t>
+              <a:t>12/14/21</a:t>
             </a:fld>
             <a:endParaRPr lang="en-US"/>
           </a:p>
@@ -870,7 +874,7 @@
           <a:p>
             <a:fld id="{5E193FAB-CF9D-2A41-8ED8-3EDE309B28B8}" type="datetimeFigureOut">
               <a:rPr lang="en-US" smtClean="0"/>
-              <a:t>11/30/21</a:t>
+              <a:t>12/14/21</a:t>
             </a:fld>
             <a:endParaRPr lang="en-US"/>
           </a:p>
@@ -1145,7 +1149,7 @@
           <a:p>
             <a:fld id="{5E193FAB-CF9D-2A41-8ED8-3EDE309B28B8}" type="datetimeFigureOut">
               <a:rPr lang="en-US" smtClean="0"/>
-              <a:t>11/30/21</a:t>
+              <a:t>12/14/21</a:t>
             </a:fld>
             <a:endParaRPr lang="en-US"/>
           </a:p>
@@ -1410,7 +1414,7 @@
           <a:p>
             <a:fld id="{5E193FAB-CF9D-2A41-8ED8-3EDE309B28B8}" type="datetimeFigureOut">
               <a:rPr lang="en-US" smtClean="0"/>
-              <a:t>11/30/21</a:t>
+              <a:t>12/14/21</a:t>
             </a:fld>
             <a:endParaRPr lang="en-US"/>
           </a:p>
@@ -1822,7 +1826,7 @@
           <a:p>
             <a:fld id="{5E193FAB-CF9D-2A41-8ED8-3EDE309B28B8}" type="datetimeFigureOut">
               <a:rPr lang="en-US" smtClean="0"/>
-              <a:t>11/30/21</a:t>
+              <a:t>12/14/21</a:t>
             </a:fld>
             <a:endParaRPr lang="en-US"/>
           </a:p>
@@ -1963,7 +1967,7 @@
           <a:p>
             <a:fld id="{5E193FAB-CF9D-2A41-8ED8-3EDE309B28B8}" type="datetimeFigureOut">
               <a:rPr lang="en-US" smtClean="0"/>
-              <a:t>11/30/21</a:t>
+              <a:t>12/14/21</a:t>
             </a:fld>
             <a:endParaRPr lang="en-US"/>
           </a:p>
@@ -2076,7 +2080,7 @@
           <a:p>
             <a:fld id="{5E193FAB-CF9D-2A41-8ED8-3EDE309B28B8}" type="datetimeFigureOut">
               <a:rPr lang="en-US" smtClean="0"/>
-              <a:t>11/30/21</a:t>
+              <a:t>12/14/21</a:t>
             </a:fld>
             <a:endParaRPr lang="en-US"/>
           </a:p>
@@ -2387,7 +2391,7 @@
           <a:p>
             <a:fld id="{5E193FAB-CF9D-2A41-8ED8-3EDE309B28B8}" type="datetimeFigureOut">
               <a:rPr lang="en-US" smtClean="0"/>
-              <a:t>11/30/21</a:t>
+              <a:t>12/14/21</a:t>
             </a:fld>
             <a:endParaRPr lang="en-US"/>
           </a:p>
@@ -2675,7 +2679,7 @@
           <a:p>
             <a:fld id="{5E193FAB-CF9D-2A41-8ED8-3EDE309B28B8}" type="datetimeFigureOut">
               <a:rPr lang="en-US" smtClean="0"/>
-              <a:t>11/30/21</a:t>
+              <a:t>12/14/21</a:t>
             </a:fld>
             <a:endParaRPr lang="en-US"/>
           </a:p>
@@ -2916,7 +2920,7 @@
           <a:p>
             <a:fld id="{5E193FAB-CF9D-2A41-8ED8-3EDE309B28B8}" type="datetimeFigureOut">
               <a:rPr lang="en-US" smtClean="0"/>
-              <a:t>11/30/21</a:t>
+              <a:t>12/14/21</a:t>
             </a:fld>
             <a:endParaRPr lang="en-US"/>
           </a:p>
@@ -3433,6 +3437,2922 @@
 </p:sld>
 </file>
 
+<file path=ppt/slides/slide10.xml><?xml version="1.0" encoding="utf-8"?>
+<p:sld xmlns:a="http://schemas.openxmlformats.org/drawingml/2006/main" xmlns:r="http://schemas.openxmlformats.org/officeDocument/2006/relationships" xmlns:p="http://schemas.openxmlformats.org/presentationml/2006/main">
+  <p:cSld>
+    <p:spTree>
+      <p:nvGrpSpPr>
+        <p:cNvPr id="1" name=""/>
+        <p:cNvGrpSpPr/>
+        <p:nvPr/>
+      </p:nvGrpSpPr>
+      <p:grpSpPr>
+        <a:xfrm>
+          <a:off x="0" y="0"/>
+          <a:ext cx="0" cy="0"/>
+          <a:chOff x="0" y="0"/>
+          <a:chExt cx="0" cy="0"/>
+        </a:xfrm>
+      </p:grpSpPr>
+      <p:pic>
+        <p:nvPicPr>
+          <p:cNvPr id="14" name="Picture 13">
+            <a:extLst>
+              <a:ext uri="{FF2B5EF4-FFF2-40B4-BE49-F238E27FC236}">
+                <a16:creationId xmlns:a16="http://schemas.microsoft.com/office/drawing/2014/main" id="{7D7D3C3B-2FC4-9E4A-BC29-E8A1525AE243}"/>
+              </a:ext>
+            </a:extLst>
+          </p:cNvPr>
+          <p:cNvPicPr>
+            <a:picLocks noChangeAspect="1"/>
+          </p:cNvPicPr>
+          <p:nvPr/>
+        </p:nvPicPr>
+        <p:blipFill>
+          <a:blip r:embed="rId2"/>
+          <a:stretch>
+            <a:fillRect/>
+          </a:stretch>
+        </p:blipFill>
+        <p:spPr>
+          <a:xfrm>
+            <a:off x="4849904" y="674815"/>
+            <a:ext cx="5031431" cy="4862104"/>
+          </a:xfrm>
+          <a:prstGeom prst="rect">
+            <a:avLst/>
+          </a:prstGeom>
+        </p:spPr>
+      </p:pic>
+      <p:pic>
+        <p:nvPicPr>
+          <p:cNvPr id="32" name="Picture 31">
+            <a:extLst>
+              <a:ext uri="{FF2B5EF4-FFF2-40B4-BE49-F238E27FC236}">
+                <a16:creationId xmlns:a16="http://schemas.microsoft.com/office/drawing/2014/main" id="{24746DF3-ECA5-984B-8324-22A4D144DB71}"/>
+              </a:ext>
+            </a:extLst>
+          </p:cNvPr>
+          <p:cNvPicPr>
+            <a:picLocks noChangeAspect="1"/>
+          </p:cNvPicPr>
+          <p:nvPr/>
+        </p:nvPicPr>
+        <p:blipFill>
+          <a:blip r:embed="rId3"/>
+          <a:stretch>
+            <a:fillRect/>
+          </a:stretch>
+        </p:blipFill>
+        <p:spPr>
+          <a:xfrm>
+            <a:off x="4862929" y="674815"/>
+            <a:ext cx="5350887" cy="4862104"/>
+          </a:xfrm>
+          <a:prstGeom prst="rect">
+            <a:avLst/>
+          </a:prstGeom>
+        </p:spPr>
+      </p:pic>
+      <p:sp>
+        <p:nvSpPr>
+          <p:cNvPr id="15" name="Rectangle 14">
+            <a:extLst>
+              <a:ext uri="{FF2B5EF4-FFF2-40B4-BE49-F238E27FC236}">
+                <a16:creationId xmlns:a16="http://schemas.microsoft.com/office/drawing/2014/main" id="{9A9ABCE7-A39B-D74F-A71F-22F9A819F55C}"/>
+              </a:ext>
+            </a:extLst>
+          </p:cNvPr>
+          <p:cNvSpPr/>
+          <p:nvPr/>
+        </p:nvSpPr>
+        <p:spPr>
+          <a:xfrm>
+            <a:off x="0" y="0"/>
+            <a:ext cx="12192000" cy="6858000"/>
+          </a:xfrm>
+          <a:prstGeom prst="rect">
+            <a:avLst/>
+          </a:prstGeom>
+          <a:solidFill>
+            <a:srgbClr val="606060"/>
+          </a:solidFill>
+        </p:spPr>
+        <p:style>
+          <a:lnRef idx="2">
+            <a:schemeClr val="accent1">
+              <a:shade val="50000"/>
+            </a:schemeClr>
+          </a:lnRef>
+          <a:fillRef idx="1">
+            <a:schemeClr val="accent1"/>
+          </a:fillRef>
+          <a:effectRef idx="0">
+            <a:schemeClr val="accent1"/>
+          </a:effectRef>
+          <a:fontRef idx="minor">
+            <a:schemeClr val="lt1"/>
+          </a:fontRef>
+        </p:style>
+        <p:txBody>
+          <a:bodyPr rtlCol="0" anchor="ctr"/>
+          <a:lstStyle/>
+          <a:p>
+            <a:pPr algn="ctr"/>
+            <a:endParaRPr lang="en-US"/>
+          </a:p>
+        </p:txBody>
+      </p:sp>
+      <p:sp>
+        <p:nvSpPr>
+          <p:cNvPr id="4" name="Oval 3">
+            <a:extLst>
+              <a:ext uri="{FF2B5EF4-FFF2-40B4-BE49-F238E27FC236}">
+                <a16:creationId xmlns:a16="http://schemas.microsoft.com/office/drawing/2014/main" id="{481B0862-5FE3-9B4B-BC61-40C8B433D6AB}"/>
+              </a:ext>
+            </a:extLst>
+          </p:cNvPr>
+          <p:cNvSpPr/>
+          <p:nvPr/>
+        </p:nvSpPr>
+        <p:spPr>
+          <a:xfrm>
+            <a:off x="3840047" y="1091282"/>
+            <a:ext cx="273269" cy="274768"/>
+          </a:xfrm>
+          <a:prstGeom prst="ellipse">
+            <a:avLst/>
+          </a:prstGeom>
+          <a:solidFill>
+            <a:srgbClr val="FF61AF"/>
+          </a:solidFill>
+          <a:ln w="12700">
+            <a:solidFill>
+              <a:schemeClr val="bg1"/>
+            </a:solidFill>
+          </a:ln>
+          <a:effectLst>
+            <a:outerShdw blurRad="76200" dist="12700" dir="2700000" algn="tl" rotWithShape="0">
+              <a:prstClr val="black"/>
+            </a:outerShdw>
+          </a:effectLst>
+        </p:spPr>
+        <p:style>
+          <a:lnRef idx="2">
+            <a:schemeClr val="accent1">
+              <a:shade val="50000"/>
+            </a:schemeClr>
+          </a:lnRef>
+          <a:fillRef idx="1">
+            <a:schemeClr val="accent1"/>
+          </a:fillRef>
+          <a:effectRef idx="0">
+            <a:schemeClr val="accent1"/>
+          </a:effectRef>
+          <a:fontRef idx="minor">
+            <a:schemeClr val="lt1"/>
+          </a:fontRef>
+        </p:style>
+        <p:txBody>
+          <a:bodyPr rtlCol="0" anchor="ctr"/>
+          <a:lstStyle/>
+          <a:p>
+            <a:pPr algn="ctr"/>
+            <a:r>
+              <a:rPr lang="en-US" sz="1200" b="1" dirty="0">
+                <a:latin typeface="Helvetica Neue" panose="02000503000000020004" pitchFamily="2" charset="0"/>
+                <a:ea typeface="Helvetica Neue" panose="02000503000000020004" pitchFamily="2" charset="0"/>
+                <a:cs typeface="Helvetica Neue" panose="02000503000000020004" pitchFamily="2" charset="0"/>
+              </a:rPr>
+              <a:t>1</a:t>
+            </a:r>
+          </a:p>
+        </p:txBody>
+      </p:sp>
+      <p:sp>
+        <p:nvSpPr>
+          <p:cNvPr id="5" name="Oval 4">
+            <a:extLst>
+              <a:ext uri="{FF2B5EF4-FFF2-40B4-BE49-F238E27FC236}">
+                <a16:creationId xmlns:a16="http://schemas.microsoft.com/office/drawing/2014/main" id="{297F11CA-4A28-374D-A09E-A0617E3C9FF8}"/>
+              </a:ext>
+            </a:extLst>
+          </p:cNvPr>
+          <p:cNvSpPr/>
+          <p:nvPr/>
+        </p:nvSpPr>
+        <p:spPr>
+          <a:xfrm>
+            <a:off x="3850170" y="1881914"/>
+            <a:ext cx="273269" cy="274768"/>
+          </a:xfrm>
+          <a:prstGeom prst="ellipse">
+            <a:avLst/>
+          </a:prstGeom>
+          <a:solidFill>
+            <a:srgbClr val="FF61AF"/>
+          </a:solidFill>
+          <a:ln w="12700">
+            <a:solidFill>
+              <a:schemeClr val="bg1"/>
+            </a:solidFill>
+          </a:ln>
+          <a:effectLst>
+            <a:outerShdw blurRad="76200" dist="12700" dir="2700000" algn="tl" rotWithShape="0">
+              <a:prstClr val="black"/>
+            </a:outerShdw>
+          </a:effectLst>
+        </p:spPr>
+        <p:style>
+          <a:lnRef idx="2">
+            <a:schemeClr val="accent1">
+              <a:shade val="50000"/>
+            </a:schemeClr>
+          </a:lnRef>
+          <a:fillRef idx="1">
+            <a:schemeClr val="accent1"/>
+          </a:fillRef>
+          <a:effectRef idx="0">
+            <a:schemeClr val="accent1"/>
+          </a:effectRef>
+          <a:fontRef idx="minor">
+            <a:schemeClr val="lt1"/>
+          </a:fontRef>
+        </p:style>
+        <p:txBody>
+          <a:bodyPr rtlCol="0" anchor="ctr"/>
+          <a:lstStyle/>
+          <a:p>
+            <a:pPr algn="ctr"/>
+            <a:r>
+              <a:rPr lang="en-US" sz="1200" b="1" dirty="0">
+                <a:latin typeface="Helvetica Neue" panose="02000503000000020004" pitchFamily="2" charset="0"/>
+                <a:ea typeface="Helvetica Neue" panose="02000503000000020004" pitchFamily="2" charset="0"/>
+                <a:cs typeface="Helvetica Neue" panose="02000503000000020004" pitchFamily="2" charset="0"/>
+              </a:rPr>
+              <a:t>2</a:t>
+            </a:r>
+          </a:p>
+        </p:txBody>
+      </p:sp>
+      <p:sp>
+        <p:nvSpPr>
+          <p:cNvPr id="6" name="Oval 5">
+            <a:extLst>
+              <a:ext uri="{FF2B5EF4-FFF2-40B4-BE49-F238E27FC236}">
+                <a16:creationId xmlns:a16="http://schemas.microsoft.com/office/drawing/2014/main" id="{4F5F5F24-60CE-3342-9DE6-24855CF519DA}"/>
+              </a:ext>
+            </a:extLst>
+          </p:cNvPr>
+          <p:cNvSpPr/>
+          <p:nvPr/>
+        </p:nvSpPr>
+        <p:spPr>
+          <a:xfrm>
+            <a:off x="3838763" y="2573470"/>
+            <a:ext cx="273269" cy="274768"/>
+          </a:xfrm>
+          <a:prstGeom prst="ellipse">
+            <a:avLst/>
+          </a:prstGeom>
+          <a:solidFill>
+            <a:srgbClr val="FF61AF"/>
+          </a:solidFill>
+          <a:ln w="12700">
+            <a:solidFill>
+              <a:schemeClr val="bg1"/>
+            </a:solidFill>
+          </a:ln>
+          <a:effectLst>
+            <a:outerShdw blurRad="76200" dist="12700" dir="2700000" algn="tl" rotWithShape="0">
+              <a:prstClr val="black"/>
+            </a:outerShdw>
+          </a:effectLst>
+        </p:spPr>
+        <p:style>
+          <a:lnRef idx="2">
+            <a:schemeClr val="accent1">
+              <a:shade val="50000"/>
+            </a:schemeClr>
+          </a:lnRef>
+          <a:fillRef idx="1">
+            <a:schemeClr val="accent1"/>
+          </a:fillRef>
+          <a:effectRef idx="0">
+            <a:schemeClr val="accent1"/>
+          </a:effectRef>
+          <a:fontRef idx="minor">
+            <a:schemeClr val="lt1"/>
+          </a:fontRef>
+        </p:style>
+        <p:txBody>
+          <a:bodyPr rtlCol="0" anchor="ctr"/>
+          <a:lstStyle/>
+          <a:p>
+            <a:pPr algn="ctr"/>
+            <a:r>
+              <a:rPr lang="en-US" sz="1200" b="1" dirty="0">
+                <a:latin typeface="Helvetica Neue" panose="02000503000000020004" pitchFamily="2" charset="0"/>
+                <a:ea typeface="Helvetica Neue" panose="02000503000000020004" pitchFamily="2" charset="0"/>
+                <a:cs typeface="Helvetica Neue" panose="02000503000000020004" pitchFamily="2" charset="0"/>
+              </a:rPr>
+              <a:t>3</a:t>
+            </a:r>
+          </a:p>
+        </p:txBody>
+      </p:sp>
+      <p:sp>
+        <p:nvSpPr>
+          <p:cNvPr id="7" name="Oval 6">
+            <a:extLst>
+              <a:ext uri="{FF2B5EF4-FFF2-40B4-BE49-F238E27FC236}">
+                <a16:creationId xmlns:a16="http://schemas.microsoft.com/office/drawing/2014/main" id="{7FAAAE00-C48F-6840-B6FD-474139F3E8EA}"/>
+              </a:ext>
+            </a:extLst>
+          </p:cNvPr>
+          <p:cNvSpPr/>
+          <p:nvPr/>
+        </p:nvSpPr>
+        <p:spPr>
+          <a:xfrm>
+            <a:off x="3832073" y="3043692"/>
+            <a:ext cx="273269" cy="274768"/>
+          </a:xfrm>
+          <a:prstGeom prst="ellipse">
+            <a:avLst/>
+          </a:prstGeom>
+          <a:solidFill>
+            <a:srgbClr val="FF61AF"/>
+          </a:solidFill>
+          <a:ln w="12700">
+            <a:solidFill>
+              <a:schemeClr val="bg1"/>
+            </a:solidFill>
+          </a:ln>
+          <a:effectLst>
+            <a:outerShdw blurRad="76200" dist="12700" dir="2700000" algn="tl" rotWithShape="0">
+              <a:prstClr val="black"/>
+            </a:outerShdw>
+          </a:effectLst>
+        </p:spPr>
+        <p:style>
+          <a:lnRef idx="2">
+            <a:schemeClr val="accent1">
+              <a:shade val="50000"/>
+            </a:schemeClr>
+          </a:lnRef>
+          <a:fillRef idx="1">
+            <a:schemeClr val="accent1"/>
+          </a:fillRef>
+          <a:effectRef idx="0">
+            <a:schemeClr val="accent1"/>
+          </a:effectRef>
+          <a:fontRef idx="minor">
+            <a:schemeClr val="lt1"/>
+          </a:fontRef>
+        </p:style>
+        <p:txBody>
+          <a:bodyPr rtlCol="0" anchor="ctr"/>
+          <a:lstStyle/>
+          <a:p>
+            <a:pPr algn="ctr"/>
+            <a:r>
+              <a:rPr lang="en-US" sz="1200" b="1" dirty="0">
+                <a:latin typeface="Helvetica Neue" panose="02000503000000020004" pitchFamily="2" charset="0"/>
+                <a:ea typeface="Helvetica Neue" panose="02000503000000020004" pitchFamily="2" charset="0"/>
+                <a:cs typeface="Helvetica Neue" panose="02000503000000020004" pitchFamily="2" charset="0"/>
+              </a:rPr>
+              <a:t>4</a:t>
+            </a:r>
+          </a:p>
+        </p:txBody>
+      </p:sp>
+      <p:sp>
+        <p:nvSpPr>
+          <p:cNvPr id="9" name="Oval 8">
+            <a:extLst>
+              <a:ext uri="{FF2B5EF4-FFF2-40B4-BE49-F238E27FC236}">
+                <a16:creationId xmlns:a16="http://schemas.microsoft.com/office/drawing/2014/main" id="{7F822D7C-E19C-954B-A21A-F0741CF32DF2}"/>
+              </a:ext>
+            </a:extLst>
+          </p:cNvPr>
+          <p:cNvSpPr/>
+          <p:nvPr/>
+        </p:nvSpPr>
+        <p:spPr>
+          <a:xfrm>
+            <a:off x="3827496" y="3634748"/>
+            <a:ext cx="273269" cy="274768"/>
+          </a:xfrm>
+          <a:prstGeom prst="ellipse">
+            <a:avLst/>
+          </a:prstGeom>
+          <a:solidFill>
+            <a:srgbClr val="FF61AF"/>
+          </a:solidFill>
+          <a:ln w="12700">
+            <a:solidFill>
+              <a:schemeClr val="bg1"/>
+            </a:solidFill>
+          </a:ln>
+          <a:effectLst>
+            <a:outerShdw blurRad="76200" dist="12700" dir="2700000" algn="tl" rotWithShape="0">
+              <a:prstClr val="black"/>
+            </a:outerShdw>
+          </a:effectLst>
+        </p:spPr>
+        <p:style>
+          <a:lnRef idx="2">
+            <a:schemeClr val="accent1">
+              <a:shade val="50000"/>
+            </a:schemeClr>
+          </a:lnRef>
+          <a:fillRef idx="1">
+            <a:schemeClr val="accent1"/>
+          </a:fillRef>
+          <a:effectRef idx="0">
+            <a:schemeClr val="accent1"/>
+          </a:effectRef>
+          <a:fontRef idx="minor">
+            <a:schemeClr val="lt1"/>
+          </a:fontRef>
+        </p:style>
+        <p:txBody>
+          <a:bodyPr rtlCol="0" anchor="ctr"/>
+          <a:lstStyle/>
+          <a:p>
+            <a:pPr algn="ctr"/>
+            <a:r>
+              <a:rPr lang="en-US" sz="1200" b="1" dirty="0">
+                <a:latin typeface="Helvetica Neue" panose="02000503000000020004" pitchFamily="2" charset="0"/>
+                <a:ea typeface="Helvetica Neue" panose="02000503000000020004" pitchFamily="2" charset="0"/>
+                <a:cs typeface="Helvetica Neue" panose="02000503000000020004" pitchFamily="2" charset="0"/>
+              </a:rPr>
+              <a:t>5</a:t>
+            </a:r>
+          </a:p>
+        </p:txBody>
+      </p:sp>
+      <p:sp>
+        <p:nvSpPr>
+          <p:cNvPr id="10" name="Oval 9">
+            <a:extLst>
+              <a:ext uri="{FF2B5EF4-FFF2-40B4-BE49-F238E27FC236}">
+                <a16:creationId xmlns:a16="http://schemas.microsoft.com/office/drawing/2014/main" id="{2E93B5BF-6E44-C643-8713-91FCA4A2E8C5}"/>
+              </a:ext>
+            </a:extLst>
+          </p:cNvPr>
+          <p:cNvSpPr/>
+          <p:nvPr/>
+        </p:nvSpPr>
+        <p:spPr>
+          <a:xfrm>
+            <a:off x="3830114" y="4230437"/>
+            <a:ext cx="273269" cy="274768"/>
+          </a:xfrm>
+          <a:prstGeom prst="ellipse">
+            <a:avLst/>
+          </a:prstGeom>
+          <a:solidFill>
+            <a:srgbClr val="FF61AF"/>
+          </a:solidFill>
+          <a:ln w="12700">
+            <a:solidFill>
+              <a:schemeClr val="bg1"/>
+            </a:solidFill>
+          </a:ln>
+          <a:effectLst>
+            <a:outerShdw blurRad="76200" dist="12700" dir="2700000" algn="tl" rotWithShape="0">
+              <a:prstClr val="black"/>
+            </a:outerShdw>
+          </a:effectLst>
+        </p:spPr>
+        <p:style>
+          <a:lnRef idx="2">
+            <a:schemeClr val="accent1">
+              <a:shade val="50000"/>
+            </a:schemeClr>
+          </a:lnRef>
+          <a:fillRef idx="1">
+            <a:schemeClr val="accent1"/>
+          </a:fillRef>
+          <a:effectRef idx="0">
+            <a:schemeClr val="accent1"/>
+          </a:effectRef>
+          <a:fontRef idx="minor">
+            <a:schemeClr val="lt1"/>
+          </a:fontRef>
+        </p:style>
+        <p:txBody>
+          <a:bodyPr rtlCol="0" anchor="ctr"/>
+          <a:lstStyle/>
+          <a:p>
+            <a:pPr algn="ctr"/>
+            <a:r>
+              <a:rPr lang="en-US" sz="1200" b="1" dirty="0">
+                <a:latin typeface="Helvetica Neue" panose="02000503000000020004" pitchFamily="2" charset="0"/>
+                <a:ea typeface="Helvetica Neue" panose="02000503000000020004" pitchFamily="2" charset="0"/>
+                <a:cs typeface="Helvetica Neue" panose="02000503000000020004" pitchFamily="2" charset="0"/>
+              </a:rPr>
+              <a:t>6</a:t>
+            </a:r>
+          </a:p>
+        </p:txBody>
+      </p:sp>
+      <p:sp>
+        <p:nvSpPr>
+          <p:cNvPr id="11" name="Oval 10">
+            <a:extLst>
+              <a:ext uri="{FF2B5EF4-FFF2-40B4-BE49-F238E27FC236}">
+                <a16:creationId xmlns:a16="http://schemas.microsoft.com/office/drawing/2014/main" id="{0B78891E-B6C1-6E48-85FE-433CE03B9BA7}"/>
+              </a:ext>
+            </a:extLst>
+          </p:cNvPr>
+          <p:cNvSpPr/>
+          <p:nvPr/>
+        </p:nvSpPr>
+        <p:spPr>
+          <a:xfrm>
+            <a:off x="3828824" y="4564370"/>
+            <a:ext cx="273269" cy="274768"/>
+          </a:xfrm>
+          <a:prstGeom prst="ellipse">
+            <a:avLst/>
+          </a:prstGeom>
+          <a:solidFill>
+            <a:srgbClr val="FF61AF"/>
+          </a:solidFill>
+          <a:ln w="12700">
+            <a:solidFill>
+              <a:schemeClr val="bg1"/>
+            </a:solidFill>
+          </a:ln>
+          <a:effectLst>
+            <a:outerShdw blurRad="76200" dist="12700" dir="2700000" algn="tl" rotWithShape="0">
+              <a:prstClr val="black"/>
+            </a:outerShdw>
+          </a:effectLst>
+        </p:spPr>
+        <p:style>
+          <a:lnRef idx="2">
+            <a:schemeClr val="accent1">
+              <a:shade val="50000"/>
+            </a:schemeClr>
+          </a:lnRef>
+          <a:fillRef idx="1">
+            <a:schemeClr val="accent1"/>
+          </a:fillRef>
+          <a:effectRef idx="0">
+            <a:schemeClr val="accent1"/>
+          </a:effectRef>
+          <a:fontRef idx="minor">
+            <a:schemeClr val="lt1"/>
+          </a:fontRef>
+        </p:style>
+        <p:txBody>
+          <a:bodyPr rtlCol="0" anchor="ctr"/>
+          <a:lstStyle/>
+          <a:p>
+            <a:pPr algn="ctr"/>
+            <a:r>
+              <a:rPr lang="en-US" sz="1200" b="1" dirty="0">
+                <a:latin typeface="Helvetica Neue" panose="02000503000000020004" pitchFamily="2" charset="0"/>
+                <a:ea typeface="Helvetica Neue" panose="02000503000000020004" pitchFamily="2" charset="0"/>
+                <a:cs typeface="Helvetica Neue" panose="02000503000000020004" pitchFamily="2" charset="0"/>
+              </a:rPr>
+              <a:t>7</a:t>
+            </a:r>
+          </a:p>
+        </p:txBody>
+      </p:sp>
+      <p:sp>
+        <p:nvSpPr>
+          <p:cNvPr id="12" name="Oval 11">
+            <a:extLst>
+              <a:ext uri="{FF2B5EF4-FFF2-40B4-BE49-F238E27FC236}">
+                <a16:creationId xmlns:a16="http://schemas.microsoft.com/office/drawing/2014/main" id="{1ECF5D27-7043-3C45-99A3-48ED5A83C719}"/>
+              </a:ext>
+            </a:extLst>
+          </p:cNvPr>
+          <p:cNvSpPr/>
+          <p:nvPr/>
+        </p:nvSpPr>
+        <p:spPr>
+          <a:xfrm>
+            <a:off x="3838764" y="5032984"/>
+            <a:ext cx="273269" cy="274768"/>
+          </a:xfrm>
+          <a:prstGeom prst="ellipse">
+            <a:avLst/>
+          </a:prstGeom>
+          <a:solidFill>
+            <a:srgbClr val="FF61AF"/>
+          </a:solidFill>
+          <a:ln w="12700">
+            <a:solidFill>
+              <a:schemeClr val="bg1"/>
+            </a:solidFill>
+          </a:ln>
+          <a:effectLst>
+            <a:outerShdw blurRad="76200" dist="12700" dir="2700000" algn="tl" rotWithShape="0">
+              <a:prstClr val="black"/>
+            </a:outerShdw>
+          </a:effectLst>
+        </p:spPr>
+        <p:style>
+          <a:lnRef idx="2">
+            <a:schemeClr val="accent1">
+              <a:shade val="50000"/>
+            </a:schemeClr>
+          </a:lnRef>
+          <a:fillRef idx="1">
+            <a:schemeClr val="accent1"/>
+          </a:fillRef>
+          <a:effectRef idx="0">
+            <a:schemeClr val="accent1"/>
+          </a:effectRef>
+          <a:fontRef idx="minor">
+            <a:schemeClr val="lt1"/>
+          </a:fontRef>
+        </p:style>
+        <p:txBody>
+          <a:bodyPr rtlCol="0" anchor="ctr"/>
+          <a:lstStyle/>
+          <a:p>
+            <a:pPr algn="ctr"/>
+            <a:r>
+              <a:rPr lang="en-US" sz="1200" b="1" dirty="0">
+                <a:latin typeface="Helvetica Neue" panose="02000503000000020004" pitchFamily="2" charset="0"/>
+                <a:ea typeface="Helvetica Neue" panose="02000503000000020004" pitchFamily="2" charset="0"/>
+                <a:cs typeface="Helvetica Neue" panose="02000503000000020004" pitchFamily="2" charset="0"/>
+              </a:rPr>
+              <a:t>8</a:t>
+            </a:r>
+          </a:p>
+        </p:txBody>
+      </p:sp>
+      <p:cxnSp>
+        <p:nvCxnSpPr>
+          <p:cNvPr id="3" name="Straight Connector 2">
+            <a:extLst>
+              <a:ext uri="{FF2B5EF4-FFF2-40B4-BE49-F238E27FC236}">
+                <a16:creationId xmlns:a16="http://schemas.microsoft.com/office/drawing/2014/main" id="{5AA1FDF9-201C-7D4C-B282-3D9FAB07BAA0}"/>
+              </a:ext>
+            </a:extLst>
+          </p:cNvPr>
+          <p:cNvCxnSpPr>
+            <a:stCxn id="4" idx="6"/>
+          </p:cNvCxnSpPr>
+          <p:nvPr/>
+        </p:nvCxnSpPr>
+        <p:spPr>
+          <a:xfrm flipV="1">
+            <a:off x="4113316" y="1226522"/>
+            <a:ext cx="664167" cy="2144"/>
+          </a:xfrm>
+          <a:prstGeom prst="line">
+            <a:avLst/>
+          </a:prstGeom>
+          <a:ln w="25400">
+            <a:solidFill>
+              <a:schemeClr val="bg1"/>
+            </a:solidFill>
+          </a:ln>
+        </p:spPr>
+        <p:style>
+          <a:lnRef idx="1">
+            <a:schemeClr val="dk1"/>
+          </a:lnRef>
+          <a:fillRef idx="0">
+            <a:schemeClr val="dk1"/>
+          </a:fillRef>
+          <a:effectRef idx="0">
+            <a:schemeClr val="dk1"/>
+          </a:effectRef>
+          <a:fontRef idx="minor">
+            <a:schemeClr val="tx1"/>
+          </a:fontRef>
+        </p:style>
+      </p:cxnSp>
+      <p:cxnSp>
+        <p:nvCxnSpPr>
+          <p:cNvPr id="17" name="Straight Connector 16">
+            <a:extLst>
+              <a:ext uri="{FF2B5EF4-FFF2-40B4-BE49-F238E27FC236}">
+                <a16:creationId xmlns:a16="http://schemas.microsoft.com/office/drawing/2014/main" id="{0163D3A8-97A5-0643-8B2C-C3AD8E96BF97}"/>
+              </a:ext>
+            </a:extLst>
+          </p:cNvPr>
+          <p:cNvCxnSpPr/>
+          <p:nvPr/>
+        </p:nvCxnSpPr>
+        <p:spPr>
+          <a:xfrm flipV="1">
+            <a:off x="4122157" y="2016927"/>
+            <a:ext cx="664167" cy="2144"/>
+          </a:xfrm>
+          <a:prstGeom prst="line">
+            <a:avLst/>
+          </a:prstGeom>
+          <a:ln w="25400">
+            <a:solidFill>
+              <a:schemeClr val="bg1"/>
+            </a:solidFill>
+          </a:ln>
+        </p:spPr>
+        <p:style>
+          <a:lnRef idx="1">
+            <a:schemeClr val="dk1"/>
+          </a:lnRef>
+          <a:fillRef idx="0">
+            <a:schemeClr val="dk1"/>
+          </a:fillRef>
+          <a:effectRef idx="0">
+            <a:schemeClr val="dk1"/>
+          </a:effectRef>
+          <a:fontRef idx="minor">
+            <a:schemeClr val="tx1"/>
+          </a:fontRef>
+        </p:style>
+      </p:cxnSp>
+      <p:cxnSp>
+        <p:nvCxnSpPr>
+          <p:cNvPr id="21" name="Straight Connector 20">
+            <a:extLst>
+              <a:ext uri="{FF2B5EF4-FFF2-40B4-BE49-F238E27FC236}">
+                <a16:creationId xmlns:a16="http://schemas.microsoft.com/office/drawing/2014/main" id="{C2E2A4B5-9CAB-DE41-9877-63D9252C71EE}"/>
+              </a:ext>
+            </a:extLst>
+          </p:cNvPr>
+          <p:cNvCxnSpPr/>
+          <p:nvPr/>
+        </p:nvCxnSpPr>
+        <p:spPr>
+          <a:xfrm flipV="1">
+            <a:off x="4112026" y="2708710"/>
+            <a:ext cx="664167" cy="2144"/>
+          </a:xfrm>
+          <a:prstGeom prst="line">
+            <a:avLst/>
+          </a:prstGeom>
+          <a:ln w="25400">
+            <a:solidFill>
+              <a:schemeClr val="bg1"/>
+            </a:solidFill>
+          </a:ln>
+        </p:spPr>
+        <p:style>
+          <a:lnRef idx="1">
+            <a:schemeClr val="dk1"/>
+          </a:lnRef>
+          <a:fillRef idx="0">
+            <a:schemeClr val="dk1"/>
+          </a:fillRef>
+          <a:effectRef idx="0">
+            <a:schemeClr val="dk1"/>
+          </a:effectRef>
+          <a:fontRef idx="minor">
+            <a:schemeClr val="tx1"/>
+          </a:fontRef>
+        </p:style>
+      </p:cxnSp>
+      <p:cxnSp>
+        <p:nvCxnSpPr>
+          <p:cNvPr id="22" name="Straight Connector 21">
+            <a:extLst>
+              <a:ext uri="{FF2B5EF4-FFF2-40B4-BE49-F238E27FC236}">
+                <a16:creationId xmlns:a16="http://schemas.microsoft.com/office/drawing/2014/main" id="{880B051E-6F60-9449-A7B0-D089758447D1}"/>
+              </a:ext>
+            </a:extLst>
+          </p:cNvPr>
+          <p:cNvCxnSpPr/>
+          <p:nvPr/>
+        </p:nvCxnSpPr>
+        <p:spPr>
+          <a:xfrm flipV="1">
+            <a:off x="4095216" y="3162212"/>
+            <a:ext cx="664167" cy="2144"/>
+          </a:xfrm>
+          <a:prstGeom prst="line">
+            <a:avLst/>
+          </a:prstGeom>
+          <a:ln w="25400">
+            <a:solidFill>
+              <a:schemeClr val="bg1"/>
+            </a:solidFill>
+          </a:ln>
+        </p:spPr>
+        <p:style>
+          <a:lnRef idx="1">
+            <a:schemeClr val="dk1"/>
+          </a:lnRef>
+          <a:fillRef idx="0">
+            <a:schemeClr val="dk1"/>
+          </a:fillRef>
+          <a:effectRef idx="0">
+            <a:schemeClr val="dk1"/>
+          </a:effectRef>
+          <a:fontRef idx="minor">
+            <a:schemeClr val="tx1"/>
+          </a:fontRef>
+        </p:style>
+      </p:cxnSp>
+      <p:cxnSp>
+        <p:nvCxnSpPr>
+          <p:cNvPr id="24" name="Straight Connector 23">
+            <a:extLst>
+              <a:ext uri="{FF2B5EF4-FFF2-40B4-BE49-F238E27FC236}">
+                <a16:creationId xmlns:a16="http://schemas.microsoft.com/office/drawing/2014/main" id="{190B113A-F754-3749-9CC2-D998A63D206D}"/>
+              </a:ext>
+            </a:extLst>
+          </p:cNvPr>
+          <p:cNvCxnSpPr/>
+          <p:nvPr/>
+        </p:nvCxnSpPr>
+        <p:spPr>
+          <a:xfrm flipV="1">
+            <a:off x="4100760" y="3781500"/>
+            <a:ext cx="664167" cy="2144"/>
+          </a:xfrm>
+          <a:prstGeom prst="line">
+            <a:avLst/>
+          </a:prstGeom>
+          <a:ln w="25400">
+            <a:solidFill>
+              <a:schemeClr val="bg1"/>
+            </a:solidFill>
+          </a:ln>
+        </p:spPr>
+        <p:style>
+          <a:lnRef idx="1">
+            <a:schemeClr val="dk1"/>
+          </a:lnRef>
+          <a:fillRef idx="0">
+            <a:schemeClr val="dk1"/>
+          </a:fillRef>
+          <a:effectRef idx="0">
+            <a:schemeClr val="dk1"/>
+          </a:effectRef>
+          <a:fontRef idx="minor">
+            <a:schemeClr val="tx1"/>
+          </a:fontRef>
+        </p:style>
+      </p:cxnSp>
+      <p:cxnSp>
+        <p:nvCxnSpPr>
+          <p:cNvPr id="25" name="Straight Connector 24">
+            <a:extLst>
+              <a:ext uri="{FF2B5EF4-FFF2-40B4-BE49-F238E27FC236}">
+                <a16:creationId xmlns:a16="http://schemas.microsoft.com/office/drawing/2014/main" id="{47AB24D4-B205-6D45-BC18-3B88ED1DB45B}"/>
+              </a:ext>
+            </a:extLst>
+          </p:cNvPr>
+          <p:cNvCxnSpPr/>
+          <p:nvPr/>
+        </p:nvCxnSpPr>
+        <p:spPr>
+          <a:xfrm flipV="1">
+            <a:off x="4103376" y="4360369"/>
+            <a:ext cx="664167" cy="2144"/>
+          </a:xfrm>
+          <a:prstGeom prst="line">
+            <a:avLst/>
+          </a:prstGeom>
+          <a:ln w="25400">
+            <a:solidFill>
+              <a:schemeClr val="bg1"/>
+            </a:solidFill>
+          </a:ln>
+        </p:spPr>
+        <p:style>
+          <a:lnRef idx="1">
+            <a:schemeClr val="dk1"/>
+          </a:lnRef>
+          <a:fillRef idx="0">
+            <a:schemeClr val="dk1"/>
+          </a:fillRef>
+          <a:effectRef idx="0">
+            <a:schemeClr val="dk1"/>
+          </a:effectRef>
+          <a:fontRef idx="minor">
+            <a:schemeClr val="tx1"/>
+          </a:fontRef>
+        </p:style>
+      </p:cxnSp>
+      <p:cxnSp>
+        <p:nvCxnSpPr>
+          <p:cNvPr id="26" name="Straight Connector 25">
+            <a:extLst>
+              <a:ext uri="{FF2B5EF4-FFF2-40B4-BE49-F238E27FC236}">
+                <a16:creationId xmlns:a16="http://schemas.microsoft.com/office/drawing/2014/main" id="{F744B69F-26EA-8C40-949F-80255D5764E9}"/>
+              </a:ext>
+            </a:extLst>
+          </p:cNvPr>
+          <p:cNvCxnSpPr/>
+          <p:nvPr/>
+        </p:nvCxnSpPr>
+        <p:spPr>
+          <a:xfrm flipV="1">
+            <a:off x="4091963" y="4722069"/>
+            <a:ext cx="664167" cy="2144"/>
+          </a:xfrm>
+          <a:prstGeom prst="line">
+            <a:avLst/>
+          </a:prstGeom>
+          <a:ln w="25400">
+            <a:solidFill>
+              <a:schemeClr val="bg1"/>
+            </a:solidFill>
+          </a:ln>
+        </p:spPr>
+        <p:style>
+          <a:lnRef idx="1">
+            <a:schemeClr val="dk1"/>
+          </a:lnRef>
+          <a:fillRef idx="0">
+            <a:schemeClr val="dk1"/>
+          </a:fillRef>
+          <a:effectRef idx="0">
+            <a:schemeClr val="dk1"/>
+          </a:effectRef>
+          <a:fontRef idx="minor">
+            <a:schemeClr val="tx1"/>
+          </a:fontRef>
+        </p:style>
+      </p:cxnSp>
+      <p:cxnSp>
+        <p:nvCxnSpPr>
+          <p:cNvPr id="27" name="Straight Connector 26">
+            <a:extLst>
+              <a:ext uri="{FF2B5EF4-FFF2-40B4-BE49-F238E27FC236}">
+                <a16:creationId xmlns:a16="http://schemas.microsoft.com/office/drawing/2014/main" id="{93ECA7C7-C525-0942-B666-346F083C10BA}"/>
+              </a:ext>
+            </a:extLst>
+          </p:cNvPr>
+          <p:cNvCxnSpPr/>
+          <p:nvPr/>
+        </p:nvCxnSpPr>
+        <p:spPr>
+          <a:xfrm flipV="1">
+            <a:off x="4112026" y="5164414"/>
+            <a:ext cx="664167" cy="2144"/>
+          </a:xfrm>
+          <a:prstGeom prst="line">
+            <a:avLst/>
+          </a:prstGeom>
+          <a:ln w="25400">
+            <a:solidFill>
+              <a:schemeClr val="bg1"/>
+            </a:solidFill>
+          </a:ln>
+        </p:spPr>
+        <p:style>
+          <a:lnRef idx="1">
+            <a:schemeClr val="dk1"/>
+          </a:lnRef>
+          <a:fillRef idx="0">
+            <a:schemeClr val="dk1"/>
+          </a:fillRef>
+          <a:effectRef idx="0">
+            <a:schemeClr val="dk1"/>
+          </a:effectRef>
+          <a:fontRef idx="minor">
+            <a:schemeClr val="tx1"/>
+          </a:fontRef>
+        </p:style>
+      </p:cxnSp>
+      <p:cxnSp>
+        <p:nvCxnSpPr>
+          <p:cNvPr id="36" name="Straight Connector 35">
+            <a:extLst>
+              <a:ext uri="{FF2B5EF4-FFF2-40B4-BE49-F238E27FC236}">
+                <a16:creationId xmlns:a16="http://schemas.microsoft.com/office/drawing/2014/main" id="{FC76962E-93B9-F548-9EED-030852E099B4}"/>
+              </a:ext>
+            </a:extLst>
+          </p:cNvPr>
+          <p:cNvCxnSpPr>
+            <a:cxnSpLocks/>
+          </p:cNvCxnSpPr>
+          <p:nvPr/>
+        </p:nvCxnSpPr>
+        <p:spPr>
+          <a:xfrm>
+            <a:off x="4756130" y="3396141"/>
+            <a:ext cx="5391" cy="746292"/>
+          </a:xfrm>
+          <a:prstGeom prst="line">
+            <a:avLst/>
+          </a:prstGeom>
+          <a:ln w="25400">
+            <a:solidFill>
+              <a:schemeClr val="bg1"/>
+            </a:solidFill>
+          </a:ln>
+        </p:spPr>
+        <p:style>
+          <a:lnRef idx="1">
+            <a:schemeClr val="dk1"/>
+          </a:lnRef>
+          <a:fillRef idx="0">
+            <a:schemeClr val="dk1"/>
+          </a:fillRef>
+          <a:effectRef idx="0">
+            <a:schemeClr val="dk1"/>
+          </a:effectRef>
+          <a:fontRef idx="minor">
+            <a:schemeClr val="tx1"/>
+          </a:fontRef>
+        </p:style>
+      </p:cxnSp>
+      <p:cxnSp>
+        <p:nvCxnSpPr>
+          <p:cNvPr id="37" name="Straight Connector 36">
+            <a:extLst>
+              <a:ext uri="{FF2B5EF4-FFF2-40B4-BE49-F238E27FC236}">
+                <a16:creationId xmlns:a16="http://schemas.microsoft.com/office/drawing/2014/main" id="{F8EE14D8-47A9-694E-95AB-71BA2B949FD7}"/>
+              </a:ext>
+            </a:extLst>
+          </p:cNvPr>
+          <p:cNvCxnSpPr>
+            <a:cxnSpLocks/>
+          </p:cNvCxnSpPr>
+          <p:nvPr/>
+        </p:nvCxnSpPr>
+        <p:spPr>
+          <a:xfrm>
+            <a:off x="4768962" y="2461479"/>
+            <a:ext cx="0" cy="494461"/>
+          </a:xfrm>
+          <a:prstGeom prst="line">
+            <a:avLst/>
+          </a:prstGeom>
+          <a:ln w="25400">
+            <a:solidFill>
+              <a:schemeClr val="bg1"/>
+            </a:solidFill>
+          </a:ln>
+        </p:spPr>
+        <p:style>
+          <a:lnRef idx="1">
+            <a:schemeClr val="dk1"/>
+          </a:lnRef>
+          <a:fillRef idx="0">
+            <a:schemeClr val="dk1"/>
+          </a:fillRef>
+          <a:effectRef idx="0">
+            <a:schemeClr val="dk1"/>
+          </a:effectRef>
+          <a:fontRef idx="minor">
+            <a:schemeClr val="tx1"/>
+          </a:fontRef>
+        </p:style>
+      </p:cxnSp>
+      <p:pic>
+        <p:nvPicPr>
+          <p:cNvPr id="13" name="Picture 12">
+            <a:extLst>
+              <a:ext uri="{FF2B5EF4-FFF2-40B4-BE49-F238E27FC236}">
+                <a16:creationId xmlns:a16="http://schemas.microsoft.com/office/drawing/2014/main" id="{F57F9EE8-6200-4D4D-BF7B-2FA44E651D27}"/>
+              </a:ext>
+            </a:extLst>
+          </p:cNvPr>
+          <p:cNvPicPr>
+            <a:picLocks noChangeAspect="1"/>
+          </p:cNvPicPr>
+          <p:nvPr/>
+        </p:nvPicPr>
+        <p:blipFill>
+          <a:blip r:embed="rId4"/>
+          <a:stretch>
+            <a:fillRect/>
+          </a:stretch>
+        </p:blipFill>
+        <p:spPr>
+          <a:xfrm>
+            <a:off x="4860026" y="731014"/>
+            <a:ext cx="4343400" cy="5092700"/>
+          </a:xfrm>
+          <a:prstGeom prst="rect">
+            <a:avLst/>
+          </a:prstGeom>
+        </p:spPr>
+      </p:pic>
+      <p:cxnSp>
+        <p:nvCxnSpPr>
+          <p:cNvPr id="38" name="Straight Connector 37">
+            <a:extLst>
+              <a:ext uri="{FF2B5EF4-FFF2-40B4-BE49-F238E27FC236}">
+                <a16:creationId xmlns:a16="http://schemas.microsoft.com/office/drawing/2014/main" id="{79580D74-7CD8-B24D-8B70-3CB5FA16ACA3}"/>
+              </a:ext>
+            </a:extLst>
+          </p:cNvPr>
+          <p:cNvCxnSpPr>
+            <a:cxnSpLocks/>
+          </p:cNvCxnSpPr>
+          <p:nvPr/>
+        </p:nvCxnSpPr>
+        <p:spPr>
+          <a:xfrm>
+            <a:off x="4779093" y="1784864"/>
+            <a:ext cx="0" cy="494461"/>
+          </a:xfrm>
+          <a:prstGeom prst="line">
+            <a:avLst/>
+          </a:prstGeom>
+          <a:ln w="25400">
+            <a:solidFill>
+              <a:schemeClr val="bg1"/>
+            </a:solidFill>
+          </a:ln>
+        </p:spPr>
+        <p:style>
+          <a:lnRef idx="1">
+            <a:schemeClr val="dk1"/>
+          </a:lnRef>
+          <a:fillRef idx="0">
+            <a:schemeClr val="dk1"/>
+          </a:fillRef>
+          <a:effectRef idx="0">
+            <a:schemeClr val="dk1"/>
+          </a:effectRef>
+          <a:fontRef idx="minor">
+            <a:schemeClr val="tx1"/>
+          </a:fontRef>
+        </p:style>
+      </p:cxnSp>
+      <p:sp>
+        <p:nvSpPr>
+          <p:cNvPr id="30" name="Oval 29">
+            <a:extLst>
+              <a:ext uri="{FF2B5EF4-FFF2-40B4-BE49-F238E27FC236}">
+                <a16:creationId xmlns:a16="http://schemas.microsoft.com/office/drawing/2014/main" id="{B1A816EA-7CAE-244E-8D6A-7F8B9AED69E9}"/>
+              </a:ext>
+            </a:extLst>
+          </p:cNvPr>
+          <p:cNvSpPr/>
+          <p:nvPr/>
+        </p:nvSpPr>
+        <p:spPr>
+          <a:xfrm>
+            <a:off x="3838764" y="5378988"/>
+            <a:ext cx="273269" cy="274768"/>
+          </a:xfrm>
+          <a:prstGeom prst="ellipse">
+            <a:avLst/>
+          </a:prstGeom>
+          <a:solidFill>
+            <a:srgbClr val="FF61AF"/>
+          </a:solidFill>
+          <a:ln w="12700">
+            <a:solidFill>
+              <a:schemeClr val="bg1"/>
+            </a:solidFill>
+          </a:ln>
+          <a:effectLst>
+            <a:outerShdw blurRad="76200" dist="12700" dir="2700000" algn="tl" rotWithShape="0">
+              <a:prstClr val="black"/>
+            </a:outerShdw>
+          </a:effectLst>
+        </p:spPr>
+        <p:style>
+          <a:lnRef idx="2">
+            <a:schemeClr val="accent1">
+              <a:shade val="50000"/>
+            </a:schemeClr>
+          </a:lnRef>
+          <a:fillRef idx="1">
+            <a:schemeClr val="accent1"/>
+          </a:fillRef>
+          <a:effectRef idx="0">
+            <a:schemeClr val="accent1"/>
+          </a:effectRef>
+          <a:fontRef idx="minor">
+            <a:schemeClr val="lt1"/>
+          </a:fontRef>
+        </p:style>
+        <p:txBody>
+          <a:bodyPr rtlCol="0" anchor="ctr"/>
+          <a:lstStyle/>
+          <a:p>
+            <a:pPr algn="ctr"/>
+            <a:r>
+              <a:rPr lang="en-US" sz="1200" b="1" dirty="0">
+                <a:latin typeface="Helvetica Neue" panose="02000503000000020004" pitchFamily="2" charset="0"/>
+                <a:ea typeface="Helvetica Neue" panose="02000503000000020004" pitchFamily="2" charset="0"/>
+                <a:cs typeface="Helvetica Neue" panose="02000503000000020004" pitchFamily="2" charset="0"/>
+              </a:rPr>
+              <a:t>9</a:t>
+            </a:r>
+          </a:p>
+        </p:txBody>
+      </p:sp>
+      <p:cxnSp>
+        <p:nvCxnSpPr>
+          <p:cNvPr id="31" name="Straight Connector 30">
+            <a:extLst>
+              <a:ext uri="{FF2B5EF4-FFF2-40B4-BE49-F238E27FC236}">
+                <a16:creationId xmlns:a16="http://schemas.microsoft.com/office/drawing/2014/main" id="{00DCB02D-CBF7-6649-AC48-94CF7C721356}"/>
+              </a:ext>
+            </a:extLst>
+          </p:cNvPr>
+          <p:cNvCxnSpPr/>
+          <p:nvPr/>
+        </p:nvCxnSpPr>
+        <p:spPr>
+          <a:xfrm flipV="1">
+            <a:off x="4112026" y="5510418"/>
+            <a:ext cx="664167" cy="2144"/>
+          </a:xfrm>
+          <a:prstGeom prst="line">
+            <a:avLst/>
+          </a:prstGeom>
+          <a:ln w="25400">
+            <a:solidFill>
+              <a:schemeClr val="bg1"/>
+            </a:solidFill>
+          </a:ln>
+        </p:spPr>
+        <p:style>
+          <a:lnRef idx="1">
+            <a:schemeClr val="dk1"/>
+          </a:lnRef>
+          <a:fillRef idx="0">
+            <a:schemeClr val="dk1"/>
+          </a:fillRef>
+          <a:effectRef idx="0">
+            <a:schemeClr val="dk1"/>
+          </a:effectRef>
+          <a:fontRef idx="minor">
+            <a:schemeClr val="tx1"/>
+          </a:fontRef>
+        </p:style>
+      </p:cxnSp>
+    </p:spTree>
+    <p:extLst>
+      <p:ext uri="{BB962C8B-B14F-4D97-AF65-F5344CB8AC3E}">
+        <p14:creationId xmlns:p14="http://schemas.microsoft.com/office/powerpoint/2010/main" val="1525176841"/>
+      </p:ext>
+    </p:extLst>
+  </p:cSld>
+  <p:clrMapOvr>
+    <a:masterClrMapping/>
+  </p:clrMapOvr>
+</p:sld>
+</file>
+
+<file path=ppt/slides/slide11.xml><?xml version="1.0" encoding="utf-8"?>
+<p:sld xmlns:a="http://schemas.openxmlformats.org/drawingml/2006/main" xmlns:r="http://schemas.openxmlformats.org/officeDocument/2006/relationships" xmlns:p="http://schemas.openxmlformats.org/presentationml/2006/main">
+  <p:cSld>
+    <p:spTree>
+      <p:nvGrpSpPr>
+        <p:cNvPr id="1" name=""/>
+        <p:cNvGrpSpPr/>
+        <p:nvPr/>
+      </p:nvGrpSpPr>
+      <p:grpSpPr>
+        <a:xfrm>
+          <a:off x="0" y="0"/>
+          <a:ext cx="0" cy="0"/>
+          <a:chOff x="0" y="0"/>
+          <a:chExt cx="0" cy="0"/>
+        </a:xfrm>
+      </p:grpSpPr>
+      <p:pic>
+        <p:nvPicPr>
+          <p:cNvPr id="14" name="Picture 13">
+            <a:extLst>
+              <a:ext uri="{FF2B5EF4-FFF2-40B4-BE49-F238E27FC236}">
+                <a16:creationId xmlns:a16="http://schemas.microsoft.com/office/drawing/2014/main" id="{7D7D3C3B-2FC4-9E4A-BC29-E8A1525AE243}"/>
+              </a:ext>
+            </a:extLst>
+          </p:cNvPr>
+          <p:cNvPicPr>
+            <a:picLocks noChangeAspect="1"/>
+          </p:cNvPicPr>
+          <p:nvPr/>
+        </p:nvPicPr>
+        <p:blipFill>
+          <a:blip r:embed="rId2"/>
+          <a:stretch>
+            <a:fillRect/>
+          </a:stretch>
+        </p:blipFill>
+        <p:spPr>
+          <a:xfrm>
+            <a:off x="4849904" y="674815"/>
+            <a:ext cx="5031431" cy="4862104"/>
+          </a:xfrm>
+          <a:prstGeom prst="rect">
+            <a:avLst/>
+          </a:prstGeom>
+        </p:spPr>
+      </p:pic>
+      <p:pic>
+        <p:nvPicPr>
+          <p:cNvPr id="32" name="Picture 31">
+            <a:extLst>
+              <a:ext uri="{FF2B5EF4-FFF2-40B4-BE49-F238E27FC236}">
+                <a16:creationId xmlns:a16="http://schemas.microsoft.com/office/drawing/2014/main" id="{24746DF3-ECA5-984B-8324-22A4D144DB71}"/>
+              </a:ext>
+            </a:extLst>
+          </p:cNvPr>
+          <p:cNvPicPr>
+            <a:picLocks noChangeAspect="1"/>
+          </p:cNvPicPr>
+          <p:nvPr/>
+        </p:nvPicPr>
+        <p:blipFill>
+          <a:blip r:embed="rId3"/>
+          <a:stretch>
+            <a:fillRect/>
+          </a:stretch>
+        </p:blipFill>
+        <p:spPr>
+          <a:xfrm>
+            <a:off x="4862929" y="674815"/>
+            <a:ext cx="5350887" cy="4862104"/>
+          </a:xfrm>
+          <a:prstGeom prst="rect">
+            <a:avLst/>
+          </a:prstGeom>
+        </p:spPr>
+      </p:pic>
+      <p:sp>
+        <p:nvSpPr>
+          <p:cNvPr id="15" name="Rectangle 14">
+            <a:extLst>
+              <a:ext uri="{FF2B5EF4-FFF2-40B4-BE49-F238E27FC236}">
+                <a16:creationId xmlns:a16="http://schemas.microsoft.com/office/drawing/2014/main" id="{9A9ABCE7-A39B-D74F-A71F-22F9A819F55C}"/>
+              </a:ext>
+            </a:extLst>
+          </p:cNvPr>
+          <p:cNvSpPr/>
+          <p:nvPr/>
+        </p:nvSpPr>
+        <p:spPr>
+          <a:xfrm>
+            <a:off x="0" y="0"/>
+            <a:ext cx="12192000" cy="6858000"/>
+          </a:xfrm>
+          <a:prstGeom prst="rect">
+            <a:avLst/>
+          </a:prstGeom>
+          <a:solidFill>
+            <a:srgbClr val="606060"/>
+          </a:solidFill>
+        </p:spPr>
+        <p:style>
+          <a:lnRef idx="2">
+            <a:schemeClr val="accent1">
+              <a:shade val="50000"/>
+            </a:schemeClr>
+          </a:lnRef>
+          <a:fillRef idx="1">
+            <a:schemeClr val="accent1"/>
+          </a:fillRef>
+          <a:effectRef idx="0">
+            <a:schemeClr val="accent1"/>
+          </a:effectRef>
+          <a:fontRef idx="minor">
+            <a:schemeClr val="lt1"/>
+          </a:fontRef>
+        </p:style>
+        <p:txBody>
+          <a:bodyPr rtlCol="0" anchor="ctr"/>
+          <a:lstStyle/>
+          <a:p>
+            <a:pPr algn="ctr"/>
+            <a:endParaRPr lang="en-US"/>
+          </a:p>
+        </p:txBody>
+      </p:sp>
+      <p:sp>
+        <p:nvSpPr>
+          <p:cNvPr id="6" name="Oval 5">
+            <a:extLst>
+              <a:ext uri="{FF2B5EF4-FFF2-40B4-BE49-F238E27FC236}">
+                <a16:creationId xmlns:a16="http://schemas.microsoft.com/office/drawing/2014/main" id="{4F5F5F24-60CE-3342-9DE6-24855CF519DA}"/>
+              </a:ext>
+            </a:extLst>
+          </p:cNvPr>
+          <p:cNvSpPr/>
+          <p:nvPr/>
+        </p:nvSpPr>
+        <p:spPr>
+          <a:xfrm>
+            <a:off x="3572403" y="1058393"/>
+            <a:ext cx="273269" cy="274768"/>
+          </a:xfrm>
+          <a:prstGeom prst="ellipse">
+            <a:avLst/>
+          </a:prstGeom>
+          <a:solidFill>
+            <a:srgbClr val="FF61AF"/>
+          </a:solidFill>
+          <a:ln w="12700">
+            <a:solidFill>
+              <a:schemeClr val="bg1"/>
+            </a:solidFill>
+          </a:ln>
+          <a:effectLst>
+            <a:outerShdw blurRad="76200" dist="12700" dir="2700000" algn="tl" rotWithShape="0">
+              <a:prstClr val="black"/>
+            </a:outerShdw>
+          </a:effectLst>
+        </p:spPr>
+        <p:style>
+          <a:lnRef idx="2">
+            <a:schemeClr val="accent1">
+              <a:shade val="50000"/>
+            </a:schemeClr>
+          </a:lnRef>
+          <a:fillRef idx="1">
+            <a:schemeClr val="accent1"/>
+          </a:fillRef>
+          <a:effectRef idx="0">
+            <a:schemeClr val="accent1"/>
+          </a:effectRef>
+          <a:fontRef idx="minor">
+            <a:schemeClr val="lt1"/>
+          </a:fontRef>
+        </p:style>
+        <p:txBody>
+          <a:bodyPr rtlCol="0" anchor="ctr"/>
+          <a:lstStyle/>
+          <a:p>
+            <a:pPr algn="ctr"/>
+            <a:r>
+              <a:rPr lang="en-US" sz="1200" b="1" dirty="0">
+                <a:latin typeface="Helvetica Neue" panose="02000503000000020004" pitchFamily="2" charset="0"/>
+                <a:ea typeface="Helvetica Neue" panose="02000503000000020004" pitchFamily="2" charset="0"/>
+                <a:cs typeface="Helvetica Neue" panose="02000503000000020004" pitchFamily="2" charset="0"/>
+              </a:rPr>
+              <a:t>3</a:t>
+            </a:r>
+          </a:p>
+        </p:txBody>
+      </p:sp>
+      <p:sp>
+        <p:nvSpPr>
+          <p:cNvPr id="9" name="Oval 8">
+            <a:extLst>
+              <a:ext uri="{FF2B5EF4-FFF2-40B4-BE49-F238E27FC236}">
+                <a16:creationId xmlns:a16="http://schemas.microsoft.com/office/drawing/2014/main" id="{7F822D7C-E19C-954B-A21A-F0741CF32DF2}"/>
+              </a:ext>
+            </a:extLst>
+          </p:cNvPr>
+          <p:cNvSpPr/>
+          <p:nvPr/>
+        </p:nvSpPr>
+        <p:spPr>
+          <a:xfrm>
+            <a:off x="4016908" y="1638580"/>
+            <a:ext cx="273269" cy="274768"/>
+          </a:xfrm>
+          <a:prstGeom prst="ellipse">
+            <a:avLst/>
+          </a:prstGeom>
+          <a:solidFill>
+            <a:srgbClr val="FF61AF"/>
+          </a:solidFill>
+          <a:ln w="12700">
+            <a:solidFill>
+              <a:schemeClr val="bg1"/>
+            </a:solidFill>
+          </a:ln>
+          <a:effectLst>
+            <a:outerShdw blurRad="76200" dist="12700" dir="2700000" algn="tl" rotWithShape="0">
+              <a:prstClr val="black"/>
+            </a:outerShdw>
+          </a:effectLst>
+        </p:spPr>
+        <p:style>
+          <a:lnRef idx="2">
+            <a:schemeClr val="accent1">
+              <a:shade val="50000"/>
+            </a:schemeClr>
+          </a:lnRef>
+          <a:fillRef idx="1">
+            <a:schemeClr val="accent1"/>
+          </a:fillRef>
+          <a:effectRef idx="0">
+            <a:schemeClr val="accent1"/>
+          </a:effectRef>
+          <a:fontRef idx="minor">
+            <a:schemeClr val="lt1"/>
+          </a:fontRef>
+        </p:style>
+        <p:txBody>
+          <a:bodyPr rtlCol="0" anchor="ctr"/>
+          <a:lstStyle/>
+          <a:p>
+            <a:pPr algn="ctr"/>
+            <a:r>
+              <a:rPr lang="en-US" sz="1200" b="1" dirty="0">
+                <a:latin typeface="Helvetica Neue" panose="02000503000000020004" pitchFamily="2" charset="0"/>
+                <a:ea typeface="Helvetica Neue" panose="02000503000000020004" pitchFamily="2" charset="0"/>
+                <a:cs typeface="Helvetica Neue" panose="02000503000000020004" pitchFamily="2" charset="0"/>
+              </a:rPr>
+              <a:t>4</a:t>
+            </a:r>
+          </a:p>
+        </p:txBody>
+      </p:sp>
+      <p:sp>
+        <p:nvSpPr>
+          <p:cNvPr id="12" name="Oval 11">
+            <a:extLst>
+              <a:ext uri="{FF2B5EF4-FFF2-40B4-BE49-F238E27FC236}">
+                <a16:creationId xmlns:a16="http://schemas.microsoft.com/office/drawing/2014/main" id="{1ECF5D27-7043-3C45-99A3-48ED5A83C719}"/>
+              </a:ext>
+            </a:extLst>
+          </p:cNvPr>
+          <p:cNvSpPr/>
+          <p:nvPr/>
+        </p:nvSpPr>
+        <p:spPr>
+          <a:xfrm>
+            <a:off x="4016915" y="4215557"/>
+            <a:ext cx="273269" cy="274768"/>
+          </a:xfrm>
+          <a:prstGeom prst="ellipse">
+            <a:avLst/>
+          </a:prstGeom>
+          <a:solidFill>
+            <a:srgbClr val="FF61AF"/>
+          </a:solidFill>
+          <a:ln w="12700">
+            <a:solidFill>
+              <a:schemeClr val="bg1"/>
+            </a:solidFill>
+          </a:ln>
+          <a:effectLst>
+            <a:outerShdw blurRad="76200" dist="12700" dir="2700000" algn="tl" rotWithShape="0">
+              <a:prstClr val="black"/>
+            </a:outerShdw>
+          </a:effectLst>
+        </p:spPr>
+        <p:style>
+          <a:lnRef idx="2">
+            <a:schemeClr val="accent1">
+              <a:shade val="50000"/>
+            </a:schemeClr>
+          </a:lnRef>
+          <a:fillRef idx="1">
+            <a:schemeClr val="accent1"/>
+          </a:fillRef>
+          <a:effectRef idx="0">
+            <a:schemeClr val="accent1"/>
+          </a:effectRef>
+          <a:fontRef idx="minor">
+            <a:schemeClr val="lt1"/>
+          </a:fontRef>
+        </p:style>
+        <p:txBody>
+          <a:bodyPr rtlCol="0" anchor="ctr"/>
+          <a:lstStyle/>
+          <a:p>
+            <a:pPr algn="ctr"/>
+            <a:r>
+              <a:rPr lang="en-US" sz="1200" b="1" dirty="0">
+                <a:latin typeface="Helvetica Neue" panose="02000503000000020004" pitchFamily="2" charset="0"/>
+                <a:ea typeface="Helvetica Neue" panose="02000503000000020004" pitchFamily="2" charset="0"/>
+                <a:cs typeface="Helvetica Neue" panose="02000503000000020004" pitchFamily="2" charset="0"/>
+              </a:rPr>
+              <a:t>8</a:t>
+            </a:r>
+          </a:p>
+        </p:txBody>
+      </p:sp>
+      <p:cxnSp>
+        <p:nvCxnSpPr>
+          <p:cNvPr id="21" name="Straight Connector 20">
+            <a:extLst>
+              <a:ext uri="{FF2B5EF4-FFF2-40B4-BE49-F238E27FC236}">
+                <a16:creationId xmlns:a16="http://schemas.microsoft.com/office/drawing/2014/main" id="{C2E2A4B5-9CAB-DE41-9877-63D9252C71EE}"/>
+              </a:ext>
+            </a:extLst>
+          </p:cNvPr>
+          <p:cNvCxnSpPr>
+            <a:cxnSpLocks/>
+          </p:cNvCxnSpPr>
+          <p:nvPr/>
+        </p:nvCxnSpPr>
+        <p:spPr>
+          <a:xfrm>
+            <a:off x="3845666" y="1195777"/>
+            <a:ext cx="1429067" cy="0"/>
+          </a:xfrm>
+          <a:prstGeom prst="line">
+            <a:avLst/>
+          </a:prstGeom>
+          <a:ln w="25400">
+            <a:solidFill>
+              <a:schemeClr val="bg1"/>
+            </a:solidFill>
+          </a:ln>
+        </p:spPr>
+        <p:style>
+          <a:lnRef idx="1">
+            <a:schemeClr val="dk1"/>
+          </a:lnRef>
+          <a:fillRef idx="0">
+            <a:schemeClr val="dk1"/>
+          </a:fillRef>
+          <a:effectRef idx="0">
+            <a:schemeClr val="dk1"/>
+          </a:effectRef>
+          <a:fontRef idx="minor">
+            <a:schemeClr val="tx1"/>
+          </a:fontRef>
+        </p:style>
+      </p:cxnSp>
+      <p:cxnSp>
+        <p:nvCxnSpPr>
+          <p:cNvPr id="24" name="Straight Connector 23">
+            <a:extLst>
+              <a:ext uri="{FF2B5EF4-FFF2-40B4-BE49-F238E27FC236}">
+                <a16:creationId xmlns:a16="http://schemas.microsoft.com/office/drawing/2014/main" id="{190B113A-F754-3749-9CC2-D998A63D206D}"/>
+              </a:ext>
+            </a:extLst>
+          </p:cNvPr>
+          <p:cNvCxnSpPr>
+            <a:cxnSpLocks/>
+          </p:cNvCxnSpPr>
+          <p:nvPr/>
+        </p:nvCxnSpPr>
+        <p:spPr>
+          <a:xfrm>
+            <a:off x="4290177" y="1770319"/>
+            <a:ext cx="955587" cy="0"/>
+          </a:xfrm>
+          <a:prstGeom prst="line">
+            <a:avLst/>
+          </a:prstGeom>
+          <a:ln w="25400">
+            <a:solidFill>
+              <a:schemeClr val="bg1"/>
+            </a:solidFill>
+          </a:ln>
+        </p:spPr>
+        <p:style>
+          <a:lnRef idx="1">
+            <a:schemeClr val="dk1"/>
+          </a:lnRef>
+          <a:fillRef idx="0">
+            <a:schemeClr val="dk1"/>
+          </a:fillRef>
+          <a:effectRef idx="0">
+            <a:schemeClr val="dk1"/>
+          </a:effectRef>
+          <a:fontRef idx="minor">
+            <a:schemeClr val="tx1"/>
+          </a:fontRef>
+        </p:style>
+      </p:cxnSp>
+      <p:cxnSp>
+        <p:nvCxnSpPr>
+          <p:cNvPr id="27" name="Straight Connector 26">
+            <a:extLst>
+              <a:ext uri="{FF2B5EF4-FFF2-40B4-BE49-F238E27FC236}">
+                <a16:creationId xmlns:a16="http://schemas.microsoft.com/office/drawing/2014/main" id="{93ECA7C7-C525-0942-B666-346F083C10BA}"/>
+              </a:ext>
+            </a:extLst>
+          </p:cNvPr>
+          <p:cNvCxnSpPr>
+            <a:cxnSpLocks/>
+          </p:cNvCxnSpPr>
+          <p:nvPr/>
+        </p:nvCxnSpPr>
+        <p:spPr>
+          <a:xfrm>
+            <a:off x="4290177" y="4349131"/>
+            <a:ext cx="984556" cy="0"/>
+          </a:xfrm>
+          <a:prstGeom prst="line">
+            <a:avLst/>
+          </a:prstGeom>
+          <a:ln w="25400">
+            <a:solidFill>
+              <a:schemeClr val="bg1"/>
+            </a:solidFill>
+          </a:ln>
+        </p:spPr>
+        <p:style>
+          <a:lnRef idx="1">
+            <a:schemeClr val="dk1"/>
+          </a:lnRef>
+          <a:fillRef idx="0">
+            <a:schemeClr val="dk1"/>
+          </a:fillRef>
+          <a:effectRef idx="0">
+            <a:schemeClr val="dk1"/>
+          </a:effectRef>
+          <a:fontRef idx="minor">
+            <a:schemeClr val="tx1"/>
+          </a:fontRef>
+        </p:style>
+      </p:cxnSp>
+      <p:cxnSp>
+        <p:nvCxnSpPr>
+          <p:cNvPr id="36" name="Straight Connector 35">
+            <a:extLst>
+              <a:ext uri="{FF2B5EF4-FFF2-40B4-BE49-F238E27FC236}">
+                <a16:creationId xmlns:a16="http://schemas.microsoft.com/office/drawing/2014/main" id="{FC76962E-93B9-F548-9EED-030852E099B4}"/>
+              </a:ext>
+            </a:extLst>
+          </p:cNvPr>
+          <p:cNvCxnSpPr>
+            <a:cxnSpLocks/>
+          </p:cNvCxnSpPr>
+          <p:nvPr/>
+        </p:nvCxnSpPr>
+        <p:spPr>
+          <a:xfrm>
+            <a:off x="5245764" y="1382816"/>
+            <a:ext cx="5391" cy="746292"/>
+          </a:xfrm>
+          <a:prstGeom prst="line">
+            <a:avLst/>
+          </a:prstGeom>
+          <a:ln w="25400">
+            <a:solidFill>
+              <a:schemeClr val="bg1"/>
+            </a:solidFill>
+          </a:ln>
+        </p:spPr>
+        <p:style>
+          <a:lnRef idx="1">
+            <a:schemeClr val="dk1"/>
+          </a:lnRef>
+          <a:fillRef idx="0">
+            <a:schemeClr val="dk1"/>
+          </a:fillRef>
+          <a:effectRef idx="0">
+            <a:schemeClr val="dk1"/>
+          </a:effectRef>
+          <a:fontRef idx="minor">
+            <a:schemeClr val="tx1"/>
+          </a:fontRef>
+        </p:style>
+      </p:cxnSp>
+      <p:sp>
+        <p:nvSpPr>
+          <p:cNvPr id="30" name="Oval 29">
+            <a:extLst>
+              <a:ext uri="{FF2B5EF4-FFF2-40B4-BE49-F238E27FC236}">
+                <a16:creationId xmlns:a16="http://schemas.microsoft.com/office/drawing/2014/main" id="{B1A816EA-7CAE-244E-8D6A-7F8B9AED69E9}"/>
+              </a:ext>
+            </a:extLst>
+          </p:cNvPr>
+          <p:cNvSpPr/>
+          <p:nvPr/>
+        </p:nvSpPr>
+        <p:spPr>
+          <a:xfrm>
+            <a:off x="3838764" y="5378988"/>
+            <a:ext cx="273269" cy="274768"/>
+          </a:xfrm>
+          <a:prstGeom prst="ellipse">
+            <a:avLst/>
+          </a:prstGeom>
+          <a:solidFill>
+            <a:srgbClr val="FF61AF"/>
+          </a:solidFill>
+          <a:ln w="12700">
+            <a:solidFill>
+              <a:schemeClr val="bg1"/>
+            </a:solidFill>
+          </a:ln>
+          <a:effectLst>
+            <a:outerShdw blurRad="76200" dist="12700" dir="2700000" algn="tl" rotWithShape="0">
+              <a:prstClr val="black"/>
+            </a:outerShdw>
+          </a:effectLst>
+        </p:spPr>
+        <p:style>
+          <a:lnRef idx="2">
+            <a:schemeClr val="accent1">
+              <a:shade val="50000"/>
+            </a:schemeClr>
+          </a:lnRef>
+          <a:fillRef idx="1">
+            <a:schemeClr val="accent1"/>
+          </a:fillRef>
+          <a:effectRef idx="0">
+            <a:schemeClr val="accent1"/>
+          </a:effectRef>
+          <a:fontRef idx="minor">
+            <a:schemeClr val="lt1"/>
+          </a:fontRef>
+        </p:style>
+        <p:txBody>
+          <a:bodyPr rtlCol="0" anchor="ctr"/>
+          <a:lstStyle/>
+          <a:p>
+            <a:pPr algn="ctr"/>
+            <a:r>
+              <a:rPr lang="en-US" sz="1200" b="1" dirty="0">
+                <a:latin typeface="Helvetica Neue" panose="02000503000000020004" pitchFamily="2" charset="0"/>
+                <a:ea typeface="Helvetica Neue" panose="02000503000000020004" pitchFamily="2" charset="0"/>
+                <a:cs typeface="Helvetica Neue" panose="02000503000000020004" pitchFamily="2" charset="0"/>
+              </a:rPr>
+              <a:t>9</a:t>
+            </a:r>
+          </a:p>
+        </p:txBody>
+      </p:sp>
+      <p:cxnSp>
+        <p:nvCxnSpPr>
+          <p:cNvPr id="31" name="Straight Connector 30">
+            <a:extLst>
+              <a:ext uri="{FF2B5EF4-FFF2-40B4-BE49-F238E27FC236}">
+                <a16:creationId xmlns:a16="http://schemas.microsoft.com/office/drawing/2014/main" id="{00DCB02D-CBF7-6649-AC48-94CF7C721356}"/>
+              </a:ext>
+            </a:extLst>
+          </p:cNvPr>
+          <p:cNvCxnSpPr/>
+          <p:nvPr/>
+        </p:nvCxnSpPr>
+        <p:spPr>
+          <a:xfrm flipV="1">
+            <a:off x="4112026" y="5510418"/>
+            <a:ext cx="664167" cy="2144"/>
+          </a:xfrm>
+          <a:prstGeom prst="line">
+            <a:avLst/>
+          </a:prstGeom>
+          <a:ln w="25400">
+            <a:solidFill>
+              <a:schemeClr val="bg1"/>
+            </a:solidFill>
+          </a:ln>
+        </p:spPr>
+        <p:style>
+          <a:lnRef idx="1">
+            <a:schemeClr val="dk1"/>
+          </a:lnRef>
+          <a:fillRef idx="0">
+            <a:schemeClr val="dk1"/>
+          </a:fillRef>
+          <a:effectRef idx="0">
+            <a:schemeClr val="dk1"/>
+          </a:effectRef>
+          <a:fontRef idx="minor">
+            <a:schemeClr val="tx1"/>
+          </a:fontRef>
+        </p:style>
+      </p:cxnSp>
+      <p:sp>
+        <p:nvSpPr>
+          <p:cNvPr id="39" name="Oval 38">
+            <a:extLst>
+              <a:ext uri="{FF2B5EF4-FFF2-40B4-BE49-F238E27FC236}">
+                <a16:creationId xmlns:a16="http://schemas.microsoft.com/office/drawing/2014/main" id="{6660D379-4EFF-EE48-AAB9-D82900997E6A}"/>
+              </a:ext>
+            </a:extLst>
+          </p:cNvPr>
+          <p:cNvSpPr/>
+          <p:nvPr/>
+        </p:nvSpPr>
+        <p:spPr>
+          <a:xfrm>
+            <a:off x="4016908" y="2340654"/>
+            <a:ext cx="273269" cy="274768"/>
+          </a:xfrm>
+          <a:prstGeom prst="ellipse">
+            <a:avLst/>
+          </a:prstGeom>
+          <a:solidFill>
+            <a:srgbClr val="FF61AF"/>
+          </a:solidFill>
+          <a:ln w="12700">
+            <a:solidFill>
+              <a:schemeClr val="bg1"/>
+            </a:solidFill>
+          </a:ln>
+          <a:effectLst>
+            <a:outerShdw blurRad="76200" dist="12700" dir="2700000" algn="tl" rotWithShape="0">
+              <a:prstClr val="black"/>
+            </a:outerShdw>
+          </a:effectLst>
+        </p:spPr>
+        <p:style>
+          <a:lnRef idx="2">
+            <a:schemeClr val="accent1">
+              <a:shade val="50000"/>
+            </a:schemeClr>
+          </a:lnRef>
+          <a:fillRef idx="1">
+            <a:schemeClr val="accent1"/>
+          </a:fillRef>
+          <a:effectRef idx="0">
+            <a:schemeClr val="accent1"/>
+          </a:effectRef>
+          <a:fontRef idx="minor">
+            <a:schemeClr val="lt1"/>
+          </a:fontRef>
+        </p:style>
+        <p:txBody>
+          <a:bodyPr rtlCol="0" anchor="ctr"/>
+          <a:lstStyle/>
+          <a:p>
+            <a:pPr algn="ctr"/>
+            <a:r>
+              <a:rPr lang="en-US" sz="1200" b="1" dirty="0">
+                <a:latin typeface="Helvetica Neue" panose="02000503000000020004" pitchFamily="2" charset="0"/>
+                <a:ea typeface="Helvetica Neue" panose="02000503000000020004" pitchFamily="2" charset="0"/>
+                <a:cs typeface="Helvetica Neue" panose="02000503000000020004" pitchFamily="2" charset="0"/>
+              </a:rPr>
+              <a:t>5</a:t>
+            </a:r>
+          </a:p>
+        </p:txBody>
+      </p:sp>
+      <p:cxnSp>
+        <p:nvCxnSpPr>
+          <p:cNvPr id="40" name="Straight Connector 39">
+            <a:extLst>
+              <a:ext uri="{FF2B5EF4-FFF2-40B4-BE49-F238E27FC236}">
+                <a16:creationId xmlns:a16="http://schemas.microsoft.com/office/drawing/2014/main" id="{8D1DC4E6-5C96-2F4B-AC52-FBF0F1FAAA8B}"/>
+              </a:ext>
+            </a:extLst>
+          </p:cNvPr>
+          <p:cNvCxnSpPr>
+            <a:cxnSpLocks/>
+          </p:cNvCxnSpPr>
+          <p:nvPr/>
+        </p:nvCxnSpPr>
+        <p:spPr>
+          <a:xfrm>
+            <a:off x="4290177" y="2472393"/>
+            <a:ext cx="955587" cy="0"/>
+          </a:xfrm>
+          <a:prstGeom prst="line">
+            <a:avLst/>
+          </a:prstGeom>
+          <a:ln w="25400">
+            <a:solidFill>
+              <a:schemeClr val="bg1"/>
+            </a:solidFill>
+          </a:ln>
+        </p:spPr>
+        <p:style>
+          <a:lnRef idx="1">
+            <a:schemeClr val="dk1"/>
+          </a:lnRef>
+          <a:fillRef idx="0">
+            <a:schemeClr val="dk1"/>
+          </a:fillRef>
+          <a:effectRef idx="0">
+            <a:schemeClr val="dk1"/>
+          </a:effectRef>
+          <a:fontRef idx="minor">
+            <a:schemeClr val="tx1"/>
+          </a:fontRef>
+        </p:style>
+      </p:cxnSp>
+      <p:cxnSp>
+        <p:nvCxnSpPr>
+          <p:cNvPr id="41" name="Straight Connector 40">
+            <a:extLst>
+              <a:ext uri="{FF2B5EF4-FFF2-40B4-BE49-F238E27FC236}">
+                <a16:creationId xmlns:a16="http://schemas.microsoft.com/office/drawing/2014/main" id="{1BF63579-6C8B-4646-AD78-1C2F96E08CE4}"/>
+              </a:ext>
+            </a:extLst>
+          </p:cNvPr>
+          <p:cNvCxnSpPr>
+            <a:cxnSpLocks/>
+          </p:cNvCxnSpPr>
+          <p:nvPr/>
+        </p:nvCxnSpPr>
+        <p:spPr>
+          <a:xfrm>
+            <a:off x="5245764" y="2223136"/>
+            <a:ext cx="0" cy="492231"/>
+          </a:xfrm>
+          <a:prstGeom prst="line">
+            <a:avLst/>
+          </a:prstGeom>
+          <a:ln w="25400">
+            <a:solidFill>
+              <a:schemeClr val="bg1"/>
+            </a:solidFill>
+          </a:ln>
+        </p:spPr>
+        <p:style>
+          <a:lnRef idx="1">
+            <a:schemeClr val="dk1"/>
+          </a:lnRef>
+          <a:fillRef idx="0">
+            <a:schemeClr val="dk1"/>
+          </a:fillRef>
+          <a:effectRef idx="0">
+            <a:schemeClr val="dk1"/>
+          </a:effectRef>
+          <a:fontRef idx="minor">
+            <a:schemeClr val="tx1"/>
+          </a:fontRef>
+        </p:style>
+      </p:cxnSp>
+      <p:sp>
+        <p:nvSpPr>
+          <p:cNvPr id="11" name="Oval 10">
+            <a:extLst>
+              <a:ext uri="{FF2B5EF4-FFF2-40B4-BE49-F238E27FC236}">
+                <a16:creationId xmlns:a16="http://schemas.microsoft.com/office/drawing/2014/main" id="{0B78891E-B6C1-6E48-85FE-433CE03B9BA7}"/>
+              </a:ext>
+            </a:extLst>
+          </p:cNvPr>
+          <p:cNvSpPr/>
+          <p:nvPr/>
+        </p:nvSpPr>
+        <p:spPr>
+          <a:xfrm>
+            <a:off x="4018571" y="3609625"/>
+            <a:ext cx="273269" cy="274768"/>
+          </a:xfrm>
+          <a:prstGeom prst="ellipse">
+            <a:avLst/>
+          </a:prstGeom>
+          <a:solidFill>
+            <a:srgbClr val="FF61AF"/>
+          </a:solidFill>
+          <a:ln w="12700">
+            <a:solidFill>
+              <a:schemeClr val="bg1"/>
+            </a:solidFill>
+          </a:ln>
+          <a:effectLst>
+            <a:outerShdw blurRad="76200" dist="12700" dir="2700000" algn="tl" rotWithShape="0">
+              <a:prstClr val="black"/>
+            </a:outerShdw>
+          </a:effectLst>
+        </p:spPr>
+        <p:style>
+          <a:lnRef idx="2">
+            <a:schemeClr val="accent1">
+              <a:shade val="50000"/>
+            </a:schemeClr>
+          </a:lnRef>
+          <a:fillRef idx="1">
+            <a:schemeClr val="accent1"/>
+          </a:fillRef>
+          <a:effectRef idx="0">
+            <a:schemeClr val="accent1"/>
+          </a:effectRef>
+          <a:fontRef idx="minor">
+            <a:schemeClr val="lt1"/>
+          </a:fontRef>
+        </p:style>
+        <p:txBody>
+          <a:bodyPr rtlCol="0" anchor="ctr"/>
+          <a:lstStyle/>
+          <a:p>
+            <a:pPr algn="ctr"/>
+            <a:r>
+              <a:rPr lang="en-US" sz="1200" b="1" dirty="0">
+                <a:latin typeface="Helvetica Neue" panose="02000503000000020004" pitchFamily="2" charset="0"/>
+                <a:ea typeface="Helvetica Neue" panose="02000503000000020004" pitchFamily="2" charset="0"/>
+                <a:cs typeface="Helvetica Neue" panose="02000503000000020004" pitchFamily="2" charset="0"/>
+              </a:rPr>
+              <a:t>6</a:t>
+            </a:r>
+          </a:p>
+        </p:txBody>
+      </p:sp>
+      <p:cxnSp>
+        <p:nvCxnSpPr>
+          <p:cNvPr id="26" name="Straight Connector 25">
+            <a:extLst>
+              <a:ext uri="{FF2B5EF4-FFF2-40B4-BE49-F238E27FC236}">
+                <a16:creationId xmlns:a16="http://schemas.microsoft.com/office/drawing/2014/main" id="{F744B69F-26EA-8C40-949F-80255D5764E9}"/>
+              </a:ext>
+            </a:extLst>
+          </p:cNvPr>
+          <p:cNvCxnSpPr>
+            <a:cxnSpLocks/>
+          </p:cNvCxnSpPr>
+          <p:nvPr/>
+        </p:nvCxnSpPr>
+        <p:spPr>
+          <a:xfrm>
+            <a:off x="4290177" y="3752534"/>
+            <a:ext cx="984556" cy="0"/>
+          </a:xfrm>
+          <a:prstGeom prst="line">
+            <a:avLst/>
+          </a:prstGeom>
+          <a:ln w="25400">
+            <a:solidFill>
+              <a:schemeClr val="bg1"/>
+            </a:solidFill>
+          </a:ln>
+        </p:spPr>
+        <p:style>
+          <a:lnRef idx="1">
+            <a:schemeClr val="dk1"/>
+          </a:lnRef>
+          <a:fillRef idx="0">
+            <a:schemeClr val="dk1"/>
+          </a:fillRef>
+          <a:effectRef idx="0">
+            <a:schemeClr val="dk1"/>
+          </a:effectRef>
+          <a:fontRef idx="minor">
+            <a:schemeClr val="tx1"/>
+          </a:fontRef>
+        </p:style>
+      </p:cxnSp>
+      <p:pic>
+        <p:nvPicPr>
+          <p:cNvPr id="44" name="Picture 43">
+            <a:extLst>
+              <a:ext uri="{FF2B5EF4-FFF2-40B4-BE49-F238E27FC236}">
+                <a16:creationId xmlns:a16="http://schemas.microsoft.com/office/drawing/2014/main" id="{201C9567-F81D-8C47-81D9-FFD2F5686AB5}"/>
+              </a:ext>
+            </a:extLst>
+          </p:cNvPr>
+          <p:cNvPicPr>
+            <a:picLocks noChangeAspect="1"/>
+          </p:cNvPicPr>
+          <p:nvPr/>
+        </p:nvPicPr>
+        <p:blipFill>
+          <a:blip r:embed="rId4"/>
+          <a:stretch>
+            <a:fillRect/>
+          </a:stretch>
+        </p:blipFill>
+        <p:spPr>
+          <a:xfrm>
+            <a:off x="5339436" y="516215"/>
+            <a:ext cx="5227771" cy="4104356"/>
+          </a:xfrm>
+          <a:prstGeom prst="rect">
+            <a:avLst/>
+          </a:prstGeom>
+        </p:spPr>
+      </p:pic>
+      <p:sp>
+        <p:nvSpPr>
+          <p:cNvPr id="4" name="Oval 3">
+            <a:extLst>
+              <a:ext uri="{FF2B5EF4-FFF2-40B4-BE49-F238E27FC236}">
+                <a16:creationId xmlns:a16="http://schemas.microsoft.com/office/drawing/2014/main" id="{481B0862-5FE3-9B4B-BC61-40C8B433D6AB}"/>
+              </a:ext>
+            </a:extLst>
+          </p:cNvPr>
+          <p:cNvSpPr/>
+          <p:nvPr/>
+        </p:nvSpPr>
+        <p:spPr>
+          <a:xfrm>
+            <a:off x="4016908" y="806746"/>
+            <a:ext cx="273269" cy="274768"/>
+          </a:xfrm>
+          <a:prstGeom prst="ellipse">
+            <a:avLst/>
+          </a:prstGeom>
+          <a:solidFill>
+            <a:srgbClr val="FF61AF"/>
+          </a:solidFill>
+          <a:ln w="12700">
+            <a:solidFill>
+              <a:schemeClr val="bg1"/>
+            </a:solidFill>
+          </a:ln>
+          <a:effectLst>
+            <a:outerShdw blurRad="76200" dist="12700" dir="2700000" algn="tl" rotWithShape="0">
+              <a:prstClr val="black"/>
+            </a:outerShdw>
+          </a:effectLst>
+        </p:spPr>
+        <p:style>
+          <a:lnRef idx="2">
+            <a:schemeClr val="accent1">
+              <a:shade val="50000"/>
+            </a:schemeClr>
+          </a:lnRef>
+          <a:fillRef idx="1">
+            <a:schemeClr val="accent1"/>
+          </a:fillRef>
+          <a:effectRef idx="0">
+            <a:schemeClr val="accent1"/>
+          </a:effectRef>
+          <a:fontRef idx="minor">
+            <a:schemeClr val="lt1"/>
+          </a:fontRef>
+        </p:style>
+        <p:txBody>
+          <a:bodyPr rtlCol="0" anchor="ctr"/>
+          <a:lstStyle/>
+          <a:p>
+            <a:pPr algn="ctr"/>
+            <a:r>
+              <a:rPr lang="en-US" sz="1200" b="1" dirty="0">
+                <a:latin typeface="Helvetica Neue" panose="02000503000000020004" pitchFamily="2" charset="0"/>
+                <a:ea typeface="Helvetica Neue" panose="02000503000000020004" pitchFamily="2" charset="0"/>
+                <a:cs typeface="Helvetica Neue" panose="02000503000000020004" pitchFamily="2" charset="0"/>
+              </a:rPr>
+              <a:t>1</a:t>
+            </a:r>
+          </a:p>
+        </p:txBody>
+      </p:sp>
+      <p:cxnSp>
+        <p:nvCxnSpPr>
+          <p:cNvPr id="3" name="Straight Connector 2">
+            <a:extLst>
+              <a:ext uri="{FF2B5EF4-FFF2-40B4-BE49-F238E27FC236}">
+                <a16:creationId xmlns:a16="http://schemas.microsoft.com/office/drawing/2014/main" id="{5AA1FDF9-201C-7D4C-B282-3D9FAB07BAA0}"/>
+              </a:ext>
+            </a:extLst>
+          </p:cNvPr>
+          <p:cNvCxnSpPr>
+            <a:cxnSpLocks/>
+            <a:stCxn id="4" idx="6"/>
+          </p:cNvCxnSpPr>
+          <p:nvPr/>
+        </p:nvCxnSpPr>
+        <p:spPr>
+          <a:xfrm>
+            <a:off x="4290177" y="944130"/>
+            <a:ext cx="1134578" cy="0"/>
+          </a:xfrm>
+          <a:prstGeom prst="line">
+            <a:avLst/>
+          </a:prstGeom>
+          <a:ln w="25400">
+            <a:solidFill>
+              <a:schemeClr val="bg1"/>
+            </a:solidFill>
+          </a:ln>
+        </p:spPr>
+        <p:style>
+          <a:lnRef idx="1">
+            <a:schemeClr val="dk1"/>
+          </a:lnRef>
+          <a:fillRef idx="0">
+            <a:schemeClr val="dk1"/>
+          </a:fillRef>
+          <a:effectRef idx="0">
+            <a:schemeClr val="dk1"/>
+          </a:effectRef>
+          <a:fontRef idx="minor">
+            <a:schemeClr val="tx1"/>
+          </a:fontRef>
+        </p:style>
+      </p:cxnSp>
+      <p:sp>
+        <p:nvSpPr>
+          <p:cNvPr id="5" name="Oval 4">
+            <a:extLst>
+              <a:ext uri="{FF2B5EF4-FFF2-40B4-BE49-F238E27FC236}">
+                <a16:creationId xmlns:a16="http://schemas.microsoft.com/office/drawing/2014/main" id="{297F11CA-4A28-374D-A09E-A0617E3C9FF8}"/>
+              </a:ext>
+            </a:extLst>
+          </p:cNvPr>
+          <p:cNvSpPr/>
+          <p:nvPr/>
+        </p:nvSpPr>
+        <p:spPr>
+          <a:xfrm>
+            <a:off x="10880536" y="806746"/>
+            <a:ext cx="273269" cy="274768"/>
+          </a:xfrm>
+          <a:prstGeom prst="ellipse">
+            <a:avLst/>
+          </a:prstGeom>
+          <a:solidFill>
+            <a:srgbClr val="FF61AF"/>
+          </a:solidFill>
+          <a:ln w="12700">
+            <a:solidFill>
+              <a:schemeClr val="bg1"/>
+            </a:solidFill>
+          </a:ln>
+          <a:effectLst>
+            <a:outerShdw blurRad="76200" dist="12700" dir="2700000" algn="tl" rotWithShape="0">
+              <a:prstClr val="black"/>
+            </a:outerShdw>
+          </a:effectLst>
+        </p:spPr>
+        <p:style>
+          <a:lnRef idx="2">
+            <a:schemeClr val="accent1">
+              <a:shade val="50000"/>
+            </a:schemeClr>
+          </a:lnRef>
+          <a:fillRef idx="1">
+            <a:schemeClr val="accent1"/>
+          </a:fillRef>
+          <a:effectRef idx="0">
+            <a:schemeClr val="accent1"/>
+          </a:effectRef>
+          <a:fontRef idx="minor">
+            <a:schemeClr val="lt1"/>
+          </a:fontRef>
+        </p:style>
+        <p:txBody>
+          <a:bodyPr rtlCol="0" anchor="ctr"/>
+          <a:lstStyle/>
+          <a:p>
+            <a:pPr algn="ctr"/>
+            <a:r>
+              <a:rPr lang="en-US" sz="1200" b="1" dirty="0">
+                <a:latin typeface="Helvetica Neue" panose="02000503000000020004" pitchFamily="2" charset="0"/>
+                <a:ea typeface="Helvetica Neue" panose="02000503000000020004" pitchFamily="2" charset="0"/>
+                <a:cs typeface="Helvetica Neue" panose="02000503000000020004" pitchFamily="2" charset="0"/>
+              </a:rPr>
+              <a:t>2</a:t>
+            </a:r>
+          </a:p>
+        </p:txBody>
+      </p:sp>
+      <p:cxnSp>
+        <p:nvCxnSpPr>
+          <p:cNvPr id="17" name="Straight Connector 16">
+            <a:extLst>
+              <a:ext uri="{FF2B5EF4-FFF2-40B4-BE49-F238E27FC236}">
+                <a16:creationId xmlns:a16="http://schemas.microsoft.com/office/drawing/2014/main" id="{0163D3A8-97A5-0643-8B2C-C3AD8E96BF97}"/>
+              </a:ext>
+            </a:extLst>
+          </p:cNvPr>
+          <p:cNvCxnSpPr>
+            <a:cxnSpLocks/>
+          </p:cNvCxnSpPr>
+          <p:nvPr/>
+        </p:nvCxnSpPr>
+        <p:spPr>
+          <a:xfrm>
+            <a:off x="8009467" y="944130"/>
+            <a:ext cx="2871069" cy="0"/>
+          </a:xfrm>
+          <a:prstGeom prst="line">
+            <a:avLst/>
+          </a:prstGeom>
+          <a:ln w="25400">
+            <a:solidFill>
+              <a:schemeClr val="bg1"/>
+            </a:solidFill>
+          </a:ln>
+        </p:spPr>
+        <p:style>
+          <a:lnRef idx="1">
+            <a:schemeClr val="dk1"/>
+          </a:lnRef>
+          <a:fillRef idx="0">
+            <a:schemeClr val="dk1"/>
+          </a:fillRef>
+          <a:effectRef idx="0">
+            <a:schemeClr val="dk1"/>
+          </a:effectRef>
+          <a:fontRef idx="minor">
+            <a:schemeClr val="tx1"/>
+          </a:fontRef>
+        </p:style>
+      </p:cxnSp>
+      <p:sp>
+        <p:nvSpPr>
+          <p:cNvPr id="51" name="Oval 50">
+            <a:extLst>
+              <a:ext uri="{FF2B5EF4-FFF2-40B4-BE49-F238E27FC236}">
+                <a16:creationId xmlns:a16="http://schemas.microsoft.com/office/drawing/2014/main" id="{8DA28F2E-5CD3-9B40-A28C-BF94F2945670}"/>
+              </a:ext>
+            </a:extLst>
+          </p:cNvPr>
+          <p:cNvSpPr/>
+          <p:nvPr/>
+        </p:nvSpPr>
+        <p:spPr>
+          <a:xfrm>
+            <a:off x="10880536" y="2507583"/>
+            <a:ext cx="273269" cy="274768"/>
+          </a:xfrm>
+          <a:prstGeom prst="ellipse">
+            <a:avLst/>
+          </a:prstGeom>
+          <a:solidFill>
+            <a:srgbClr val="FF61AF"/>
+          </a:solidFill>
+          <a:ln w="12700">
+            <a:solidFill>
+              <a:schemeClr val="bg1"/>
+            </a:solidFill>
+          </a:ln>
+          <a:effectLst>
+            <a:outerShdw blurRad="76200" dist="12700" dir="2700000" algn="tl" rotWithShape="0">
+              <a:prstClr val="black"/>
+            </a:outerShdw>
+          </a:effectLst>
+        </p:spPr>
+        <p:style>
+          <a:lnRef idx="2">
+            <a:schemeClr val="accent1">
+              <a:shade val="50000"/>
+            </a:schemeClr>
+          </a:lnRef>
+          <a:fillRef idx="1">
+            <a:schemeClr val="accent1"/>
+          </a:fillRef>
+          <a:effectRef idx="0">
+            <a:schemeClr val="accent1"/>
+          </a:effectRef>
+          <a:fontRef idx="minor">
+            <a:schemeClr val="lt1"/>
+          </a:fontRef>
+        </p:style>
+        <p:txBody>
+          <a:bodyPr rtlCol="0" anchor="ctr"/>
+          <a:lstStyle/>
+          <a:p>
+            <a:pPr algn="ctr"/>
+            <a:r>
+              <a:rPr lang="en-US" sz="1200" b="1" dirty="0">
+                <a:latin typeface="Helvetica Neue" panose="02000503000000020004" pitchFamily="2" charset="0"/>
+                <a:ea typeface="Helvetica Neue" panose="02000503000000020004" pitchFamily="2" charset="0"/>
+                <a:cs typeface="Helvetica Neue" panose="02000503000000020004" pitchFamily="2" charset="0"/>
+              </a:rPr>
+              <a:t>7</a:t>
+            </a:r>
+          </a:p>
+        </p:txBody>
+      </p:sp>
+      <p:cxnSp>
+        <p:nvCxnSpPr>
+          <p:cNvPr id="52" name="Straight Connector 51">
+            <a:extLst>
+              <a:ext uri="{FF2B5EF4-FFF2-40B4-BE49-F238E27FC236}">
+                <a16:creationId xmlns:a16="http://schemas.microsoft.com/office/drawing/2014/main" id="{8CE82FFC-9D93-4247-B4D7-25D677C884C8}"/>
+              </a:ext>
+            </a:extLst>
+          </p:cNvPr>
+          <p:cNvCxnSpPr>
+            <a:cxnSpLocks/>
+          </p:cNvCxnSpPr>
+          <p:nvPr/>
+        </p:nvCxnSpPr>
+        <p:spPr>
+          <a:xfrm>
+            <a:off x="8627533" y="2644967"/>
+            <a:ext cx="2253003" cy="0"/>
+          </a:xfrm>
+          <a:prstGeom prst="line">
+            <a:avLst/>
+          </a:prstGeom>
+          <a:ln w="25400">
+            <a:solidFill>
+              <a:schemeClr val="bg1"/>
+            </a:solidFill>
+          </a:ln>
+        </p:spPr>
+        <p:style>
+          <a:lnRef idx="1">
+            <a:schemeClr val="dk1"/>
+          </a:lnRef>
+          <a:fillRef idx="0">
+            <a:schemeClr val="dk1"/>
+          </a:fillRef>
+          <a:effectRef idx="0">
+            <a:schemeClr val="dk1"/>
+          </a:effectRef>
+          <a:fontRef idx="minor">
+            <a:schemeClr val="tx1"/>
+          </a:fontRef>
+        </p:style>
+      </p:cxnSp>
+      <p:cxnSp>
+        <p:nvCxnSpPr>
+          <p:cNvPr id="54" name="Straight Connector 53">
+            <a:extLst>
+              <a:ext uri="{FF2B5EF4-FFF2-40B4-BE49-F238E27FC236}">
+                <a16:creationId xmlns:a16="http://schemas.microsoft.com/office/drawing/2014/main" id="{EC477232-A297-064C-9389-E193CD002324}"/>
+              </a:ext>
+            </a:extLst>
+          </p:cNvPr>
+          <p:cNvCxnSpPr>
+            <a:cxnSpLocks/>
+          </p:cNvCxnSpPr>
+          <p:nvPr/>
+        </p:nvCxnSpPr>
+        <p:spPr>
+          <a:xfrm>
+            <a:off x="8627533" y="2632267"/>
+            <a:ext cx="0" cy="150084"/>
+          </a:xfrm>
+          <a:prstGeom prst="line">
+            <a:avLst/>
+          </a:prstGeom>
+          <a:ln w="25400">
+            <a:solidFill>
+              <a:schemeClr val="bg1"/>
+            </a:solidFill>
+          </a:ln>
+        </p:spPr>
+        <p:style>
+          <a:lnRef idx="1">
+            <a:schemeClr val="dk1"/>
+          </a:lnRef>
+          <a:fillRef idx="0">
+            <a:schemeClr val="dk1"/>
+          </a:fillRef>
+          <a:effectRef idx="0">
+            <a:schemeClr val="dk1"/>
+          </a:effectRef>
+          <a:fontRef idx="minor">
+            <a:schemeClr val="tx1"/>
+          </a:fontRef>
+        </p:style>
+      </p:cxnSp>
+    </p:spTree>
+    <p:extLst>
+      <p:ext uri="{BB962C8B-B14F-4D97-AF65-F5344CB8AC3E}">
+        <p14:creationId xmlns:p14="http://schemas.microsoft.com/office/powerpoint/2010/main" val="2599968867"/>
+      </p:ext>
+    </p:extLst>
+  </p:cSld>
+  <p:clrMapOvr>
+    <a:masterClrMapping/>
+  </p:clrMapOvr>
+</p:sld>
+</file>
+
+<file path=ppt/slides/slide12.xml><?xml version="1.0" encoding="utf-8"?>
+<p:sld xmlns:a="http://schemas.openxmlformats.org/drawingml/2006/main" xmlns:r="http://schemas.openxmlformats.org/officeDocument/2006/relationships" xmlns:p="http://schemas.openxmlformats.org/presentationml/2006/main">
+  <p:cSld>
+    <p:spTree>
+      <p:nvGrpSpPr>
+        <p:cNvPr id="1" name=""/>
+        <p:cNvGrpSpPr/>
+        <p:nvPr/>
+      </p:nvGrpSpPr>
+      <p:grpSpPr>
+        <a:xfrm>
+          <a:off x="0" y="0"/>
+          <a:ext cx="0" cy="0"/>
+          <a:chOff x="0" y="0"/>
+          <a:chExt cx="0" cy="0"/>
+        </a:xfrm>
+      </p:grpSpPr>
+      <p:sp>
+        <p:nvSpPr>
+          <p:cNvPr id="2" name="Rectangle 1">
+            <a:extLst>
+              <a:ext uri="{FF2B5EF4-FFF2-40B4-BE49-F238E27FC236}">
+                <a16:creationId xmlns:a16="http://schemas.microsoft.com/office/drawing/2014/main" id="{82E1466D-D13D-CC40-B9B3-857BD65CA24F}"/>
+              </a:ext>
+            </a:extLst>
+          </p:cNvPr>
+          <p:cNvSpPr/>
+          <p:nvPr/>
+        </p:nvSpPr>
+        <p:spPr>
+          <a:xfrm>
+            <a:off x="0" y="0"/>
+            <a:ext cx="12192000" cy="6858000"/>
+          </a:xfrm>
+          <a:prstGeom prst="rect">
+            <a:avLst/>
+          </a:prstGeom>
+          <a:solidFill>
+            <a:srgbClr val="606060"/>
+          </a:solidFill>
+        </p:spPr>
+        <p:style>
+          <a:lnRef idx="2">
+            <a:schemeClr val="accent1">
+              <a:shade val="50000"/>
+            </a:schemeClr>
+          </a:lnRef>
+          <a:fillRef idx="1">
+            <a:schemeClr val="accent1"/>
+          </a:fillRef>
+          <a:effectRef idx="0">
+            <a:schemeClr val="accent1"/>
+          </a:effectRef>
+          <a:fontRef idx="minor">
+            <a:schemeClr val="lt1"/>
+          </a:fontRef>
+        </p:style>
+        <p:txBody>
+          <a:bodyPr rtlCol="0" anchor="ctr"/>
+          <a:lstStyle/>
+          <a:p>
+            <a:pPr algn="ctr"/>
+            <a:endParaRPr lang="en-US"/>
+          </a:p>
+        </p:txBody>
+      </p:sp>
+      <p:pic>
+        <p:nvPicPr>
+          <p:cNvPr id="4" name="Picture 3">
+            <a:extLst>
+              <a:ext uri="{FF2B5EF4-FFF2-40B4-BE49-F238E27FC236}">
+                <a16:creationId xmlns:a16="http://schemas.microsoft.com/office/drawing/2014/main" id="{DE289443-01E1-8E41-BB2E-2AA8C46485C7}"/>
+              </a:ext>
+            </a:extLst>
+          </p:cNvPr>
+          <p:cNvPicPr>
+            <a:picLocks noChangeAspect="1"/>
+          </p:cNvPicPr>
+          <p:nvPr/>
+        </p:nvPicPr>
+        <p:blipFill>
+          <a:blip r:embed="rId2"/>
+          <a:stretch>
+            <a:fillRect/>
+          </a:stretch>
+        </p:blipFill>
+        <p:spPr>
+          <a:xfrm>
+            <a:off x="215337" y="170744"/>
+            <a:ext cx="5753100" cy="4394200"/>
+          </a:xfrm>
+          <a:prstGeom prst="rect">
+            <a:avLst/>
+          </a:prstGeom>
+        </p:spPr>
+      </p:pic>
+      <p:sp>
+        <p:nvSpPr>
+          <p:cNvPr id="5" name="Rounded Rectangle 4">
+            <a:extLst>
+              <a:ext uri="{FF2B5EF4-FFF2-40B4-BE49-F238E27FC236}">
+                <a16:creationId xmlns:a16="http://schemas.microsoft.com/office/drawing/2014/main" id="{23D9E49B-876B-E440-AAD8-B74F3E991816}"/>
+              </a:ext>
+            </a:extLst>
+          </p:cNvPr>
+          <p:cNvSpPr/>
+          <p:nvPr/>
+        </p:nvSpPr>
+        <p:spPr>
+          <a:xfrm>
+            <a:off x="5407378" y="477304"/>
+            <a:ext cx="444834" cy="331438"/>
+          </a:xfrm>
+          <a:prstGeom prst="roundRect">
+            <a:avLst>
+              <a:gd name="adj" fmla="val 17089"/>
+            </a:avLst>
+          </a:prstGeom>
+          <a:noFill/>
+          <a:ln w="38100">
+            <a:solidFill>
+              <a:srgbClr val="FF61AF"/>
+            </a:solidFill>
+          </a:ln>
+          <a:effectLst>
+            <a:outerShdw blurRad="101600" dist="25400" dir="2700000" algn="tl" rotWithShape="0">
+              <a:prstClr val="black"/>
+            </a:outerShdw>
+          </a:effectLst>
+        </p:spPr>
+        <p:style>
+          <a:lnRef idx="2">
+            <a:schemeClr val="accent1">
+              <a:shade val="50000"/>
+            </a:schemeClr>
+          </a:lnRef>
+          <a:fillRef idx="1">
+            <a:schemeClr val="accent1"/>
+          </a:fillRef>
+          <a:effectRef idx="0">
+            <a:schemeClr val="accent1"/>
+          </a:effectRef>
+          <a:fontRef idx="minor">
+            <a:schemeClr val="lt1"/>
+          </a:fontRef>
+        </p:style>
+        <p:txBody>
+          <a:bodyPr rtlCol="0" anchor="ctr"/>
+          <a:lstStyle/>
+          <a:p>
+            <a:pPr algn="ctr"/>
+            <a:endParaRPr lang="en-US"/>
+          </a:p>
+        </p:txBody>
+      </p:sp>
+      <p:sp>
+        <p:nvSpPr>
+          <p:cNvPr id="6" name="Rounded Rectangle 5">
+            <a:extLst>
+              <a:ext uri="{FF2B5EF4-FFF2-40B4-BE49-F238E27FC236}">
+                <a16:creationId xmlns:a16="http://schemas.microsoft.com/office/drawing/2014/main" id="{01611822-8D56-3F4D-8C1B-E190B1B01F15}"/>
+              </a:ext>
+            </a:extLst>
+          </p:cNvPr>
+          <p:cNvSpPr/>
+          <p:nvPr/>
+        </p:nvSpPr>
+        <p:spPr>
+          <a:xfrm>
+            <a:off x="2207436" y="4185306"/>
+            <a:ext cx="1435831" cy="331438"/>
+          </a:xfrm>
+          <a:prstGeom prst="roundRect">
+            <a:avLst>
+              <a:gd name="adj" fmla="val 17089"/>
+            </a:avLst>
+          </a:prstGeom>
+          <a:noFill/>
+          <a:ln w="38100">
+            <a:solidFill>
+              <a:srgbClr val="FF61AF"/>
+            </a:solidFill>
+          </a:ln>
+          <a:effectLst>
+            <a:outerShdw blurRad="101600" dist="25400" dir="2700000" algn="tl" rotWithShape="0">
+              <a:prstClr val="black"/>
+            </a:outerShdw>
+          </a:effectLst>
+        </p:spPr>
+        <p:style>
+          <a:lnRef idx="2">
+            <a:schemeClr val="accent1">
+              <a:shade val="50000"/>
+            </a:schemeClr>
+          </a:lnRef>
+          <a:fillRef idx="1">
+            <a:schemeClr val="accent1"/>
+          </a:fillRef>
+          <a:effectRef idx="0">
+            <a:schemeClr val="accent1"/>
+          </a:effectRef>
+          <a:fontRef idx="minor">
+            <a:schemeClr val="lt1"/>
+          </a:fontRef>
+        </p:style>
+        <p:txBody>
+          <a:bodyPr rtlCol="0" anchor="ctr"/>
+          <a:lstStyle/>
+          <a:p>
+            <a:pPr algn="ctr"/>
+            <a:endParaRPr lang="en-US"/>
+          </a:p>
+        </p:txBody>
+      </p:sp>
+      <p:pic>
+        <p:nvPicPr>
+          <p:cNvPr id="8" name="Picture 7">
+            <a:extLst>
+              <a:ext uri="{FF2B5EF4-FFF2-40B4-BE49-F238E27FC236}">
+                <a16:creationId xmlns:a16="http://schemas.microsoft.com/office/drawing/2014/main" id="{39763D68-D1CE-7749-85CE-BAF36D63B846}"/>
+              </a:ext>
+            </a:extLst>
+          </p:cNvPr>
+          <p:cNvPicPr>
+            <a:picLocks noChangeAspect="1"/>
+          </p:cNvPicPr>
+          <p:nvPr/>
+        </p:nvPicPr>
+        <p:blipFill>
+          <a:blip r:embed="rId3"/>
+          <a:stretch>
+            <a:fillRect/>
+          </a:stretch>
+        </p:blipFill>
+        <p:spPr>
+          <a:xfrm>
+            <a:off x="6223565" y="1335616"/>
+            <a:ext cx="5791200" cy="5270500"/>
+          </a:xfrm>
+          <a:prstGeom prst="rect">
+            <a:avLst/>
+          </a:prstGeom>
+        </p:spPr>
+      </p:pic>
+      <p:sp>
+        <p:nvSpPr>
+          <p:cNvPr id="9" name="Rounded Rectangle 8">
+            <a:extLst>
+              <a:ext uri="{FF2B5EF4-FFF2-40B4-BE49-F238E27FC236}">
+                <a16:creationId xmlns:a16="http://schemas.microsoft.com/office/drawing/2014/main" id="{73DC1FE7-59FE-AE47-BCB6-B6B2A320783A}"/>
+              </a:ext>
+            </a:extLst>
+          </p:cNvPr>
+          <p:cNvSpPr/>
+          <p:nvPr/>
+        </p:nvSpPr>
+        <p:spPr>
+          <a:xfrm>
+            <a:off x="8240889" y="6212242"/>
+            <a:ext cx="1919111" cy="393874"/>
+          </a:xfrm>
+          <a:prstGeom prst="roundRect">
+            <a:avLst>
+              <a:gd name="adj" fmla="val 17089"/>
+            </a:avLst>
+          </a:prstGeom>
+          <a:noFill/>
+          <a:ln w="38100">
+            <a:solidFill>
+              <a:srgbClr val="FF61AF"/>
+            </a:solidFill>
+          </a:ln>
+          <a:effectLst>
+            <a:outerShdw blurRad="101600" dist="25400" dir="2700000" algn="tl" rotWithShape="0">
+              <a:prstClr val="black"/>
+            </a:outerShdw>
+          </a:effectLst>
+        </p:spPr>
+        <p:style>
+          <a:lnRef idx="2">
+            <a:schemeClr val="accent1">
+              <a:shade val="50000"/>
+            </a:schemeClr>
+          </a:lnRef>
+          <a:fillRef idx="1">
+            <a:schemeClr val="accent1"/>
+          </a:fillRef>
+          <a:effectRef idx="0">
+            <a:schemeClr val="accent1"/>
+          </a:effectRef>
+          <a:fontRef idx="minor">
+            <a:schemeClr val="lt1"/>
+          </a:fontRef>
+        </p:style>
+        <p:txBody>
+          <a:bodyPr rtlCol="0" anchor="ctr"/>
+          <a:lstStyle/>
+          <a:p>
+            <a:pPr algn="ctr"/>
+            <a:endParaRPr lang="en-US"/>
+          </a:p>
+        </p:txBody>
+      </p:sp>
+      <p:sp>
+        <p:nvSpPr>
+          <p:cNvPr id="10" name="Rounded Rectangle 9">
+            <a:extLst>
+              <a:ext uri="{FF2B5EF4-FFF2-40B4-BE49-F238E27FC236}">
+                <a16:creationId xmlns:a16="http://schemas.microsoft.com/office/drawing/2014/main" id="{48DC67D2-5470-8244-808D-7611F687F015}"/>
+              </a:ext>
+            </a:extLst>
+          </p:cNvPr>
+          <p:cNvSpPr/>
+          <p:nvPr/>
+        </p:nvSpPr>
+        <p:spPr>
+          <a:xfrm>
+            <a:off x="11436132" y="1690859"/>
+            <a:ext cx="444834" cy="331438"/>
+          </a:xfrm>
+          <a:prstGeom prst="roundRect">
+            <a:avLst>
+              <a:gd name="adj" fmla="val 17089"/>
+            </a:avLst>
+          </a:prstGeom>
+          <a:noFill/>
+          <a:ln w="38100">
+            <a:solidFill>
+              <a:srgbClr val="FF61AF"/>
+            </a:solidFill>
+          </a:ln>
+          <a:effectLst>
+            <a:outerShdw blurRad="101600" dist="25400" dir="2700000" algn="tl" rotWithShape="0">
+              <a:prstClr val="black"/>
+            </a:outerShdw>
+          </a:effectLst>
+        </p:spPr>
+        <p:style>
+          <a:lnRef idx="2">
+            <a:schemeClr val="accent1">
+              <a:shade val="50000"/>
+            </a:schemeClr>
+          </a:lnRef>
+          <a:fillRef idx="1">
+            <a:schemeClr val="accent1"/>
+          </a:fillRef>
+          <a:effectRef idx="0">
+            <a:schemeClr val="accent1"/>
+          </a:effectRef>
+          <a:fontRef idx="minor">
+            <a:schemeClr val="lt1"/>
+          </a:fontRef>
+        </p:style>
+        <p:txBody>
+          <a:bodyPr rtlCol="0" anchor="ctr"/>
+          <a:lstStyle/>
+          <a:p>
+            <a:pPr algn="ctr"/>
+            <a:endParaRPr lang="en-US"/>
+          </a:p>
+        </p:txBody>
+      </p:sp>
+    </p:spTree>
+    <p:extLst>
+      <p:ext uri="{BB962C8B-B14F-4D97-AF65-F5344CB8AC3E}">
+        <p14:creationId xmlns:p14="http://schemas.microsoft.com/office/powerpoint/2010/main" val="135307084"/>
+      </p:ext>
+    </p:extLst>
+  </p:cSld>
+  <p:clrMapOvr>
+    <a:masterClrMapping/>
+  </p:clrMapOvr>
+</p:sld>
+</file>
+
 <file path=ppt/slides/slide2.xml><?xml version="1.0" encoding="utf-8"?>
 <p:sld xmlns:a="http://schemas.openxmlformats.org/drawingml/2006/main" xmlns:r="http://schemas.openxmlformats.org/officeDocument/2006/relationships" xmlns:p="http://schemas.openxmlformats.org/presentationml/2006/main">
   <p:cSld>
@@ -4693,6 +7613,869 @@
     <p:extLst>
       <p:ext uri="{BB962C8B-B14F-4D97-AF65-F5344CB8AC3E}">
         <p14:creationId xmlns:p14="http://schemas.microsoft.com/office/powerpoint/2010/main" val="1013854638"/>
+      </p:ext>
+    </p:extLst>
+  </p:cSld>
+  <p:clrMapOvr>
+    <a:masterClrMapping/>
+  </p:clrMapOvr>
+</p:sld>
+</file>
+
+<file path=ppt/slides/slide9.xml><?xml version="1.0" encoding="utf-8"?>
+<p:sld xmlns:a="http://schemas.openxmlformats.org/drawingml/2006/main" xmlns:r="http://schemas.openxmlformats.org/officeDocument/2006/relationships" xmlns:p="http://schemas.openxmlformats.org/presentationml/2006/main">
+  <p:cSld>
+    <p:spTree>
+      <p:nvGrpSpPr>
+        <p:cNvPr id="1" name=""/>
+        <p:cNvGrpSpPr/>
+        <p:nvPr/>
+      </p:nvGrpSpPr>
+      <p:grpSpPr>
+        <a:xfrm>
+          <a:off x="0" y="0"/>
+          <a:ext cx="0" cy="0"/>
+          <a:chOff x="0" y="0"/>
+          <a:chExt cx="0" cy="0"/>
+        </a:xfrm>
+      </p:grpSpPr>
+      <p:sp>
+        <p:nvSpPr>
+          <p:cNvPr id="6" name="Rectangle 5">
+            <a:extLst>
+              <a:ext uri="{FF2B5EF4-FFF2-40B4-BE49-F238E27FC236}">
+                <a16:creationId xmlns:a16="http://schemas.microsoft.com/office/drawing/2014/main" id="{B25438E1-6F41-404B-80AA-9F83AE72AA20}"/>
+              </a:ext>
+            </a:extLst>
+          </p:cNvPr>
+          <p:cNvSpPr/>
+          <p:nvPr/>
+        </p:nvSpPr>
+        <p:spPr>
+          <a:xfrm>
+            <a:off x="0" y="0"/>
+            <a:ext cx="12192000" cy="6858000"/>
+          </a:xfrm>
+          <a:prstGeom prst="rect">
+            <a:avLst/>
+          </a:prstGeom>
+          <a:solidFill>
+            <a:srgbClr val="606060"/>
+          </a:solidFill>
+        </p:spPr>
+        <p:style>
+          <a:lnRef idx="2">
+            <a:schemeClr val="accent1">
+              <a:shade val="50000"/>
+            </a:schemeClr>
+          </a:lnRef>
+          <a:fillRef idx="1">
+            <a:schemeClr val="accent1"/>
+          </a:fillRef>
+          <a:effectRef idx="0">
+            <a:schemeClr val="accent1"/>
+          </a:effectRef>
+          <a:fontRef idx="minor">
+            <a:schemeClr val="lt1"/>
+          </a:fontRef>
+        </p:style>
+        <p:txBody>
+          <a:bodyPr rtlCol="0" anchor="ctr"/>
+          <a:lstStyle/>
+          <a:p>
+            <a:pPr algn="ctr"/>
+            <a:endParaRPr lang="en-US"/>
+          </a:p>
+        </p:txBody>
+      </p:sp>
+      <p:pic>
+        <p:nvPicPr>
+          <p:cNvPr id="3" name="Picture 2">
+            <a:extLst>
+              <a:ext uri="{FF2B5EF4-FFF2-40B4-BE49-F238E27FC236}">
+                <a16:creationId xmlns:a16="http://schemas.microsoft.com/office/drawing/2014/main" id="{6ADEEEBE-5451-3047-B324-0E124C0D5FDB}"/>
+              </a:ext>
+            </a:extLst>
+          </p:cNvPr>
+          <p:cNvPicPr>
+            <a:picLocks noChangeAspect="1"/>
+          </p:cNvPicPr>
+          <p:nvPr/>
+        </p:nvPicPr>
+        <p:blipFill>
+          <a:blip r:embed="rId2"/>
+          <a:stretch>
+            <a:fillRect/>
+          </a:stretch>
+        </p:blipFill>
+        <p:spPr>
+          <a:xfrm>
+            <a:off x="873077" y="3331467"/>
+            <a:ext cx="2557348" cy="3039866"/>
+          </a:xfrm>
+          <a:prstGeom prst="rect">
+            <a:avLst/>
+          </a:prstGeom>
+        </p:spPr>
+      </p:pic>
+      <p:sp>
+        <p:nvSpPr>
+          <p:cNvPr id="4" name="Rounded Rectangle 3">
+            <a:extLst>
+              <a:ext uri="{FF2B5EF4-FFF2-40B4-BE49-F238E27FC236}">
+                <a16:creationId xmlns:a16="http://schemas.microsoft.com/office/drawing/2014/main" id="{97EBFC6A-84BC-3948-B243-17C4A11C1134}"/>
+              </a:ext>
+            </a:extLst>
+          </p:cNvPr>
+          <p:cNvSpPr/>
+          <p:nvPr/>
+        </p:nvSpPr>
+        <p:spPr>
+          <a:xfrm>
+            <a:off x="873077" y="5687316"/>
+            <a:ext cx="859340" cy="266700"/>
+          </a:xfrm>
+          <a:prstGeom prst="roundRect">
+            <a:avLst/>
+          </a:prstGeom>
+          <a:noFill/>
+          <a:ln w="25400">
+            <a:solidFill>
+              <a:srgbClr val="FF61AF"/>
+            </a:solidFill>
+          </a:ln>
+          <a:effectLst>
+            <a:outerShdw blurRad="101600" dist="25400" dir="2700000" algn="tl" rotWithShape="0">
+              <a:prstClr val="black"/>
+            </a:outerShdw>
+          </a:effectLst>
+        </p:spPr>
+        <p:style>
+          <a:lnRef idx="2">
+            <a:schemeClr val="accent1">
+              <a:shade val="50000"/>
+            </a:schemeClr>
+          </a:lnRef>
+          <a:fillRef idx="1">
+            <a:schemeClr val="accent1"/>
+          </a:fillRef>
+          <a:effectRef idx="0">
+            <a:schemeClr val="accent1"/>
+          </a:effectRef>
+          <a:fontRef idx="minor">
+            <a:schemeClr val="lt1"/>
+          </a:fontRef>
+        </p:style>
+        <p:txBody>
+          <a:bodyPr rtlCol="0" anchor="ctr"/>
+          <a:lstStyle/>
+          <a:p>
+            <a:pPr algn="ctr"/>
+            <a:endParaRPr lang="en-US"/>
+          </a:p>
+        </p:txBody>
+      </p:sp>
+      <p:sp>
+        <p:nvSpPr>
+          <p:cNvPr id="5" name="Rounded Rectangle 4">
+            <a:extLst>
+              <a:ext uri="{FF2B5EF4-FFF2-40B4-BE49-F238E27FC236}">
+                <a16:creationId xmlns:a16="http://schemas.microsoft.com/office/drawing/2014/main" id="{3664810F-7DE8-394B-AE74-11446C590AA0}"/>
+              </a:ext>
+            </a:extLst>
+          </p:cNvPr>
+          <p:cNvSpPr/>
+          <p:nvPr/>
+        </p:nvSpPr>
+        <p:spPr>
+          <a:xfrm>
+            <a:off x="873077" y="3331467"/>
+            <a:ext cx="943721" cy="220384"/>
+          </a:xfrm>
+          <a:prstGeom prst="roundRect">
+            <a:avLst/>
+          </a:prstGeom>
+          <a:noFill/>
+          <a:ln w="25400">
+            <a:solidFill>
+              <a:srgbClr val="FF61AF"/>
+            </a:solidFill>
+          </a:ln>
+          <a:effectLst>
+            <a:outerShdw blurRad="101600" dist="25400" dir="2700000" algn="tl" rotWithShape="0">
+              <a:prstClr val="black"/>
+            </a:outerShdw>
+          </a:effectLst>
+        </p:spPr>
+        <p:style>
+          <a:lnRef idx="2">
+            <a:schemeClr val="accent1">
+              <a:shade val="50000"/>
+            </a:schemeClr>
+          </a:lnRef>
+          <a:fillRef idx="1">
+            <a:schemeClr val="accent1"/>
+          </a:fillRef>
+          <a:effectRef idx="0">
+            <a:schemeClr val="accent1"/>
+          </a:effectRef>
+          <a:fontRef idx="minor">
+            <a:schemeClr val="lt1"/>
+          </a:fontRef>
+        </p:style>
+        <p:txBody>
+          <a:bodyPr rtlCol="0" anchor="ctr"/>
+          <a:lstStyle/>
+          <a:p>
+            <a:pPr algn="ctr"/>
+            <a:endParaRPr lang="en-US"/>
+          </a:p>
+        </p:txBody>
+      </p:sp>
+      <p:pic>
+        <p:nvPicPr>
+          <p:cNvPr id="7" name="Picture 6">
+            <a:extLst>
+              <a:ext uri="{FF2B5EF4-FFF2-40B4-BE49-F238E27FC236}">
+                <a16:creationId xmlns:a16="http://schemas.microsoft.com/office/drawing/2014/main" id="{B616824C-B29D-8648-AE5D-CEF5B2D226E8}"/>
+              </a:ext>
+            </a:extLst>
+          </p:cNvPr>
+          <p:cNvPicPr>
+            <a:picLocks noChangeAspect="1"/>
+          </p:cNvPicPr>
+          <p:nvPr/>
+        </p:nvPicPr>
+        <p:blipFill>
+          <a:blip r:embed="rId3"/>
+          <a:stretch>
+            <a:fillRect/>
+          </a:stretch>
+        </p:blipFill>
+        <p:spPr>
+          <a:xfrm>
+            <a:off x="6496050" y="4555233"/>
+            <a:ext cx="5168900" cy="1816100"/>
+          </a:xfrm>
+          <a:prstGeom prst="rect">
+            <a:avLst/>
+          </a:prstGeom>
+        </p:spPr>
+      </p:pic>
+      <p:sp>
+        <p:nvSpPr>
+          <p:cNvPr id="8" name="Oval 7">
+            <a:extLst>
+              <a:ext uri="{FF2B5EF4-FFF2-40B4-BE49-F238E27FC236}">
+                <a16:creationId xmlns:a16="http://schemas.microsoft.com/office/drawing/2014/main" id="{AE8DDC25-D2F4-D940-B38B-0DDEDE6A82C3}"/>
+              </a:ext>
+            </a:extLst>
+          </p:cNvPr>
+          <p:cNvSpPr/>
+          <p:nvPr/>
+        </p:nvSpPr>
+        <p:spPr>
+          <a:xfrm>
+            <a:off x="5490647" y="4959884"/>
+            <a:ext cx="273269" cy="274768"/>
+          </a:xfrm>
+          <a:prstGeom prst="ellipse">
+            <a:avLst/>
+          </a:prstGeom>
+          <a:solidFill>
+            <a:srgbClr val="FF61AF"/>
+          </a:solidFill>
+          <a:ln w="12700">
+            <a:solidFill>
+              <a:schemeClr val="bg1"/>
+            </a:solidFill>
+          </a:ln>
+          <a:effectLst>
+            <a:outerShdw blurRad="76200" dist="12700" dir="2700000" algn="tl" rotWithShape="0">
+              <a:prstClr val="black"/>
+            </a:outerShdw>
+          </a:effectLst>
+        </p:spPr>
+        <p:style>
+          <a:lnRef idx="2">
+            <a:schemeClr val="accent1">
+              <a:shade val="50000"/>
+            </a:schemeClr>
+          </a:lnRef>
+          <a:fillRef idx="1">
+            <a:schemeClr val="accent1"/>
+          </a:fillRef>
+          <a:effectRef idx="0">
+            <a:schemeClr val="accent1"/>
+          </a:effectRef>
+          <a:fontRef idx="minor">
+            <a:schemeClr val="lt1"/>
+          </a:fontRef>
+        </p:style>
+        <p:txBody>
+          <a:bodyPr rtlCol="0" anchor="ctr"/>
+          <a:lstStyle/>
+          <a:p>
+            <a:pPr algn="ctr"/>
+            <a:r>
+              <a:rPr lang="en-US" sz="1200" b="1" dirty="0">
+                <a:latin typeface="Helvetica Neue" panose="02000503000000020004" pitchFamily="2" charset="0"/>
+                <a:ea typeface="Helvetica Neue" panose="02000503000000020004" pitchFamily="2" charset="0"/>
+                <a:cs typeface="Helvetica Neue" panose="02000503000000020004" pitchFamily="2" charset="0"/>
+              </a:rPr>
+              <a:t>1</a:t>
+            </a:r>
+          </a:p>
+        </p:txBody>
+      </p:sp>
+      <p:sp>
+        <p:nvSpPr>
+          <p:cNvPr id="9" name="Oval 8">
+            <a:extLst>
+              <a:ext uri="{FF2B5EF4-FFF2-40B4-BE49-F238E27FC236}">
+                <a16:creationId xmlns:a16="http://schemas.microsoft.com/office/drawing/2014/main" id="{E2827B58-31EF-FF4C-A76E-38673603E2CE}"/>
+              </a:ext>
+            </a:extLst>
+          </p:cNvPr>
+          <p:cNvSpPr/>
+          <p:nvPr/>
+        </p:nvSpPr>
+        <p:spPr>
+          <a:xfrm>
+            <a:off x="5091880" y="5255691"/>
+            <a:ext cx="273269" cy="274768"/>
+          </a:xfrm>
+          <a:prstGeom prst="ellipse">
+            <a:avLst/>
+          </a:prstGeom>
+          <a:solidFill>
+            <a:srgbClr val="FF61AF"/>
+          </a:solidFill>
+          <a:ln w="12700">
+            <a:solidFill>
+              <a:schemeClr val="bg1"/>
+            </a:solidFill>
+          </a:ln>
+          <a:effectLst>
+            <a:outerShdw blurRad="76200" dist="12700" dir="2700000" algn="tl" rotWithShape="0">
+              <a:prstClr val="black"/>
+            </a:outerShdw>
+          </a:effectLst>
+        </p:spPr>
+        <p:style>
+          <a:lnRef idx="2">
+            <a:schemeClr val="accent1">
+              <a:shade val="50000"/>
+            </a:schemeClr>
+          </a:lnRef>
+          <a:fillRef idx="1">
+            <a:schemeClr val="accent1"/>
+          </a:fillRef>
+          <a:effectRef idx="0">
+            <a:schemeClr val="accent1"/>
+          </a:effectRef>
+          <a:fontRef idx="minor">
+            <a:schemeClr val="lt1"/>
+          </a:fontRef>
+        </p:style>
+        <p:txBody>
+          <a:bodyPr rtlCol="0" anchor="ctr"/>
+          <a:lstStyle/>
+          <a:p>
+            <a:pPr algn="ctr"/>
+            <a:r>
+              <a:rPr lang="en-US" sz="1200" b="1" dirty="0">
+                <a:latin typeface="Helvetica Neue" panose="02000503000000020004" pitchFamily="2" charset="0"/>
+                <a:ea typeface="Helvetica Neue" panose="02000503000000020004" pitchFamily="2" charset="0"/>
+                <a:cs typeface="Helvetica Neue" panose="02000503000000020004" pitchFamily="2" charset="0"/>
+              </a:rPr>
+              <a:t>2</a:t>
+            </a:r>
+          </a:p>
+        </p:txBody>
+      </p:sp>
+      <p:sp>
+        <p:nvSpPr>
+          <p:cNvPr id="10" name="Oval 9">
+            <a:extLst>
+              <a:ext uri="{FF2B5EF4-FFF2-40B4-BE49-F238E27FC236}">
+                <a16:creationId xmlns:a16="http://schemas.microsoft.com/office/drawing/2014/main" id="{5C744A59-44D9-A14E-9F11-95E58C90A1A2}"/>
+              </a:ext>
+            </a:extLst>
+          </p:cNvPr>
+          <p:cNvSpPr/>
+          <p:nvPr/>
+        </p:nvSpPr>
+        <p:spPr>
+          <a:xfrm>
+            <a:off x="5490653" y="5559396"/>
+            <a:ext cx="273269" cy="274768"/>
+          </a:xfrm>
+          <a:prstGeom prst="ellipse">
+            <a:avLst/>
+          </a:prstGeom>
+          <a:solidFill>
+            <a:srgbClr val="FF61AF"/>
+          </a:solidFill>
+          <a:ln w="12700">
+            <a:solidFill>
+              <a:schemeClr val="bg1"/>
+            </a:solidFill>
+          </a:ln>
+          <a:effectLst>
+            <a:outerShdw blurRad="76200" dist="12700" dir="2700000" algn="tl" rotWithShape="0">
+              <a:prstClr val="black"/>
+            </a:outerShdw>
+          </a:effectLst>
+        </p:spPr>
+        <p:style>
+          <a:lnRef idx="2">
+            <a:schemeClr val="accent1">
+              <a:shade val="50000"/>
+            </a:schemeClr>
+          </a:lnRef>
+          <a:fillRef idx="1">
+            <a:schemeClr val="accent1"/>
+          </a:fillRef>
+          <a:effectRef idx="0">
+            <a:schemeClr val="accent1"/>
+          </a:effectRef>
+          <a:fontRef idx="minor">
+            <a:schemeClr val="lt1"/>
+          </a:fontRef>
+        </p:style>
+        <p:txBody>
+          <a:bodyPr rtlCol="0" anchor="ctr"/>
+          <a:lstStyle/>
+          <a:p>
+            <a:pPr algn="ctr"/>
+            <a:r>
+              <a:rPr lang="en-US" sz="1200" b="1" dirty="0">
+                <a:latin typeface="Helvetica Neue" panose="02000503000000020004" pitchFamily="2" charset="0"/>
+                <a:ea typeface="Helvetica Neue" panose="02000503000000020004" pitchFamily="2" charset="0"/>
+                <a:cs typeface="Helvetica Neue" panose="02000503000000020004" pitchFamily="2" charset="0"/>
+              </a:rPr>
+              <a:t>3</a:t>
+            </a:r>
+          </a:p>
+        </p:txBody>
+      </p:sp>
+      <p:sp>
+        <p:nvSpPr>
+          <p:cNvPr id="11" name="Oval 10">
+            <a:extLst>
+              <a:ext uri="{FF2B5EF4-FFF2-40B4-BE49-F238E27FC236}">
+                <a16:creationId xmlns:a16="http://schemas.microsoft.com/office/drawing/2014/main" id="{C5A41492-0B1A-C949-9FD7-F8BDC8D94053}"/>
+              </a:ext>
+            </a:extLst>
+          </p:cNvPr>
+          <p:cNvSpPr/>
+          <p:nvPr/>
+        </p:nvSpPr>
+        <p:spPr>
+          <a:xfrm>
+            <a:off x="5100724" y="5903838"/>
+            <a:ext cx="273269" cy="274768"/>
+          </a:xfrm>
+          <a:prstGeom prst="ellipse">
+            <a:avLst/>
+          </a:prstGeom>
+          <a:solidFill>
+            <a:srgbClr val="FF61AF"/>
+          </a:solidFill>
+          <a:ln w="12700">
+            <a:solidFill>
+              <a:schemeClr val="bg1"/>
+            </a:solidFill>
+          </a:ln>
+          <a:effectLst>
+            <a:outerShdw blurRad="76200" dist="12700" dir="2700000" algn="tl" rotWithShape="0">
+              <a:prstClr val="black"/>
+            </a:outerShdw>
+          </a:effectLst>
+        </p:spPr>
+        <p:style>
+          <a:lnRef idx="2">
+            <a:schemeClr val="accent1">
+              <a:shade val="50000"/>
+            </a:schemeClr>
+          </a:lnRef>
+          <a:fillRef idx="1">
+            <a:schemeClr val="accent1"/>
+          </a:fillRef>
+          <a:effectRef idx="0">
+            <a:schemeClr val="accent1"/>
+          </a:effectRef>
+          <a:fontRef idx="minor">
+            <a:schemeClr val="lt1"/>
+          </a:fontRef>
+        </p:style>
+        <p:txBody>
+          <a:bodyPr rtlCol="0" anchor="ctr"/>
+          <a:lstStyle/>
+          <a:p>
+            <a:pPr algn="ctr"/>
+            <a:r>
+              <a:rPr lang="en-US" sz="1200" b="1" dirty="0">
+                <a:latin typeface="Helvetica Neue" panose="02000503000000020004" pitchFamily="2" charset="0"/>
+                <a:ea typeface="Helvetica Neue" panose="02000503000000020004" pitchFamily="2" charset="0"/>
+                <a:cs typeface="Helvetica Neue" panose="02000503000000020004" pitchFamily="2" charset="0"/>
+              </a:rPr>
+              <a:t>4</a:t>
+            </a:r>
+          </a:p>
+        </p:txBody>
+      </p:sp>
+      <p:cxnSp>
+        <p:nvCxnSpPr>
+          <p:cNvPr id="12" name="Straight Connector 11">
+            <a:extLst>
+              <a:ext uri="{FF2B5EF4-FFF2-40B4-BE49-F238E27FC236}">
+                <a16:creationId xmlns:a16="http://schemas.microsoft.com/office/drawing/2014/main" id="{02053E82-628D-914B-B9E8-F5C8F033E29A}"/>
+              </a:ext>
+            </a:extLst>
+          </p:cNvPr>
+          <p:cNvCxnSpPr>
+            <a:stCxn id="8" idx="6"/>
+          </p:cNvCxnSpPr>
+          <p:nvPr/>
+        </p:nvCxnSpPr>
+        <p:spPr>
+          <a:xfrm flipV="1">
+            <a:off x="5763916" y="5095124"/>
+            <a:ext cx="664167" cy="2144"/>
+          </a:xfrm>
+          <a:prstGeom prst="line">
+            <a:avLst/>
+          </a:prstGeom>
+          <a:ln w="25400">
+            <a:solidFill>
+              <a:schemeClr val="bg1"/>
+            </a:solidFill>
+          </a:ln>
+        </p:spPr>
+        <p:style>
+          <a:lnRef idx="1">
+            <a:schemeClr val="dk1"/>
+          </a:lnRef>
+          <a:fillRef idx="0">
+            <a:schemeClr val="dk1"/>
+          </a:fillRef>
+          <a:effectRef idx="0">
+            <a:schemeClr val="dk1"/>
+          </a:effectRef>
+          <a:fontRef idx="minor">
+            <a:schemeClr val="tx1"/>
+          </a:fontRef>
+        </p:style>
+      </p:cxnSp>
+      <p:cxnSp>
+        <p:nvCxnSpPr>
+          <p:cNvPr id="13" name="Straight Connector 12">
+            <a:extLst>
+              <a:ext uri="{FF2B5EF4-FFF2-40B4-BE49-F238E27FC236}">
+                <a16:creationId xmlns:a16="http://schemas.microsoft.com/office/drawing/2014/main" id="{620EC8A9-11D8-2640-B972-34E623070E02}"/>
+              </a:ext>
+            </a:extLst>
+          </p:cNvPr>
+          <p:cNvCxnSpPr>
+            <a:cxnSpLocks/>
+          </p:cNvCxnSpPr>
+          <p:nvPr/>
+        </p:nvCxnSpPr>
+        <p:spPr>
+          <a:xfrm>
+            <a:off x="5363867" y="5392848"/>
+            <a:ext cx="1064216" cy="0"/>
+          </a:xfrm>
+          <a:prstGeom prst="line">
+            <a:avLst/>
+          </a:prstGeom>
+          <a:ln w="25400">
+            <a:solidFill>
+              <a:schemeClr val="bg1"/>
+            </a:solidFill>
+          </a:ln>
+        </p:spPr>
+        <p:style>
+          <a:lnRef idx="1">
+            <a:schemeClr val="dk1"/>
+          </a:lnRef>
+          <a:fillRef idx="0">
+            <a:schemeClr val="dk1"/>
+          </a:fillRef>
+          <a:effectRef idx="0">
+            <a:schemeClr val="dk1"/>
+          </a:effectRef>
+          <a:fontRef idx="minor">
+            <a:schemeClr val="tx1"/>
+          </a:fontRef>
+        </p:style>
+      </p:cxnSp>
+      <p:cxnSp>
+        <p:nvCxnSpPr>
+          <p:cNvPr id="14" name="Straight Connector 13">
+            <a:extLst>
+              <a:ext uri="{FF2B5EF4-FFF2-40B4-BE49-F238E27FC236}">
+                <a16:creationId xmlns:a16="http://schemas.microsoft.com/office/drawing/2014/main" id="{EAE659CA-1395-1246-BD18-B21AC4F4B563}"/>
+              </a:ext>
+            </a:extLst>
+          </p:cNvPr>
+          <p:cNvCxnSpPr/>
+          <p:nvPr/>
+        </p:nvCxnSpPr>
+        <p:spPr>
+          <a:xfrm flipV="1">
+            <a:off x="5763916" y="5694636"/>
+            <a:ext cx="664167" cy="2144"/>
+          </a:xfrm>
+          <a:prstGeom prst="line">
+            <a:avLst/>
+          </a:prstGeom>
+          <a:ln w="25400">
+            <a:solidFill>
+              <a:schemeClr val="bg1"/>
+            </a:solidFill>
+          </a:ln>
+        </p:spPr>
+        <p:style>
+          <a:lnRef idx="1">
+            <a:schemeClr val="dk1"/>
+          </a:lnRef>
+          <a:fillRef idx="0">
+            <a:schemeClr val="dk1"/>
+          </a:fillRef>
+          <a:effectRef idx="0">
+            <a:schemeClr val="dk1"/>
+          </a:effectRef>
+          <a:fontRef idx="minor">
+            <a:schemeClr val="tx1"/>
+          </a:fontRef>
+        </p:style>
+      </p:cxnSp>
+      <p:cxnSp>
+        <p:nvCxnSpPr>
+          <p:cNvPr id="15" name="Straight Connector 14">
+            <a:extLst>
+              <a:ext uri="{FF2B5EF4-FFF2-40B4-BE49-F238E27FC236}">
+                <a16:creationId xmlns:a16="http://schemas.microsoft.com/office/drawing/2014/main" id="{DB251BD0-A2AD-D14F-A159-980EC096884D}"/>
+              </a:ext>
+            </a:extLst>
+          </p:cNvPr>
+          <p:cNvCxnSpPr>
+            <a:cxnSpLocks/>
+          </p:cNvCxnSpPr>
+          <p:nvPr/>
+        </p:nvCxnSpPr>
+        <p:spPr>
+          <a:xfrm>
+            <a:off x="5363867" y="6024502"/>
+            <a:ext cx="1064216" cy="0"/>
+          </a:xfrm>
+          <a:prstGeom prst="line">
+            <a:avLst/>
+          </a:prstGeom>
+          <a:ln w="25400">
+            <a:solidFill>
+              <a:schemeClr val="bg1"/>
+            </a:solidFill>
+          </a:ln>
+        </p:spPr>
+        <p:style>
+          <a:lnRef idx="1">
+            <a:schemeClr val="dk1"/>
+          </a:lnRef>
+          <a:fillRef idx="0">
+            <a:schemeClr val="dk1"/>
+          </a:fillRef>
+          <a:effectRef idx="0">
+            <a:schemeClr val="dk1"/>
+          </a:effectRef>
+          <a:fontRef idx="minor">
+            <a:schemeClr val="tx1"/>
+          </a:fontRef>
+        </p:style>
+      </p:cxnSp>
+      <p:pic>
+        <p:nvPicPr>
+          <p:cNvPr id="19" name="Picture 18">
+            <a:extLst>
+              <a:ext uri="{FF2B5EF4-FFF2-40B4-BE49-F238E27FC236}">
+                <a16:creationId xmlns:a16="http://schemas.microsoft.com/office/drawing/2014/main" id="{F12B1DBE-40F5-264A-9AB9-675A95A6BD91}"/>
+              </a:ext>
+            </a:extLst>
+          </p:cNvPr>
+          <p:cNvPicPr>
+            <a:picLocks noChangeAspect="1"/>
+          </p:cNvPicPr>
+          <p:nvPr/>
+        </p:nvPicPr>
+        <p:blipFill>
+          <a:blip r:embed="rId4"/>
+          <a:stretch>
+            <a:fillRect/>
+          </a:stretch>
+        </p:blipFill>
+        <p:spPr>
+          <a:xfrm>
+            <a:off x="5632787" y="398313"/>
+            <a:ext cx="5208533" cy="3829198"/>
+          </a:xfrm>
+          <a:prstGeom prst="rect">
+            <a:avLst/>
+          </a:prstGeom>
+        </p:spPr>
+      </p:pic>
+      <p:sp>
+        <p:nvSpPr>
+          <p:cNvPr id="20" name="Rounded Rectangle 19">
+            <a:extLst>
+              <a:ext uri="{FF2B5EF4-FFF2-40B4-BE49-F238E27FC236}">
+                <a16:creationId xmlns:a16="http://schemas.microsoft.com/office/drawing/2014/main" id="{0E51F889-A439-C345-855E-0C0603EA7AE1}"/>
+              </a:ext>
+            </a:extLst>
+          </p:cNvPr>
+          <p:cNvSpPr/>
+          <p:nvPr/>
+        </p:nvSpPr>
+        <p:spPr>
+          <a:xfrm>
+            <a:off x="5632787" y="1045299"/>
+            <a:ext cx="5084831" cy="2335619"/>
+          </a:xfrm>
+          <a:prstGeom prst="roundRect">
+            <a:avLst>
+              <a:gd name="adj" fmla="val 3465"/>
+            </a:avLst>
+          </a:prstGeom>
+          <a:noFill/>
+          <a:ln w="38100">
+            <a:solidFill>
+              <a:srgbClr val="FF61AF"/>
+            </a:solidFill>
+          </a:ln>
+          <a:effectLst>
+            <a:outerShdw blurRad="101600" dist="25400" dir="2700000" algn="tl" rotWithShape="0">
+              <a:prstClr val="black"/>
+            </a:outerShdw>
+          </a:effectLst>
+        </p:spPr>
+        <p:style>
+          <a:lnRef idx="2">
+            <a:schemeClr val="accent1">
+              <a:shade val="50000"/>
+            </a:schemeClr>
+          </a:lnRef>
+          <a:fillRef idx="1">
+            <a:schemeClr val="accent1"/>
+          </a:fillRef>
+          <a:effectRef idx="0">
+            <a:schemeClr val="accent1"/>
+          </a:effectRef>
+          <a:fontRef idx="minor">
+            <a:schemeClr val="lt1"/>
+          </a:fontRef>
+        </p:style>
+        <p:txBody>
+          <a:bodyPr rtlCol="0" anchor="ctr"/>
+          <a:lstStyle/>
+          <a:p>
+            <a:pPr algn="ctr"/>
+            <a:endParaRPr lang="en-US"/>
+          </a:p>
+        </p:txBody>
+      </p:sp>
+      <p:pic>
+        <p:nvPicPr>
+          <p:cNvPr id="22" name="Picture 21">
+            <a:extLst>
+              <a:ext uri="{FF2B5EF4-FFF2-40B4-BE49-F238E27FC236}">
+                <a16:creationId xmlns:a16="http://schemas.microsoft.com/office/drawing/2014/main" id="{1548ABB4-80B0-EA4A-A1A9-826E3BBF46BD}"/>
+              </a:ext>
+            </a:extLst>
+          </p:cNvPr>
+          <p:cNvPicPr>
+            <a:picLocks noChangeAspect="1"/>
+          </p:cNvPicPr>
+          <p:nvPr/>
+        </p:nvPicPr>
+        <p:blipFill>
+          <a:blip r:embed="rId5"/>
+          <a:stretch>
+            <a:fillRect/>
+          </a:stretch>
+        </p:blipFill>
+        <p:spPr>
+          <a:xfrm>
+            <a:off x="282114" y="472601"/>
+            <a:ext cx="5208533" cy="2274747"/>
+          </a:xfrm>
+          <a:prstGeom prst="rect">
+            <a:avLst/>
+          </a:prstGeom>
+        </p:spPr>
+      </p:pic>
+      <p:sp>
+        <p:nvSpPr>
+          <p:cNvPr id="23" name="Rounded Rectangle 22">
+            <a:extLst>
+              <a:ext uri="{FF2B5EF4-FFF2-40B4-BE49-F238E27FC236}">
+                <a16:creationId xmlns:a16="http://schemas.microsoft.com/office/drawing/2014/main" id="{A0CC1968-A726-9947-96BA-BFEF21436316}"/>
+              </a:ext>
+            </a:extLst>
+          </p:cNvPr>
+          <p:cNvSpPr/>
+          <p:nvPr/>
+        </p:nvSpPr>
+        <p:spPr>
+          <a:xfrm>
+            <a:off x="303380" y="1810841"/>
+            <a:ext cx="2217570" cy="220384"/>
+          </a:xfrm>
+          <a:prstGeom prst="roundRect">
+            <a:avLst/>
+          </a:prstGeom>
+          <a:noFill/>
+          <a:ln w="25400">
+            <a:solidFill>
+              <a:srgbClr val="FF61AF"/>
+            </a:solidFill>
+          </a:ln>
+          <a:effectLst>
+            <a:outerShdw blurRad="101600" dist="25400" dir="2700000" algn="tl" rotWithShape="0">
+              <a:prstClr val="black"/>
+            </a:outerShdw>
+          </a:effectLst>
+        </p:spPr>
+        <p:style>
+          <a:lnRef idx="2">
+            <a:schemeClr val="accent1">
+              <a:shade val="50000"/>
+            </a:schemeClr>
+          </a:lnRef>
+          <a:fillRef idx="1">
+            <a:schemeClr val="accent1"/>
+          </a:fillRef>
+          <a:effectRef idx="0">
+            <a:schemeClr val="accent1"/>
+          </a:effectRef>
+          <a:fontRef idx="minor">
+            <a:schemeClr val="lt1"/>
+          </a:fontRef>
+        </p:style>
+        <p:txBody>
+          <a:bodyPr rtlCol="0" anchor="ctr"/>
+          <a:lstStyle/>
+          <a:p>
+            <a:pPr algn="ctr"/>
+            <a:endParaRPr lang="en-US"/>
+          </a:p>
+        </p:txBody>
+      </p:sp>
+    </p:spTree>
+    <p:extLst>
+      <p:ext uri="{BB962C8B-B14F-4D97-AF65-F5344CB8AC3E}">
+        <p14:creationId xmlns:p14="http://schemas.microsoft.com/office/powerpoint/2010/main" val="3974927229"/>
       </p:ext>
     </p:extLst>
   </p:cSld>

</xml_diff>